<commit_message>
updates after day 1
</commit_message>
<xml_diff>
--- a/Provincial outreach deck.pptx
+++ b/Provincial outreach deck.pptx
@@ -6,7 +6,7 @@
     <p:sldMasterId id="2147483648" r:id="rId5"/>
   </p:sldMasterIdLst>
   <p:notesMasterIdLst>
-    <p:notesMasterId r:id="rId24"/>
+    <p:notesMasterId r:id="rId22"/>
   </p:notesMasterIdLst>
   <p:sldIdLst>
     <p:sldId id="266" r:id="rId6"/>
@@ -15,18 +15,16 @@
     <p:sldId id="320" r:id="rId9"/>
     <p:sldId id="273" r:id="rId10"/>
     <p:sldId id="318" r:id="rId11"/>
-    <p:sldId id="311" r:id="rId12"/>
+    <p:sldId id="316" r:id="rId12"/>
     <p:sldId id="299" r:id="rId13"/>
     <p:sldId id="298" r:id="rId14"/>
-    <p:sldId id="301" r:id="rId15"/>
-    <p:sldId id="324" r:id="rId16"/>
-    <p:sldId id="323" r:id="rId17"/>
-    <p:sldId id="314" r:id="rId18"/>
-    <p:sldId id="315" r:id="rId19"/>
-    <p:sldId id="316" r:id="rId20"/>
-    <p:sldId id="321" r:id="rId21"/>
-    <p:sldId id="312" r:id="rId22"/>
-    <p:sldId id="322" r:id="rId23"/>
+    <p:sldId id="324" r:id="rId15"/>
+    <p:sldId id="315" r:id="rId16"/>
+    <p:sldId id="314" r:id="rId17"/>
+    <p:sldId id="301" r:id="rId18"/>
+    <p:sldId id="321" r:id="rId19"/>
+    <p:sldId id="312" r:id="rId20"/>
+    <p:sldId id="322" r:id="rId21"/>
   </p:sldIdLst>
   <p:sldSz cx="12192000" cy="6858000"/>
   <p:notesSz cx="6858000" cy="9144000"/>
@@ -172,8 +170,1994 @@
   <p1510:revLst>
     <p1510:client id="{69D2FBB1-8D2B-4E25-BB9F-7839E62F21A4}" v="3" dt="2025-06-15T21:06:22.430"/>
     <p1510:client id="{753EA56F-2CDB-8C43-8310-EC63696903C3}" v="12" dt="2025-06-15T21:04:48.114"/>
+    <p1510:client id="{F31503FB-583A-68ED-21E0-408D14855089}" v="1024" dt="2025-06-17T01:04:14.083"/>
   </p1510:revLst>
 </p1510:revInfo>
+</file>
+
+<file path=ppt/changesInfos/changesInfo1.xml><?xml version="1.0" encoding="utf-8"?>
+<pc:chgInfo xmlns:a="http://schemas.openxmlformats.org/drawingml/2006/main" xmlns:r="http://schemas.openxmlformats.org/officeDocument/2006/relationships" xmlns:ac="http://schemas.microsoft.com/office/drawing/2013/main/command" xmlns:pc="http://schemas.microsoft.com/office/powerpoint/2013/main/command">
+  <pc:docChgLst>
+    <pc:chgData name="Johanne Provençal" userId="91505ee1-49e7-4482-8c3c-80c96976f4a1" providerId="ADAL" clId="{742E756C-40F8-47AB-9B37-66D4DE51F420}"/>
+    <pc:docChg chg="undo redo custSel modSld">
+      <pc:chgData name="Johanne Provençal" userId="91505ee1-49e7-4482-8c3c-80c96976f4a1" providerId="ADAL" clId="{742E756C-40F8-47AB-9B37-66D4DE51F420}" dt="2025-04-28T18:59:04.060" v="394" actId="13926"/>
+      <pc:docMkLst>
+        <pc:docMk/>
+      </pc:docMkLst>
+      <pc:sldChg chg="modSp mod">
+        <pc:chgData name="Johanne Provençal" userId="91505ee1-49e7-4482-8c3c-80c96976f4a1" providerId="ADAL" clId="{742E756C-40F8-47AB-9B37-66D4DE51F420}" dt="2025-04-28T18:46:59.136" v="361" actId="13926"/>
+        <pc:sldMkLst>
+          <pc:docMk/>
+          <pc:sldMk cId="3367948393" sldId="273"/>
+        </pc:sldMkLst>
+        <pc:spChg chg="mod">
+          <ac:chgData name="Johanne Provençal" userId="91505ee1-49e7-4482-8c3c-80c96976f4a1" providerId="ADAL" clId="{742E756C-40F8-47AB-9B37-66D4DE51F420}" dt="2025-04-28T18:41:31.264" v="201" actId="1036"/>
+          <ac:spMkLst>
+            <pc:docMk/>
+            <pc:sldMk cId="3367948393" sldId="273"/>
+            <ac:spMk id="12" creationId="{00000000-0000-0000-0000-000000000000}"/>
+          </ac:spMkLst>
+        </pc:spChg>
+        <pc:spChg chg="mod">
+          <ac:chgData name="Johanne Provençal" userId="91505ee1-49e7-4482-8c3c-80c96976f4a1" providerId="ADAL" clId="{742E756C-40F8-47AB-9B37-66D4DE51F420}" dt="2025-04-28T18:41:21.136" v="198" actId="1038"/>
+          <ac:spMkLst>
+            <pc:docMk/>
+            <pc:sldMk cId="3367948393" sldId="273"/>
+            <ac:spMk id="13" creationId="{00000000-0000-0000-0000-000000000000}"/>
+          </ac:spMkLst>
+        </pc:spChg>
+        <pc:spChg chg="mod">
+          <ac:chgData name="Johanne Provençal" userId="91505ee1-49e7-4482-8c3c-80c96976f4a1" providerId="ADAL" clId="{742E756C-40F8-47AB-9B37-66D4DE51F420}" dt="2025-04-28T18:42:35.692" v="276" actId="1037"/>
+          <ac:spMkLst>
+            <pc:docMk/>
+            <pc:sldMk cId="3367948393" sldId="273"/>
+            <ac:spMk id="19" creationId="{00000000-0000-0000-0000-000000000000}"/>
+          </ac:spMkLst>
+        </pc:spChg>
+        <pc:spChg chg="mod">
+          <ac:chgData name="Johanne Provençal" userId="91505ee1-49e7-4482-8c3c-80c96976f4a1" providerId="ADAL" clId="{742E756C-40F8-47AB-9B37-66D4DE51F420}" dt="2025-04-28T18:42:29.995" v="273" actId="1038"/>
+          <ac:spMkLst>
+            <pc:docMk/>
+            <pc:sldMk cId="3367948393" sldId="273"/>
+            <ac:spMk id="25" creationId="{00000000-0000-0000-0000-000000000000}"/>
+          </ac:spMkLst>
+        </pc:spChg>
+        <pc:spChg chg="mod">
+          <ac:chgData name="Johanne Provençal" userId="91505ee1-49e7-4482-8c3c-80c96976f4a1" providerId="ADAL" clId="{742E756C-40F8-47AB-9B37-66D4DE51F420}" dt="2025-04-28T18:41:59.977" v="241" actId="1036"/>
+          <ac:spMkLst>
+            <pc:docMk/>
+            <pc:sldMk cId="3367948393" sldId="273"/>
+            <ac:spMk id="26" creationId="{00000000-0000-0000-0000-000000000000}"/>
+          </ac:spMkLst>
+        </pc:spChg>
+        <pc:spChg chg="mod">
+          <ac:chgData name="Johanne Provençal" userId="91505ee1-49e7-4482-8c3c-80c96976f4a1" providerId="ADAL" clId="{742E756C-40F8-47AB-9B37-66D4DE51F420}" dt="2025-04-28T18:43:00.379" v="299" actId="1035"/>
+          <ac:spMkLst>
+            <pc:docMk/>
+            <pc:sldMk cId="3367948393" sldId="273"/>
+            <ac:spMk id="27" creationId="{00000000-0000-0000-0000-000000000000}"/>
+          </ac:spMkLst>
+        </pc:spChg>
+        <pc:spChg chg="mod">
+          <ac:chgData name="Johanne Provençal" userId="91505ee1-49e7-4482-8c3c-80c96976f4a1" providerId="ADAL" clId="{742E756C-40F8-47AB-9B37-66D4DE51F420}" dt="2025-04-28T18:39:33.827" v="154" actId="14100"/>
+          <ac:spMkLst>
+            <pc:docMk/>
+            <pc:sldMk cId="3367948393" sldId="273"/>
+            <ac:spMk id="32" creationId="{00000000-0000-0000-0000-000000000000}"/>
+          </ac:spMkLst>
+        </pc:spChg>
+        <pc:spChg chg="mod">
+          <ac:chgData name="Johanne Provençal" userId="91505ee1-49e7-4482-8c3c-80c96976f4a1" providerId="ADAL" clId="{742E756C-40F8-47AB-9B37-66D4DE51F420}" dt="2025-04-28T18:44:01.071" v="341" actId="1036"/>
+          <ac:spMkLst>
+            <pc:docMk/>
+            <pc:sldMk cId="3367948393" sldId="273"/>
+            <ac:spMk id="33" creationId="{00000000-0000-0000-0000-000000000000}"/>
+          </ac:spMkLst>
+        </pc:spChg>
+        <pc:spChg chg="mod">
+          <ac:chgData name="Johanne Provençal" userId="91505ee1-49e7-4482-8c3c-80c96976f4a1" providerId="ADAL" clId="{742E756C-40F8-47AB-9B37-66D4DE51F420}" dt="2025-04-28T18:43:47.899" v="323" actId="1036"/>
+          <ac:spMkLst>
+            <pc:docMk/>
+            <pc:sldMk cId="3367948393" sldId="273"/>
+            <ac:spMk id="34" creationId="{00000000-0000-0000-0000-000000000000}"/>
+          </ac:spMkLst>
+        </pc:spChg>
+        <pc:spChg chg="mod">
+          <ac:chgData name="Johanne Provençal" userId="91505ee1-49e7-4482-8c3c-80c96976f4a1" providerId="ADAL" clId="{742E756C-40F8-47AB-9B37-66D4DE51F420}" dt="2025-04-28T18:46:59.136" v="361" actId="13926"/>
+          <ac:spMkLst>
+            <pc:docMk/>
+            <pc:sldMk cId="3367948393" sldId="273"/>
+            <ac:spMk id="35" creationId="{34123E5D-9ACC-29AE-80DC-65B514A4E808}"/>
+          </ac:spMkLst>
+        </pc:spChg>
+        <pc:spChg chg="mod">
+          <ac:chgData name="Johanne Provençal" userId="91505ee1-49e7-4482-8c3c-80c96976f4a1" providerId="ADAL" clId="{742E756C-40F8-47AB-9B37-66D4DE51F420}" dt="2025-04-28T18:39:10.140" v="149" actId="14100"/>
+          <ac:spMkLst>
+            <pc:docMk/>
+            <pc:sldMk cId="3367948393" sldId="273"/>
+            <ac:spMk id="36" creationId="{3B0FD79D-09AF-4D5E-8801-4B08EF834E76}"/>
+          </ac:spMkLst>
+        </pc:spChg>
+        <pc:spChg chg="mod">
+          <ac:chgData name="Johanne Provençal" userId="91505ee1-49e7-4482-8c3c-80c96976f4a1" providerId="ADAL" clId="{742E756C-40F8-47AB-9B37-66D4DE51F420}" dt="2025-04-28T18:39:57.799" v="165" actId="255"/>
+          <ac:spMkLst>
+            <pc:docMk/>
+            <pc:sldMk cId="3367948393" sldId="273"/>
+            <ac:spMk id="37" creationId="{BEA25135-32F8-4B38-BC96-21CA998F9AD5}"/>
+          </ac:spMkLst>
+        </pc:spChg>
+        <pc:spChg chg="mod">
+          <ac:chgData name="Johanne Provençal" userId="91505ee1-49e7-4482-8c3c-80c96976f4a1" providerId="ADAL" clId="{742E756C-40F8-47AB-9B37-66D4DE51F420}" dt="2025-04-28T18:39:03.940" v="148" actId="14100"/>
+          <ac:spMkLst>
+            <pc:docMk/>
+            <pc:sldMk cId="3367948393" sldId="273"/>
+            <ac:spMk id="39" creationId="{4A28F8C9-C35A-4DF9-9DA1-F1952244BFD4}"/>
+          </ac:spMkLst>
+        </pc:spChg>
+        <pc:spChg chg="mod">
+          <ac:chgData name="Johanne Provençal" userId="91505ee1-49e7-4482-8c3c-80c96976f4a1" providerId="ADAL" clId="{742E756C-40F8-47AB-9B37-66D4DE51F420}" dt="2025-04-28T18:40:21.195" v="180" actId="1036"/>
+          <ac:spMkLst>
+            <pc:docMk/>
+            <pc:sldMk cId="3367948393" sldId="273"/>
+            <ac:spMk id="40" creationId="{BB388E88-1D9D-42E6-AF35-1209C6002EBF}"/>
+          </ac:spMkLst>
+        </pc:spChg>
+        <pc:grpChg chg="mod">
+          <ac:chgData name="Johanne Provençal" userId="91505ee1-49e7-4482-8c3c-80c96976f4a1" providerId="ADAL" clId="{742E756C-40F8-47AB-9B37-66D4DE51F420}" dt="2025-04-28T18:43:17.075" v="301" actId="14100"/>
+          <ac:grpSpMkLst>
+            <pc:docMk/>
+            <pc:sldMk cId="3367948393" sldId="273"/>
+            <ac:grpSpMk id="7" creationId="{00000000-0000-0000-0000-000000000000}"/>
+          </ac:grpSpMkLst>
+        </pc:grpChg>
+        <pc:grpChg chg="mod">
+          <ac:chgData name="Johanne Provençal" userId="91505ee1-49e7-4482-8c3c-80c96976f4a1" providerId="ADAL" clId="{742E756C-40F8-47AB-9B37-66D4DE51F420}" dt="2025-04-28T18:43:21.557" v="302" actId="14100"/>
+          <ac:grpSpMkLst>
+            <pc:docMk/>
+            <pc:sldMk cId="3367948393" sldId="273"/>
+            <ac:grpSpMk id="14" creationId="{00000000-0000-0000-0000-000000000000}"/>
+          </ac:grpSpMkLst>
+        </pc:grpChg>
+        <pc:grpChg chg="mod">
+          <ac:chgData name="Johanne Provençal" userId="91505ee1-49e7-4482-8c3c-80c96976f4a1" providerId="ADAL" clId="{742E756C-40F8-47AB-9B37-66D4DE51F420}" dt="2025-04-28T18:43:26.340" v="303" actId="14100"/>
+          <ac:grpSpMkLst>
+            <pc:docMk/>
+            <pc:sldMk cId="3367948393" sldId="273"/>
+            <ac:grpSpMk id="20" creationId="{00000000-0000-0000-0000-000000000000}"/>
+          </ac:grpSpMkLst>
+        </pc:grpChg>
+        <pc:grpChg chg="mod">
+          <ac:chgData name="Johanne Provençal" userId="91505ee1-49e7-4482-8c3c-80c96976f4a1" providerId="ADAL" clId="{742E756C-40F8-47AB-9B37-66D4DE51F420}" dt="2025-04-28T18:43:12.140" v="300" actId="14100"/>
+          <ac:grpSpMkLst>
+            <pc:docMk/>
+            <pc:sldMk cId="3367948393" sldId="273"/>
+            <ac:grpSpMk id="28" creationId="{00000000-0000-0000-0000-000000000000}"/>
+          </ac:grpSpMkLst>
+        </pc:grpChg>
+      </pc:sldChg>
+      <pc:sldChg chg="modSp mod">
+        <pc:chgData name="Johanne Provençal" userId="91505ee1-49e7-4482-8c3c-80c96976f4a1" providerId="ADAL" clId="{742E756C-40F8-47AB-9B37-66D4DE51F420}" dt="2025-04-28T18:59:04.060" v="394" actId="13926"/>
+        <pc:sldMkLst>
+          <pc:docMk/>
+          <pc:sldMk cId="1375125008" sldId="316"/>
+        </pc:sldMkLst>
+        <pc:spChg chg="mod">
+          <ac:chgData name="Johanne Provençal" userId="91505ee1-49e7-4482-8c3c-80c96976f4a1" providerId="ADAL" clId="{742E756C-40F8-47AB-9B37-66D4DE51F420}" dt="2025-04-28T18:59:04.060" v="394" actId="13926"/>
+          <ac:spMkLst>
+            <pc:docMk/>
+            <pc:sldMk cId="1375125008" sldId="316"/>
+            <ac:spMk id="19" creationId="{807A597D-B1D3-E997-FDD3-58896A19DAED}"/>
+          </ac:spMkLst>
+        </pc:spChg>
+      </pc:sldChg>
+      <pc:sldChg chg="modSp mod">
+        <pc:chgData name="Johanne Provençal" userId="91505ee1-49e7-4482-8c3c-80c96976f4a1" providerId="ADAL" clId="{742E756C-40F8-47AB-9B37-66D4DE51F420}" dt="2025-04-28T18:47:25.420" v="392" actId="20577"/>
+        <pc:sldMkLst>
+          <pc:docMk/>
+          <pc:sldMk cId="873667192" sldId="318"/>
+        </pc:sldMkLst>
+        <pc:spChg chg="mod">
+          <ac:chgData name="Johanne Provençal" userId="91505ee1-49e7-4482-8c3c-80c96976f4a1" providerId="ADAL" clId="{742E756C-40F8-47AB-9B37-66D4DE51F420}" dt="2025-04-28T18:47:25.420" v="392" actId="20577"/>
+          <ac:spMkLst>
+            <pc:docMk/>
+            <pc:sldMk cId="873667192" sldId="318"/>
+            <ac:spMk id="19" creationId="{84D2D941-155E-7765-5DB2-3BFE270DF2BF}"/>
+          </ac:spMkLst>
+        </pc:spChg>
+      </pc:sldChg>
+      <pc:sldChg chg="modSp mod">
+        <pc:chgData name="Johanne Provençal" userId="91505ee1-49e7-4482-8c3c-80c96976f4a1" providerId="ADAL" clId="{742E756C-40F8-47AB-9B37-66D4DE51F420}" dt="2025-04-28T18:34:36.664" v="9" actId="20577"/>
+        <pc:sldMkLst>
+          <pc:docMk/>
+          <pc:sldMk cId="4231658747" sldId="320"/>
+        </pc:sldMkLst>
+        <pc:spChg chg="mod">
+          <ac:chgData name="Johanne Provençal" userId="91505ee1-49e7-4482-8c3c-80c96976f4a1" providerId="ADAL" clId="{742E756C-40F8-47AB-9B37-66D4DE51F420}" dt="2025-04-28T18:34:36.664" v="9" actId="20577"/>
+          <ac:spMkLst>
+            <pc:docMk/>
+            <pc:sldMk cId="4231658747" sldId="320"/>
+            <ac:spMk id="19" creationId="{23904B80-4C3E-3ABD-F824-BCFAA3484CDA}"/>
+          </ac:spMkLst>
+        </pc:spChg>
+      </pc:sldChg>
+    </pc:docChg>
+  </pc:docChgLst>
+  <pc:docChgLst>
+    <pc:chgData name="Johanne Provençal" userId="S::johanne.provencal@crdcn.ca::91505ee1-49e7-4482-8c3c-80c96976f4a1" providerId="AD" clId="Web-{9EAA66AA-33BF-4CD4-859F-9165FF9B9460}"/>
+    <pc:docChg chg="modSld">
+      <pc:chgData name="Johanne Provençal" userId="S::johanne.provencal@crdcn.ca::91505ee1-49e7-4482-8c3c-80c96976f4a1" providerId="AD" clId="Web-{9EAA66AA-33BF-4CD4-859F-9165FF9B9460}" dt="2024-06-03T12:45:09.589" v="4"/>
+      <pc:docMkLst>
+        <pc:docMk/>
+      </pc:docMkLst>
+      <pc:sldChg chg="modSp">
+        <pc:chgData name="Johanne Provençal" userId="S::johanne.provencal@crdcn.ca::91505ee1-49e7-4482-8c3c-80c96976f4a1" providerId="AD" clId="Web-{9EAA66AA-33BF-4CD4-859F-9165FF9B9460}" dt="2024-06-03T12:45:09.589" v="4"/>
+        <pc:sldMkLst>
+          <pc:docMk/>
+          <pc:sldMk cId="1888437868" sldId="298"/>
+        </pc:sldMkLst>
+      </pc:sldChg>
+    </pc:docChg>
+  </pc:docChgLst>
+  <pc:docChgLst>
+    <pc:chgData clId="Web-{753EA56F-2CDB-8C43-8310-EC63696903C3}"/>
+    <pc:docChg chg="modSld">
+      <pc:chgData name="" userId="" providerId="" clId="Web-{753EA56F-2CDB-8C43-8310-EC63696903C3}" dt="2025-06-15T21:04:25.269" v="3" actId="20577"/>
+      <pc:docMkLst>
+        <pc:docMk/>
+      </pc:docMkLst>
+      <pc:sldChg chg="modSp">
+        <pc:chgData name="" userId="" providerId="" clId="Web-{753EA56F-2CDB-8C43-8310-EC63696903C3}" dt="2025-06-15T21:04:25.269" v="3" actId="20577"/>
+        <pc:sldMkLst>
+          <pc:docMk/>
+          <pc:sldMk cId="723683264" sldId="266"/>
+        </pc:sldMkLst>
+        <pc:spChg chg="mod">
+          <ac:chgData name="" userId="" providerId="" clId="Web-{753EA56F-2CDB-8C43-8310-EC63696903C3}" dt="2025-06-15T21:04:25.269" v="3" actId="20577"/>
+          <ac:spMkLst>
+            <pc:docMk/>
+            <pc:sldMk cId="723683264" sldId="266"/>
+            <ac:spMk id="7" creationId="{00000000-0000-0000-0000-000000000000}"/>
+          </ac:spMkLst>
+        </pc:spChg>
+      </pc:sldChg>
+    </pc:docChg>
+  </pc:docChgLst>
+  <pc:docChgLst>
+    <pc:chgData name="Johanne Provençal" userId="S::johanne.provencal@crdcn.ca::91505ee1-49e7-4482-8c3c-80c96976f4a1" providerId="AD" clId="Web-{55101AD3-916D-308F-ACDB-CE4429DCC60E}"/>
+    <pc:docChg chg="modSld">
+      <pc:chgData name="Johanne Provençal" userId="S::johanne.provencal@crdcn.ca::91505ee1-49e7-4482-8c3c-80c96976f4a1" providerId="AD" clId="Web-{55101AD3-916D-308F-ACDB-CE4429DCC60E}" dt="2024-07-08T19:19:44.837" v="3" actId="20577"/>
+      <pc:docMkLst>
+        <pc:docMk/>
+      </pc:docMkLst>
+      <pc:sldChg chg="modSp">
+        <pc:chgData name="Johanne Provençal" userId="S::johanne.provencal@crdcn.ca::91505ee1-49e7-4482-8c3c-80c96976f4a1" providerId="AD" clId="Web-{55101AD3-916D-308F-ACDB-CE4429DCC60E}" dt="2024-07-08T19:19:44.837" v="3" actId="20577"/>
+        <pc:sldMkLst>
+          <pc:docMk/>
+          <pc:sldMk cId="3367948393" sldId="273"/>
+        </pc:sldMkLst>
+      </pc:sldChg>
+    </pc:docChg>
+  </pc:docChgLst>
+  <pc:docChgLst>
+    <pc:chgData name="Natalie Harrower" userId="S::natalie.harrower@crdcn.ca::e53cfc70-a269-4ad5-8da5-0483a3863770" providerId="AD" clId="Web-{7BA7B77B-0913-5D90-4568-267331727C3F}"/>
+    <pc:docChg chg="mod modSld">
+      <pc:chgData name="Natalie Harrower" userId="S::natalie.harrower@crdcn.ca::e53cfc70-a269-4ad5-8da5-0483a3863770" providerId="AD" clId="Web-{7BA7B77B-0913-5D90-4568-267331727C3F}" dt="2025-03-11T20:03:48.084" v="3" actId="1076"/>
+      <pc:docMkLst>
+        <pc:docMk/>
+      </pc:docMkLst>
+      <pc:sldChg chg="addSp modSp">
+        <pc:chgData name="Natalie Harrower" userId="S::natalie.harrower@crdcn.ca::e53cfc70-a269-4ad5-8da5-0483a3863770" providerId="AD" clId="Web-{7BA7B77B-0913-5D90-4568-267331727C3F}" dt="2025-03-11T20:03:48.084" v="3" actId="1076"/>
+        <pc:sldMkLst>
+          <pc:docMk/>
+          <pc:sldMk cId="624593502" sldId="301"/>
+        </pc:sldMkLst>
+      </pc:sldChg>
+    </pc:docChg>
+  </pc:docChgLst>
+  <pc:docChgLst>
+    <pc:chgData name="Johanne Provençal" userId="91505ee1-49e7-4482-8c3c-80c96976f4a1" providerId="ADAL" clId="{C385E3AC-03EB-4309-A551-1B31C81B5577}"/>
+    <pc:docChg chg="undo redo custSel addSld delSld modSld">
+      <pc:chgData name="Johanne Provençal" userId="91505ee1-49e7-4482-8c3c-80c96976f4a1" providerId="ADAL" clId="{C385E3AC-03EB-4309-A551-1B31C81B5577}" dt="2024-05-29T20:16:21.358" v="1755" actId="20577"/>
+      <pc:docMkLst>
+        <pc:docMk/>
+      </pc:docMkLst>
+      <pc:sldChg chg="modSp">
+        <pc:chgData name="Johanne Provençal" userId="91505ee1-49e7-4482-8c3c-80c96976f4a1" providerId="ADAL" clId="{C385E3AC-03EB-4309-A551-1B31C81B5577}" dt="2024-05-29T19:17:18.486" v="174" actId="20577"/>
+        <pc:sldMkLst>
+          <pc:docMk/>
+          <pc:sldMk cId="723683264" sldId="266"/>
+        </pc:sldMkLst>
+      </pc:sldChg>
+      <pc:sldChg chg="modSp">
+        <pc:chgData name="Johanne Provençal" userId="91505ee1-49e7-4482-8c3c-80c96976f4a1" providerId="ADAL" clId="{C385E3AC-03EB-4309-A551-1B31C81B5577}" dt="2024-05-29T19:26:36.113" v="525" actId="20577"/>
+        <pc:sldMkLst>
+          <pc:docMk/>
+          <pc:sldMk cId="3367948393" sldId="273"/>
+        </pc:sldMkLst>
+      </pc:sldChg>
+      <pc:sldChg chg="delSp modSp add">
+        <pc:chgData name="Johanne Provençal" userId="91505ee1-49e7-4482-8c3c-80c96976f4a1" providerId="ADAL" clId="{C385E3AC-03EB-4309-A551-1B31C81B5577}" dt="2024-05-29T20:15:48.858" v="1747" actId="20577"/>
+        <pc:sldMkLst>
+          <pc:docMk/>
+          <pc:sldMk cId="1888437868" sldId="298"/>
+        </pc:sldMkLst>
+      </pc:sldChg>
+    </pc:docChg>
+  </pc:docChgLst>
+  <pc:docChgLst>
+    <pc:chgData name="Johanne Provençal" userId="S::johanne.provencal@crdcn.ca::91505ee1-49e7-4482-8c3c-80c96976f4a1" providerId="AD" clId="Web-{50440129-5002-2F4E-D93A-A727D7899BC6}"/>
+    <pc:docChg chg="modSld">
+      <pc:chgData name="Johanne Provençal" userId="S::johanne.provencal@crdcn.ca::91505ee1-49e7-4482-8c3c-80c96976f4a1" providerId="AD" clId="Web-{50440129-5002-2F4E-D93A-A727D7899BC6}" dt="2024-07-08T19:30:34.434" v="1" actId="20577"/>
+      <pc:docMkLst>
+        <pc:docMk/>
+      </pc:docMkLst>
+      <pc:sldChg chg="modSp">
+        <pc:chgData name="Johanne Provençal" userId="S::johanne.provencal@crdcn.ca::91505ee1-49e7-4482-8c3c-80c96976f4a1" providerId="AD" clId="Web-{50440129-5002-2F4E-D93A-A727D7899BC6}" dt="2024-07-08T19:30:34.434" v="1" actId="20577"/>
+        <pc:sldMkLst>
+          <pc:docMk/>
+          <pc:sldMk cId="2974737869" sldId="300"/>
+        </pc:sldMkLst>
+      </pc:sldChg>
+    </pc:docChg>
+  </pc:docChgLst>
+  <pc:docChgLst>
+    <pc:chgData name="Johanne Provençal" userId="S::johanne.provencal@crdcn.ca::91505ee1-49e7-4482-8c3c-80c96976f4a1" providerId="AD" clId="Web-{DFFB03C2-1EC0-3054-3F60-17C550C281FA}"/>
+    <pc:docChg chg="modSld">
+      <pc:chgData name="Johanne Provençal" userId="S::johanne.provencal@crdcn.ca::91505ee1-49e7-4482-8c3c-80c96976f4a1" providerId="AD" clId="Web-{DFFB03C2-1EC0-3054-3F60-17C550C281FA}" dt="2024-08-29T14:04:11.042" v="8" actId="20577"/>
+      <pc:docMkLst>
+        <pc:docMk/>
+      </pc:docMkLst>
+      <pc:sldChg chg="modSp">
+        <pc:chgData name="Johanne Provençal" userId="S::johanne.provencal@crdcn.ca::91505ee1-49e7-4482-8c3c-80c96976f4a1" providerId="AD" clId="Web-{DFFB03C2-1EC0-3054-3F60-17C550C281FA}" dt="2024-08-29T14:04:11.042" v="8" actId="20577"/>
+        <pc:sldMkLst>
+          <pc:docMk/>
+          <pc:sldMk cId="723683264" sldId="266"/>
+        </pc:sldMkLst>
+      </pc:sldChg>
+    </pc:docChg>
+  </pc:docChgLst>
+  <pc:docChgLst>
+    <pc:chgData name="Johanne Provençal" userId="S::johanne.provencal@crdcn.ca::91505ee1-49e7-4482-8c3c-80c96976f4a1" providerId="AD" clId="Web-{3464698B-8276-2448-EC4D-D9226E788270}"/>
+    <pc:docChg chg="addSld modSld sldOrd">
+      <pc:chgData name="Johanne Provençal" userId="S::johanne.provencal@crdcn.ca::91505ee1-49e7-4482-8c3c-80c96976f4a1" providerId="AD" clId="Web-{3464698B-8276-2448-EC4D-D9226E788270}" dt="2025-03-05T15:37:18.564" v="128" actId="20577"/>
+      <pc:docMkLst>
+        <pc:docMk/>
+      </pc:docMkLst>
+      <pc:sldChg chg="modSp add ord replId">
+        <pc:chgData name="Johanne Provençal" userId="S::johanne.provencal@crdcn.ca::91505ee1-49e7-4482-8c3c-80c96976f4a1" providerId="AD" clId="Web-{3464698B-8276-2448-EC4D-D9226E788270}" dt="2025-03-05T15:37:18.564" v="128" actId="20577"/>
+        <pc:sldMkLst>
+          <pc:docMk/>
+          <pc:sldMk cId="3675876903" sldId="321"/>
+        </pc:sldMkLst>
+        <pc:spChg chg="mod">
+          <ac:chgData name="Johanne Provençal" userId="S::johanne.provencal@crdcn.ca::91505ee1-49e7-4482-8c3c-80c96976f4a1" providerId="AD" clId="Web-{3464698B-8276-2448-EC4D-D9226E788270}" dt="2025-03-05T15:37:18.564" v="128" actId="20577"/>
+          <ac:spMkLst>
+            <pc:docMk/>
+            <pc:sldMk cId="3675876903" sldId="321"/>
+            <ac:spMk id="19" creationId="{3CBF1FA5-EB18-BF41-63B7-E0CABB3E5FA6}"/>
+          </ac:spMkLst>
+        </pc:spChg>
+      </pc:sldChg>
+    </pc:docChg>
+  </pc:docChgLst>
+  <pc:docChgLst>
+    <pc:chgData name="Aimée Dubeau" userId="S::aimee.dubeau@crdcn.ca::36507897-0e00-4821-a6ca-cde950bccb41" providerId="AD" clId="Web-{E56D213B-9E2A-A35C-AA55-DC8E3927AF41}"/>
+    <pc:docChg chg="modSld">
+      <pc:chgData name="Aimée Dubeau" userId="S::aimee.dubeau@crdcn.ca::36507897-0e00-4821-a6ca-cde950bccb41" providerId="AD" clId="Web-{E56D213B-9E2A-A35C-AA55-DC8E3927AF41}" dt="2025-03-12T17:30:44.298" v="11" actId="20577"/>
+      <pc:docMkLst>
+        <pc:docMk/>
+      </pc:docMkLst>
+      <pc:sldChg chg="modSp">
+        <pc:chgData name="Aimée Dubeau" userId="S::aimee.dubeau@crdcn.ca::36507897-0e00-4821-a6ca-cde950bccb41" providerId="AD" clId="Web-{E56D213B-9E2A-A35C-AA55-DC8E3927AF41}" dt="2025-03-12T17:30:44.298" v="11" actId="20577"/>
+        <pc:sldMkLst>
+          <pc:docMk/>
+          <pc:sldMk cId="4231658747" sldId="320"/>
+        </pc:sldMkLst>
+        <pc:spChg chg="mod">
+          <ac:chgData name="Aimée Dubeau" userId="S::aimee.dubeau@crdcn.ca::36507897-0e00-4821-a6ca-cde950bccb41" providerId="AD" clId="Web-{E56D213B-9E2A-A35C-AA55-DC8E3927AF41}" dt="2025-03-12T17:30:44.298" v="11" actId="20577"/>
+          <ac:spMkLst>
+            <pc:docMk/>
+            <pc:sldMk cId="4231658747" sldId="320"/>
+            <ac:spMk id="19" creationId="{23904B80-4C3E-3ABD-F824-BCFAA3484CDA}"/>
+          </ac:spMkLst>
+        </pc:spChg>
+      </pc:sldChg>
+    </pc:docChg>
+  </pc:docChgLst>
+  <pc:docChgLst>
+    <pc:chgData name="Johanne Provençal" userId="S::johanne.provencal@crdcn.ca::91505ee1-49e7-4482-8c3c-80c96976f4a1" providerId="AD" clId="Web-{C7B83FEC-C3FA-9F99-D667-33A044292644}"/>
+    <pc:docChg chg="modSld">
+      <pc:chgData name="Johanne Provençal" userId="S::johanne.provencal@crdcn.ca::91505ee1-49e7-4482-8c3c-80c96976f4a1" providerId="AD" clId="Web-{C7B83FEC-C3FA-9F99-D667-33A044292644}" dt="2024-07-08T20:00:19.082" v="1" actId="20577"/>
+      <pc:docMkLst>
+        <pc:docMk/>
+      </pc:docMkLst>
+      <pc:sldChg chg="modSp">
+        <pc:chgData name="Johanne Provençal" userId="S::johanne.provencal@crdcn.ca::91505ee1-49e7-4482-8c3c-80c96976f4a1" providerId="AD" clId="Web-{C7B83FEC-C3FA-9F99-D667-33A044292644}" dt="2024-07-08T20:00:19.082" v="1" actId="20577"/>
+        <pc:sldMkLst>
+          <pc:docMk/>
+          <pc:sldMk cId="3367948393" sldId="273"/>
+        </pc:sldMkLst>
+      </pc:sldChg>
+    </pc:docChg>
+  </pc:docChgLst>
+  <pc:docChgLst>
+    <pc:chgData name="Johanne Provençal" userId="91505ee1-49e7-4482-8c3c-80c96976f4a1" providerId="ADAL" clId="{9AD6BD95-5D03-4303-B8DC-CE5133A655B9}"/>
+    <pc:docChg chg="undo redo custSel addSld delSld modSld sldOrd">
+      <pc:chgData name="Johanne Provençal" userId="91505ee1-49e7-4482-8c3c-80c96976f4a1" providerId="ADAL" clId="{9AD6BD95-5D03-4303-B8DC-CE5133A655B9}" dt="2025-03-31T16:05:41.193" v="6446" actId="948"/>
+      <pc:docMkLst>
+        <pc:docMk/>
+      </pc:docMkLst>
+      <pc:sldChg chg="addSp modSp mod">
+        <pc:chgData name="Johanne Provençal" userId="91505ee1-49e7-4482-8c3c-80c96976f4a1" providerId="ADAL" clId="{9AD6BD95-5D03-4303-B8DC-CE5133A655B9}" dt="2025-03-31T16:05:41.193" v="6446" actId="948"/>
+        <pc:sldMkLst>
+          <pc:docMk/>
+          <pc:sldMk cId="3367948393" sldId="273"/>
+        </pc:sldMkLst>
+        <pc:spChg chg="mod">
+          <ac:chgData name="Johanne Provençal" userId="91505ee1-49e7-4482-8c3c-80c96976f4a1" providerId="ADAL" clId="{9AD6BD95-5D03-4303-B8DC-CE5133A655B9}" dt="2025-03-31T16:04:53.144" v="6364" actId="1035"/>
+          <ac:spMkLst>
+            <pc:docMk/>
+            <pc:sldMk cId="3367948393" sldId="273"/>
+            <ac:spMk id="27" creationId="{00000000-0000-0000-0000-000000000000}"/>
+          </ac:spMkLst>
+        </pc:spChg>
+        <pc:spChg chg="mod">
+          <ac:chgData name="Johanne Provençal" userId="91505ee1-49e7-4482-8c3c-80c96976f4a1" providerId="ADAL" clId="{9AD6BD95-5D03-4303-B8DC-CE5133A655B9}" dt="2025-03-31T16:03:01.136" v="6219" actId="1035"/>
+          <ac:spMkLst>
+            <pc:docMk/>
+            <pc:sldMk cId="3367948393" sldId="273"/>
+            <ac:spMk id="33" creationId="{00000000-0000-0000-0000-000000000000}"/>
+          </ac:spMkLst>
+        </pc:spChg>
+        <pc:spChg chg="mod">
+          <ac:chgData name="Johanne Provençal" userId="91505ee1-49e7-4482-8c3c-80c96976f4a1" providerId="ADAL" clId="{9AD6BD95-5D03-4303-B8DC-CE5133A655B9}" dt="2025-03-31T16:03:07.043" v="6231" actId="1035"/>
+          <ac:spMkLst>
+            <pc:docMk/>
+            <pc:sldMk cId="3367948393" sldId="273"/>
+            <ac:spMk id="34" creationId="{00000000-0000-0000-0000-000000000000}"/>
+          </ac:spMkLst>
+        </pc:spChg>
+        <pc:spChg chg="add mod">
+          <ac:chgData name="Johanne Provençal" userId="91505ee1-49e7-4482-8c3c-80c96976f4a1" providerId="ADAL" clId="{9AD6BD95-5D03-4303-B8DC-CE5133A655B9}" dt="2025-03-31T16:05:41.193" v="6446" actId="948"/>
+          <ac:spMkLst>
+            <pc:docMk/>
+            <pc:sldMk cId="3367948393" sldId="273"/>
+            <ac:spMk id="35" creationId="{34123E5D-9ACC-29AE-80DC-65B514A4E808}"/>
+          </ac:spMkLst>
+        </pc:spChg>
+        <pc:spChg chg="mod">
+          <ac:chgData name="Johanne Provençal" userId="91505ee1-49e7-4482-8c3c-80c96976f4a1" providerId="ADAL" clId="{9AD6BD95-5D03-4303-B8DC-CE5133A655B9}" dt="2025-03-31T16:02:24.144" v="6132" actId="1036"/>
+          <ac:spMkLst>
+            <pc:docMk/>
+            <pc:sldMk cId="3367948393" sldId="273"/>
+            <ac:spMk id="39" creationId="{4A28F8C9-C35A-4DF9-9DA1-F1952244BFD4}"/>
+          </ac:spMkLst>
+        </pc:spChg>
+        <pc:spChg chg="mod">
+          <ac:chgData name="Johanne Provençal" userId="91505ee1-49e7-4482-8c3c-80c96976f4a1" providerId="ADAL" clId="{9AD6BD95-5D03-4303-B8DC-CE5133A655B9}" dt="2025-03-31T15:42:40.183" v="5555" actId="20577"/>
+          <ac:spMkLst>
+            <pc:docMk/>
+            <pc:sldMk cId="3367948393" sldId="273"/>
+            <ac:spMk id="40" creationId="{BB388E88-1D9D-42E6-AF35-1209C6002EBF}"/>
+          </ac:spMkLst>
+        </pc:spChg>
+        <pc:grpChg chg="mod">
+          <ac:chgData name="Johanne Provençal" userId="91505ee1-49e7-4482-8c3c-80c96976f4a1" providerId="ADAL" clId="{9AD6BD95-5D03-4303-B8DC-CE5133A655B9}" dt="2025-03-31T16:02:25.680" v="6134" actId="1036"/>
+          <ac:grpSpMkLst>
+            <pc:docMk/>
+            <pc:sldMk cId="3367948393" sldId="273"/>
+            <ac:grpSpMk id="7" creationId="{00000000-0000-0000-0000-000000000000}"/>
+          </ac:grpSpMkLst>
+        </pc:grpChg>
+        <pc:grpChg chg="mod">
+          <ac:chgData name="Johanne Provençal" userId="91505ee1-49e7-4482-8c3c-80c96976f4a1" providerId="ADAL" clId="{9AD6BD95-5D03-4303-B8DC-CE5133A655B9}" dt="2025-03-31T16:02:26.949" v="6136" actId="1036"/>
+          <ac:grpSpMkLst>
+            <pc:docMk/>
+            <pc:sldMk cId="3367948393" sldId="273"/>
+            <ac:grpSpMk id="14" creationId="{00000000-0000-0000-0000-000000000000}"/>
+          </ac:grpSpMkLst>
+        </pc:grpChg>
+        <pc:grpChg chg="mod">
+          <ac:chgData name="Johanne Provençal" userId="91505ee1-49e7-4482-8c3c-80c96976f4a1" providerId="ADAL" clId="{9AD6BD95-5D03-4303-B8DC-CE5133A655B9}" dt="2025-03-31T16:02:28.291" v="6138" actId="1036"/>
+          <ac:grpSpMkLst>
+            <pc:docMk/>
+            <pc:sldMk cId="3367948393" sldId="273"/>
+            <ac:grpSpMk id="20" creationId="{00000000-0000-0000-0000-000000000000}"/>
+          </ac:grpSpMkLst>
+        </pc:grpChg>
+        <pc:grpChg chg="mod">
+          <ac:chgData name="Johanne Provençal" userId="91505ee1-49e7-4482-8c3c-80c96976f4a1" providerId="ADAL" clId="{9AD6BD95-5D03-4303-B8DC-CE5133A655B9}" dt="2025-03-31T16:02:54.825" v="6206" actId="1036"/>
+          <ac:grpSpMkLst>
+            <pc:docMk/>
+            <pc:sldMk cId="3367948393" sldId="273"/>
+            <ac:grpSpMk id="28" creationId="{00000000-0000-0000-0000-000000000000}"/>
+          </ac:grpSpMkLst>
+        </pc:grpChg>
+      </pc:sldChg>
+      <pc:sldChg chg="modSp mod modCm">
+        <pc:chgData name="Johanne Provençal" userId="91505ee1-49e7-4482-8c3c-80c96976f4a1" providerId="ADAL" clId="{9AD6BD95-5D03-4303-B8DC-CE5133A655B9}" dt="2025-03-31T15:47:53.551" v="5605" actId="207"/>
+        <pc:sldMkLst>
+          <pc:docMk/>
+          <pc:sldMk cId="2152791164" sldId="299"/>
+        </pc:sldMkLst>
+        <pc:spChg chg="mod">
+          <ac:chgData name="Johanne Provençal" userId="91505ee1-49e7-4482-8c3c-80c96976f4a1" providerId="ADAL" clId="{9AD6BD95-5D03-4303-B8DC-CE5133A655B9}" dt="2025-03-31T15:47:53.551" v="5605" actId="207"/>
+          <ac:spMkLst>
+            <pc:docMk/>
+            <pc:sldMk cId="2152791164" sldId="299"/>
+            <ac:spMk id="19" creationId="{795E566D-9B19-4429-817F-335B8C788DAE}"/>
+          </ac:spMkLst>
+        </pc:spChg>
+        <pc:extLst>
+          <p:ext xmlns:p="http://schemas.openxmlformats.org/presentationml/2006/main" uri="{D6D511B9-2390-475A-947B-AFAB55BFBCF1}">
+            <pc226:cmChg xmlns:pc226="http://schemas.microsoft.com/office/powerpoint/2022/06/main/command" chg="mod">
+              <pc226:chgData name="Johanne Provençal" userId="91505ee1-49e7-4482-8c3c-80c96976f4a1" providerId="ADAL" clId="{9AD6BD95-5D03-4303-B8DC-CE5133A655B9}" dt="2025-03-13T18:11:29.578" v="4793" actId="20577"/>
+              <pc2:cmMkLst xmlns:pc2="http://schemas.microsoft.com/office/powerpoint/2019/9/main/command">
+                <pc:docMk/>
+                <pc:sldMk cId="2152791164" sldId="299"/>
+                <pc2:cmMk id="{7C6F8556-6E64-4146-B6D1-B8DE6F44B28C}"/>
+              </pc2:cmMkLst>
+            </pc226:cmChg>
+            <pc226:cmChg xmlns:pc226="http://schemas.microsoft.com/office/powerpoint/2022/06/main/command" chg="mod">
+              <pc226:chgData name="Johanne Provençal" userId="91505ee1-49e7-4482-8c3c-80c96976f4a1" providerId="ADAL" clId="{9AD6BD95-5D03-4303-B8DC-CE5133A655B9}" dt="2025-03-13T18:11:03.949" v="4791" actId="20577"/>
+              <pc2:cmMkLst xmlns:pc2="http://schemas.microsoft.com/office/powerpoint/2019/9/main/command">
+                <pc:docMk/>
+                <pc:sldMk cId="2152791164" sldId="299"/>
+                <pc2:cmMk id="{D89B04CE-CD67-46CA-865F-4244E8D66398}"/>
+              </pc2:cmMkLst>
+            </pc226:cmChg>
+            <pc226:cmChg xmlns:pc226="http://schemas.microsoft.com/office/powerpoint/2022/06/main/command" chg="mod">
+              <pc226:chgData name="Johanne Provençal" userId="91505ee1-49e7-4482-8c3c-80c96976f4a1" providerId="ADAL" clId="{9AD6BD95-5D03-4303-B8DC-CE5133A655B9}" dt="2025-03-13T18:12:43.699" v="4882" actId="20577"/>
+              <pc2:cmMkLst xmlns:pc2="http://schemas.microsoft.com/office/powerpoint/2019/9/main/command">
+                <pc:docMk/>
+                <pc:sldMk cId="2152791164" sldId="299"/>
+                <pc2:cmMk id="{3829BBD7-E421-46CC-A525-A907974C5DE9}"/>
+              </pc2:cmMkLst>
+            </pc226:cmChg>
+          </p:ext>
+        </pc:extLst>
+      </pc:sldChg>
+      <pc:sldChg chg="modSp mod">
+        <pc:chgData name="Johanne Provençal" userId="91505ee1-49e7-4482-8c3c-80c96976f4a1" providerId="ADAL" clId="{9AD6BD95-5D03-4303-B8DC-CE5133A655B9}" dt="2025-03-31T15:35:16.756" v="5180" actId="207"/>
+        <pc:sldMkLst>
+          <pc:docMk/>
+          <pc:sldMk cId="2974737869" sldId="300"/>
+        </pc:sldMkLst>
+        <pc:spChg chg="mod">
+          <ac:chgData name="Johanne Provençal" userId="91505ee1-49e7-4482-8c3c-80c96976f4a1" providerId="ADAL" clId="{9AD6BD95-5D03-4303-B8DC-CE5133A655B9}" dt="2025-03-31T15:35:16.756" v="5180" actId="207"/>
+          <ac:spMkLst>
+            <pc:docMk/>
+            <pc:sldMk cId="2974737869" sldId="300"/>
+            <ac:spMk id="19" creationId="{795E566D-9B19-4429-817F-335B8C788DAE}"/>
+          </ac:spMkLst>
+        </pc:spChg>
+      </pc:sldChg>
+      <pc:sldChg chg="delSp modSp mod modCm">
+        <pc:chgData name="Johanne Provençal" userId="91505ee1-49e7-4482-8c3c-80c96976f4a1" providerId="ADAL" clId="{9AD6BD95-5D03-4303-B8DC-CE5133A655B9}" dt="2025-03-31T15:53:39.860" v="5723" actId="948"/>
+        <pc:sldMkLst>
+          <pc:docMk/>
+          <pc:sldMk cId="624593502" sldId="301"/>
+        </pc:sldMkLst>
+        <pc:spChg chg="mod">
+          <ac:chgData name="Johanne Provençal" userId="91505ee1-49e7-4482-8c3c-80c96976f4a1" providerId="ADAL" clId="{9AD6BD95-5D03-4303-B8DC-CE5133A655B9}" dt="2025-03-31T15:53:39.860" v="5723" actId="948"/>
+          <ac:spMkLst>
+            <pc:docMk/>
+            <pc:sldMk cId="624593502" sldId="301"/>
+            <ac:spMk id="19" creationId="{795E566D-9B19-4429-817F-335B8C788DAE}"/>
+          </ac:spMkLst>
+        </pc:spChg>
+        <pc:extLst>
+          <p:ext xmlns:p="http://schemas.openxmlformats.org/presentationml/2006/main" uri="{D6D511B9-2390-475A-947B-AFAB55BFBCF1}">
+            <pc226:cmChg xmlns:pc226="http://schemas.microsoft.com/office/powerpoint/2022/06/main/command" chg="mod">
+              <pc226:chgData name="Johanne Provençal" userId="91505ee1-49e7-4482-8c3c-80c96976f4a1" providerId="ADAL" clId="{9AD6BD95-5D03-4303-B8DC-CE5133A655B9}" dt="2025-03-31T15:48:56.736" v="5647" actId="20577"/>
+              <pc2:cmMkLst xmlns:pc2="http://schemas.microsoft.com/office/powerpoint/2019/9/main/command">
+                <pc:docMk/>
+                <pc:sldMk cId="624593502" sldId="301"/>
+                <pc2:cmMk id="{2B8D8B02-5B88-4CB4-8FD7-9A19EE23F076}"/>
+              </pc2:cmMkLst>
+            </pc226:cmChg>
+            <pc226:cmChg xmlns:pc226="http://schemas.microsoft.com/office/powerpoint/2022/06/main/command" chg="mod">
+              <pc226:chgData name="Johanne Provençal" userId="91505ee1-49e7-4482-8c3c-80c96976f4a1" providerId="ADAL" clId="{9AD6BD95-5D03-4303-B8DC-CE5133A655B9}" dt="2025-03-13T18:14:27.972" v="4959" actId="20577"/>
+              <pc2:cmMkLst xmlns:pc2="http://schemas.microsoft.com/office/powerpoint/2019/9/main/command">
+                <pc:docMk/>
+                <pc:sldMk cId="624593502" sldId="301"/>
+                <pc2:cmMk id="{F88EDD5C-A208-4CF2-A324-187D8230782E}"/>
+              </pc2:cmMkLst>
+            </pc226:cmChg>
+          </p:ext>
+        </pc:extLst>
+      </pc:sldChg>
+      <pc:sldChg chg="modSp mod">
+        <pc:chgData name="Johanne Provençal" userId="91505ee1-49e7-4482-8c3c-80c96976f4a1" providerId="ADAL" clId="{9AD6BD95-5D03-4303-B8DC-CE5133A655B9}" dt="2025-03-31T15:50:15.437" v="5661" actId="20577"/>
+        <pc:sldMkLst>
+          <pc:docMk/>
+          <pc:sldMk cId="1867261588" sldId="311"/>
+        </pc:sldMkLst>
+        <pc:spChg chg="mod">
+          <ac:chgData name="Johanne Provençal" userId="91505ee1-49e7-4482-8c3c-80c96976f4a1" providerId="ADAL" clId="{9AD6BD95-5D03-4303-B8DC-CE5133A655B9}" dt="2025-03-31T15:50:15.437" v="5661" actId="20577"/>
+          <ac:spMkLst>
+            <pc:docMk/>
+            <pc:sldMk cId="1867261588" sldId="311"/>
+            <ac:spMk id="19" creationId="{CB026A76-014A-9926-431A-782FCD6DA4A0}"/>
+          </ac:spMkLst>
+        </pc:spChg>
+        <pc:picChg chg="mod">
+          <ac:chgData name="Johanne Provençal" userId="91505ee1-49e7-4482-8c3c-80c96976f4a1" providerId="ADAL" clId="{9AD6BD95-5D03-4303-B8DC-CE5133A655B9}" dt="2025-03-31T15:50:04.488" v="5660" actId="1036"/>
+          <ac:picMkLst>
+            <pc:docMk/>
+            <pc:sldMk cId="1867261588" sldId="311"/>
+            <ac:picMk id="8" creationId="{CAB25ED1-5C30-39B4-204C-9F091F89902F}"/>
+          </ac:picMkLst>
+        </pc:picChg>
+      </pc:sldChg>
+      <pc:sldChg chg="modSp mod">
+        <pc:chgData name="Johanne Provençal" userId="91505ee1-49e7-4482-8c3c-80c96976f4a1" providerId="ADAL" clId="{9AD6BD95-5D03-4303-B8DC-CE5133A655B9}" dt="2025-03-06T14:06:06.347" v="4766" actId="20577"/>
+        <pc:sldMkLst>
+          <pc:docMk/>
+          <pc:sldMk cId="1408242251" sldId="312"/>
+        </pc:sldMkLst>
+        <pc:spChg chg="mod">
+          <ac:chgData name="Johanne Provençal" userId="91505ee1-49e7-4482-8c3c-80c96976f4a1" providerId="ADAL" clId="{9AD6BD95-5D03-4303-B8DC-CE5133A655B9}" dt="2025-03-06T14:06:06.347" v="4766" actId="20577"/>
+          <ac:spMkLst>
+            <pc:docMk/>
+            <pc:sldMk cId="1408242251" sldId="312"/>
+            <ac:spMk id="8" creationId="{7E295623-AEA4-CC95-5959-BE7418D26084}"/>
+          </ac:spMkLst>
+        </pc:spChg>
+      </pc:sldChg>
+      <pc:sldChg chg="modSp mod">
+        <pc:chgData name="Johanne Provençal" userId="91505ee1-49e7-4482-8c3c-80c96976f4a1" providerId="ADAL" clId="{9AD6BD95-5D03-4303-B8DC-CE5133A655B9}" dt="2025-03-13T18:18:11.992" v="5047" actId="122"/>
+        <pc:sldMkLst>
+          <pc:docMk/>
+          <pc:sldMk cId="3534518356" sldId="313"/>
+        </pc:sldMkLst>
+      </pc:sldChg>
+      <pc:sldChg chg="modSp mod">
+        <pc:chgData name="Johanne Provençal" userId="91505ee1-49e7-4482-8c3c-80c96976f4a1" providerId="ADAL" clId="{9AD6BD95-5D03-4303-B8DC-CE5133A655B9}" dt="2025-03-05T15:08:47.078" v="3110" actId="948"/>
+        <pc:sldMkLst>
+          <pc:docMk/>
+          <pc:sldMk cId="4114037885" sldId="314"/>
+        </pc:sldMkLst>
+        <pc:spChg chg="mod">
+          <ac:chgData name="Johanne Provençal" userId="91505ee1-49e7-4482-8c3c-80c96976f4a1" providerId="ADAL" clId="{9AD6BD95-5D03-4303-B8DC-CE5133A655B9}" dt="2025-03-05T15:08:47.078" v="3110" actId="948"/>
+          <ac:spMkLst>
+            <pc:docMk/>
+            <pc:sldMk cId="4114037885" sldId="314"/>
+            <ac:spMk id="19" creationId="{6FE0A756-D48D-FDB2-AB49-7E855271B461}"/>
+          </ac:spMkLst>
+        </pc:spChg>
+      </pc:sldChg>
+      <pc:sldChg chg="modSp mod">
+        <pc:chgData name="Johanne Provençal" userId="91505ee1-49e7-4482-8c3c-80c96976f4a1" providerId="ADAL" clId="{9AD6BD95-5D03-4303-B8DC-CE5133A655B9}" dt="2025-03-13T18:19:38.593" v="5102" actId="20577"/>
+        <pc:sldMkLst>
+          <pc:docMk/>
+          <pc:sldMk cId="3219435398" sldId="315"/>
+        </pc:sldMkLst>
+        <pc:spChg chg="mod">
+          <ac:chgData name="Johanne Provençal" userId="91505ee1-49e7-4482-8c3c-80c96976f4a1" providerId="ADAL" clId="{9AD6BD95-5D03-4303-B8DC-CE5133A655B9}" dt="2025-03-13T18:19:38.593" v="5102" actId="20577"/>
+          <ac:spMkLst>
+            <pc:docMk/>
+            <pc:sldMk cId="3219435398" sldId="315"/>
+            <ac:spMk id="19" creationId="{D0F4BF54-45CB-2DF6-4383-A2056DC25BEF}"/>
+          </ac:spMkLst>
+        </pc:spChg>
+      </pc:sldChg>
+      <pc:sldChg chg="modSp mod">
+        <pc:chgData name="Johanne Provençal" userId="91505ee1-49e7-4482-8c3c-80c96976f4a1" providerId="ADAL" clId="{9AD6BD95-5D03-4303-B8DC-CE5133A655B9}" dt="2025-03-13T18:21:08.830" v="5139" actId="20577"/>
+        <pc:sldMkLst>
+          <pc:docMk/>
+          <pc:sldMk cId="1375125008" sldId="316"/>
+        </pc:sldMkLst>
+        <pc:spChg chg="mod">
+          <ac:chgData name="Johanne Provençal" userId="91505ee1-49e7-4482-8c3c-80c96976f4a1" providerId="ADAL" clId="{9AD6BD95-5D03-4303-B8DC-CE5133A655B9}" dt="2025-03-13T18:21:08.830" v="5139" actId="20577"/>
+          <ac:spMkLst>
+            <pc:docMk/>
+            <pc:sldMk cId="1375125008" sldId="316"/>
+            <ac:spMk id="19" creationId="{807A597D-B1D3-E997-FDD3-58896A19DAED}"/>
+          </ac:spMkLst>
+        </pc:spChg>
+      </pc:sldChg>
+      <pc:sldChg chg="modSp del mod">
+        <pc:chgData name="Johanne Provençal" userId="91505ee1-49e7-4482-8c3c-80c96976f4a1" providerId="ADAL" clId="{9AD6BD95-5D03-4303-B8DC-CE5133A655B9}" dt="2025-03-06T14:03:58.681" v="4463" actId="2696"/>
+        <pc:sldMkLst>
+          <pc:docMk/>
+          <pc:sldMk cId="260664201" sldId="317"/>
+        </pc:sldMkLst>
+      </pc:sldChg>
+      <pc:sldChg chg="modSp mod modCm">
+        <pc:chgData name="Johanne Provençal" userId="91505ee1-49e7-4482-8c3c-80c96976f4a1" providerId="ADAL" clId="{9AD6BD95-5D03-4303-B8DC-CE5133A655B9}" dt="2025-03-31T15:46:56.781" v="5603" actId="207"/>
+        <pc:sldMkLst>
+          <pc:docMk/>
+          <pc:sldMk cId="873667192" sldId="318"/>
+        </pc:sldMkLst>
+        <pc:spChg chg="mod">
+          <ac:chgData name="Johanne Provençal" userId="91505ee1-49e7-4482-8c3c-80c96976f4a1" providerId="ADAL" clId="{9AD6BD95-5D03-4303-B8DC-CE5133A655B9}" dt="2025-03-31T15:46:56.781" v="5603" actId="207"/>
+          <ac:spMkLst>
+            <pc:docMk/>
+            <pc:sldMk cId="873667192" sldId="318"/>
+            <ac:spMk id="19" creationId="{84D2D941-155E-7765-5DB2-3BFE270DF2BF}"/>
+          </ac:spMkLst>
+        </pc:spChg>
+        <pc:extLst>
+          <p:ext xmlns:p="http://schemas.openxmlformats.org/presentationml/2006/main" uri="{D6D511B9-2390-475A-947B-AFAB55BFBCF1}">
+            <pc226:cmChg xmlns:pc226="http://schemas.microsoft.com/office/powerpoint/2022/06/main/command" chg="mod">
+              <pc226:chgData name="Johanne Provençal" userId="91505ee1-49e7-4482-8c3c-80c96976f4a1" providerId="ADAL" clId="{9AD6BD95-5D03-4303-B8DC-CE5133A655B9}" dt="2025-03-13T18:08:54.723" v="4784" actId="20577"/>
+              <pc2:cmMkLst xmlns:pc2="http://schemas.microsoft.com/office/powerpoint/2019/9/main/command">
+                <pc:docMk/>
+                <pc:sldMk cId="873667192" sldId="318"/>
+                <pc2:cmMk id="{2F1B5214-657B-4985-9949-8CD9772FECDC}"/>
+              </pc2:cmMkLst>
+            </pc226:cmChg>
+            <pc226:cmChg xmlns:pc226="http://schemas.microsoft.com/office/powerpoint/2022/06/main/command" chg="mod">
+              <pc226:chgData name="Johanne Provençal" userId="91505ee1-49e7-4482-8c3c-80c96976f4a1" providerId="ADAL" clId="{9AD6BD95-5D03-4303-B8DC-CE5133A655B9}" dt="2025-03-13T18:08:36.717" v="4769" actId="20577"/>
+              <pc2:cmMkLst xmlns:pc2="http://schemas.microsoft.com/office/powerpoint/2019/9/main/command">
+                <pc:docMk/>
+                <pc:sldMk cId="873667192" sldId="318"/>
+                <pc2:cmMk id="{43A53A19-E04F-42E0-A9E9-7976ABCCFBC3}"/>
+              </pc2:cmMkLst>
+            </pc226:cmChg>
+          </p:ext>
+        </pc:extLst>
+      </pc:sldChg>
+      <pc:sldChg chg="modSp mod modCm">
+        <pc:chgData name="Johanne Provençal" userId="91505ee1-49e7-4482-8c3c-80c96976f4a1" providerId="ADAL" clId="{9AD6BD95-5D03-4303-B8DC-CE5133A655B9}" dt="2025-03-31T15:36:09.833" v="5213" actId="20577"/>
+        <pc:sldMkLst>
+          <pc:docMk/>
+          <pc:sldMk cId="327756674" sldId="319"/>
+        </pc:sldMkLst>
+        <pc:spChg chg="mod">
+          <ac:chgData name="Johanne Provençal" userId="91505ee1-49e7-4482-8c3c-80c96976f4a1" providerId="ADAL" clId="{9AD6BD95-5D03-4303-B8DC-CE5133A655B9}" dt="2025-03-31T15:36:09.833" v="5213" actId="20577"/>
+          <ac:spMkLst>
+            <pc:docMk/>
+            <pc:sldMk cId="327756674" sldId="319"/>
+            <ac:spMk id="19" creationId="{9636EA13-002A-BF1B-CCF1-95264E5A4E74}"/>
+          </ac:spMkLst>
+        </pc:spChg>
+        <pc:extLst>
+          <p:ext xmlns:p="http://schemas.openxmlformats.org/presentationml/2006/main" uri="{D6D511B9-2390-475A-947B-AFAB55BFBCF1}">
+            <pc226:cmChg xmlns:pc226="http://schemas.microsoft.com/office/powerpoint/2022/06/main/command" chg="mod">
+              <pc226:chgData name="Johanne Provençal" userId="91505ee1-49e7-4482-8c3c-80c96976f4a1" providerId="ADAL" clId="{9AD6BD95-5D03-4303-B8DC-CE5133A655B9}" dt="2025-03-31T15:36:09.833" v="5213" actId="20577"/>
+              <pc2:cmMkLst xmlns:pc2="http://schemas.microsoft.com/office/powerpoint/2019/9/main/command">
+                <pc:docMk/>
+                <pc:sldMk cId="327756674" sldId="319"/>
+                <pc2:cmMk id="{9BAEEE8B-D02E-4295-AD60-CFE35EBBEA75}"/>
+              </pc2:cmMkLst>
+            </pc226:cmChg>
+            <pc226:cmChg xmlns:pc226="http://schemas.microsoft.com/office/powerpoint/2022/06/main/command" chg="mod">
+              <pc226:chgData name="Johanne Provençal" userId="91505ee1-49e7-4482-8c3c-80c96976f4a1" providerId="ADAL" clId="{9AD6BD95-5D03-4303-B8DC-CE5133A655B9}" dt="2025-03-31T15:35:39.738" v="5185" actId="20577"/>
+              <pc2:cmMkLst xmlns:pc2="http://schemas.microsoft.com/office/powerpoint/2019/9/main/command">
+                <pc:docMk/>
+                <pc:sldMk cId="327756674" sldId="319"/>
+                <pc2:cmMk id="{E8520F96-3F83-4522-83AA-A01BF0D6AFA1}"/>
+              </pc2:cmMkLst>
+            </pc226:cmChg>
+          </p:ext>
+        </pc:extLst>
+      </pc:sldChg>
+      <pc:sldChg chg="modSp mod modCm">
+        <pc:chgData name="Johanne Provençal" userId="91505ee1-49e7-4482-8c3c-80c96976f4a1" providerId="ADAL" clId="{9AD6BD95-5D03-4303-B8DC-CE5133A655B9}" dt="2025-03-31T15:41:08.175" v="5531" actId="115"/>
+        <pc:sldMkLst>
+          <pc:docMk/>
+          <pc:sldMk cId="4231658747" sldId="320"/>
+        </pc:sldMkLst>
+        <pc:spChg chg="mod">
+          <ac:chgData name="Johanne Provençal" userId="91505ee1-49e7-4482-8c3c-80c96976f4a1" providerId="ADAL" clId="{9AD6BD95-5D03-4303-B8DC-CE5133A655B9}" dt="2025-03-31T15:41:08.175" v="5531" actId="115"/>
+          <ac:spMkLst>
+            <pc:docMk/>
+            <pc:sldMk cId="4231658747" sldId="320"/>
+            <ac:spMk id="19" creationId="{23904B80-4C3E-3ABD-F824-BCFAA3484CDA}"/>
+          </ac:spMkLst>
+        </pc:spChg>
+        <pc:extLst>
+          <p:ext xmlns:p="http://schemas.openxmlformats.org/presentationml/2006/main" uri="{D6D511B9-2390-475A-947B-AFAB55BFBCF1}">
+            <pc226:cmChg xmlns:pc226="http://schemas.microsoft.com/office/powerpoint/2022/06/main/command" chg="mod">
+              <pc226:chgData name="Johanne Provençal" userId="91505ee1-49e7-4482-8c3c-80c96976f4a1" providerId="ADAL" clId="{9AD6BD95-5D03-4303-B8DC-CE5133A655B9}" dt="2025-03-31T15:36:53.622" v="5220" actId="20577"/>
+              <pc2:cmMkLst xmlns:pc2="http://schemas.microsoft.com/office/powerpoint/2019/9/main/command">
+                <pc:docMk/>
+                <pc:sldMk cId="4231658747" sldId="320"/>
+                <pc2:cmMk id="{4809C169-EADB-4817-A9AE-B27B7EE0C01B}"/>
+              </pc2:cmMkLst>
+            </pc226:cmChg>
+            <pc226:cmChg xmlns:pc226="http://schemas.microsoft.com/office/powerpoint/2022/06/main/command" chg="mod">
+              <pc226:chgData name="Johanne Provençal" userId="91505ee1-49e7-4482-8c3c-80c96976f4a1" providerId="ADAL" clId="{9AD6BD95-5D03-4303-B8DC-CE5133A655B9}" dt="2025-03-31T15:40:40.654" v="5527" actId="20577"/>
+              <pc2:cmMkLst xmlns:pc2="http://schemas.microsoft.com/office/powerpoint/2019/9/main/command">
+                <pc:docMk/>
+                <pc:sldMk cId="4231658747" sldId="320"/>
+                <pc2:cmMk id="{30CFACEC-15F2-4956-A25D-92291E704265}"/>
+              </pc2:cmMkLst>
+            </pc226:cmChg>
+          </p:ext>
+        </pc:extLst>
+      </pc:sldChg>
+      <pc:sldChg chg="modSp mod ord modCm">
+        <pc:chgData name="Johanne Provençal" userId="91505ee1-49e7-4482-8c3c-80c96976f4a1" providerId="ADAL" clId="{9AD6BD95-5D03-4303-B8DC-CE5133A655B9}" dt="2025-03-13T18:24:40.353" v="5175" actId="207"/>
+        <pc:sldMkLst>
+          <pc:docMk/>
+          <pc:sldMk cId="3675876903" sldId="321"/>
+        </pc:sldMkLst>
+        <pc:spChg chg="mod">
+          <ac:chgData name="Johanne Provençal" userId="91505ee1-49e7-4482-8c3c-80c96976f4a1" providerId="ADAL" clId="{9AD6BD95-5D03-4303-B8DC-CE5133A655B9}" dt="2025-03-13T18:24:40.353" v="5175" actId="207"/>
+          <ac:spMkLst>
+            <pc:docMk/>
+            <pc:sldMk cId="3675876903" sldId="321"/>
+            <ac:spMk id="19" creationId="{3CBF1FA5-EB18-BF41-63B7-E0CABB3E5FA6}"/>
+          </ac:spMkLst>
+        </pc:spChg>
+        <pc:extLst>
+          <p:ext xmlns:p="http://schemas.openxmlformats.org/presentationml/2006/main" uri="{D6D511B9-2390-475A-947B-AFAB55BFBCF1}">
+            <pc226:cmChg xmlns:pc226="http://schemas.microsoft.com/office/powerpoint/2022/06/main/command" chg="mod">
+              <pc226:chgData name="Johanne Provençal" userId="91505ee1-49e7-4482-8c3c-80c96976f4a1" providerId="ADAL" clId="{9AD6BD95-5D03-4303-B8DC-CE5133A655B9}" dt="2025-03-13T18:21:52.122" v="5143"/>
+              <pc2:cmMkLst xmlns:pc2="http://schemas.microsoft.com/office/powerpoint/2019/9/main/command">
+                <pc:docMk/>
+                <pc:sldMk cId="3675876903" sldId="321"/>
+                <pc2:cmMk id="{D6EC9BFB-5D0D-42C5-9E52-5D83747E3296}"/>
+              </pc2:cmMkLst>
+            </pc226:cmChg>
+          </p:ext>
+        </pc:extLst>
+      </pc:sldChg>
+      <pc:sldChg chg="modSp add mod modCm">
+        <pc:chgData name="Johanne Provençal" userId="91505ee1-49e7-4482-8c3c-80c96976f4a1" providerId="ADAL" clId="{9AD6BD95-5D03-4303-B8DC-CE5133A655B9}" dt="2025-03-31T15:59:10.730" v="5955" actId="20577"/>
+        <pc:sldMkLst>
+          <pc:docMk/>
+          <pc:sldMk cId="1400896264" sldId="322"/>
+        </pc:sldMkLst>
+        <pc:spChg chg="mod">
+          <ac:chgData name="Johanne Provençal" userId="91505ee1-49e7-4482-8c3c-80c96976f4a1" providerId="ADAL" clId="{9AD6BD95-5D03-4303-B8DC-CE5133A655B9}" dt="2025-03-31T15:59:10.730" v="5955" actId="20577"/>
+          <ac:spMkLst>
+            <pc:docMk/>
+            <pc:sldMk cId="1400896264" sldId="322"/>
+            <ac:spMk id="8" creationId="{695286E5-9AAD-0C63-139E-AAEBA5866873}"/>
+          </ac:spMkLst>
+        </pc:spChg>
+        <pc:extLst>
+          <p:ext xmlns:p="http://schemas.openxmlformats.org/presentationml/2006/main" uri="{D6D511B9-2390-475A-947B-AFAB55BFBCF1}">
+            <pc226:cmChg xmlns:pc226="http://schemas.microsoft.com/office/powerpoint/2022/06/main/command" chg="mod">
+              <pc226:chgData name="Johanne Provençal" userId="91505ee1-49e7-4482-8c3c-80c96976f4a1" providerId="ADAL" clId="{9AD6BD95-5D03-4303-B8DC-CE5133A655B9}" dt="2025-03-31T15:59:10.730" v="5955" actId="20577"/>
+              <pc2:cmMkLst xmlns:pc2="http://schemas.microsoft.com/office/powerpoint/2019/9/main/command">
+                <pc:docMk/>
+                <pc:sldMk cId="1400896264" sldId="322"/>
+                <pc2:cmMk id="{27C5F034-B889-423A-921A-F645B1F0F006}"/>
+              </pc2:cmMkLst>
+            </pc226:cmChg>
+          </p:ext>
+        </pc:extLst>
+      </pc:sldChg>
+    </pc:docChg>
+  </pc:docChgLst>
+  <pc:docChgLst>
+    <pc:chgData name="Johanne Provençal" userId="S::johanne.provencal@crdcn.ca::91505ee1-49e7-4482-8c3c-80c96976f4a1" providerId="AD" clId="Web-{D453373C-409F-DE19-374D-BAAC70E4AE07}"/>
+    <pc:docChg chg="modSld">
+      <pc:chgData name="Johanne Provençal" userId="S::johanne.provencal@crdcn.ca::91505ee1-49e7-4482-8c3c-80c96976f4a1" providerId="AD" clId="Web-{D453373C-409F-DE19-374D-BAAC70E4AE07}" dt="2025-02-27T17:19:57.674" v="31" actId="20577"/>
+      <pc:docMkLst>
+        <pc:docMk/>
+      </pc:docMkLst>
+      <pc:sldChg chg="modSp">
+        <pc:chgData name="Johanne Provençal" userId="S::johanne.provencal@crdcn.ca::91505ee1-49e7-4482-8c3c-80c96976f4a1" providerId="AD" clId="Web-{D453373C-409F-DE19-374D-BAAC70E4AE07}" dt="2025-02-27T17:19:57.674" v="31" actId="20577"/>
+        <pc:sldMkLst>
+          <pc:docMk/>
+          <pc:sldMk cId="4114037885" sldId="314"/>
+        </pc:sldMkLst>
+        <pc:spChg chg="mod">
+          <ac:chgData name="Johanne Provençal" userId="S::johanne.provencal@crdcn.ca::91505ee1-49e7-4482-8c3c-80c96976f4a1" providerId="AD" clId="Web-{D453373C-409F-DE19-374D-BAAC70E4AE07}" dt="2025-02-27T17:19:57.674" v="31" actId="20577"/>
+          <ac:spMkLst>
+            <pc:docMk/>
+            <pc:sldMk cId="4114037885" sldId="314"/>
+            <ac:spMk id="19" creationId="{6FE0A756-D48D-FDB2-AB49-7E855271B461}"/>
+          </ac:spMkLst>
+        </pc:spChg>
+      </pc:sldChg>
+    </pc:docChg>
+  </pc:docChgLst>
+  <pc:docChgLst>
+    <pc:chgData name="Johanne Provençal" userId="91505ee1-49e7-4482-8c3c-80c96976f4a1" providerId="ADAL" clId="{C57D572C-E096-4C98-B414-31433A8D4C4C}"/>
+    <pc:docChg chg="undo redo custSel addSld delSld modSld sldOrd">
+      <pc:chgData name="Johanne Provençal" userId="91505ee1-49e7-4482-8c3c-80c96976f4a1" providerId="ADAL" clId="{C57D572C-E096-4C98-B414-31433A8D4C4C}" dt="2025-02-27T18:31:08.951" v="11204" actId="20577"/>
+      <pc:docMkLst>
+        <pc:docMk/>
+      </pc:docMkLst>
+      <pc:sldChg chg="modSp mod">
+        <pc:chgData name="Johanne Provençal" userId="91505ee1-49e7-4482-8c3c-80c96976f4a1" providerId="ADAL" clId="{C57D572C-E096-4C98-B414-31433A8D4C4C}" dt="2025-02-25T15:55:45.869" v="864" actId="20577"/>
+        <pc:sldMkLst>
+          <pc:docMk/>
+          <pc:sldMk cId="723683264" sldId="266"/>
+        </pc:sldMkLst>
+        <pc:spChg chg="mod">
+          <ac:chgData name="Johanne Provençal" userId="91505ee1-49e7-4482-8c3c-80c96976f4a1" providerId="ADAL" clId="{C57D572C-E096-4C98-B414-31433A8D4C4C}" dt="2025-02-25T15:55:45.869" v="864" actId="20577"/>
+          <ac:spMkLst>
+            <pc:docMk/>
+            <pc:sldMk cId="723683264" sldId="266"/>
+            <ac:spMk id="8" creationId="{00000000-0000-0000-0000-000000000000}"/>
+          </ac:spMkLst>
+        </pc:spChg>
+      </pc:sldChg>
+      <pc:sldChg chg="del">
+        <pc:chgData name="Johanne Provençal" userId="91505ee1-49e7-4482-8c3c-80c96976f4a1" providerId="ADAL" clId="{C57D572C-E096-4C98-B414-31433A8D4C4C}" dt="2025-02-25T21:43:42.773" v="4871" actId="2696"/>
+        <pc:sldMkLst>
+          <pc:docMk/>
+          <pc:sldMk cId="59341068" sldId="284"/>
+        </pc:sldMkLst>
+      </pc:sldChg>
+      <pc:sldChg chg="modSp mod ord">
+        <pc:chgData name="Johanne Provençal" userId="91505ee1-49e7-4482-8c3c-80c96976f4a1" providerId="ADAL" clId="{C57D572C-E096-4C98-B414-31433A8D4C4C}" dt="2025-02-27T17:12:34.971" v="8018" actId="113"/>
+        <pc:sldMkLst>
+          <pc:docMk/>
+          <pc:sldMk cId="1888437868" sldId="298"/>
+        </pc:sldMkLst>
+        <pc:spChg chg="mod">
+          <ac:chgData name="Johanne Provençal" userId="91505ee1-49e7-4482-8c3c-80c96976f4a1" providerId="ADAL" clId="{C57D572C-E096-4C98-B414-31433A8D4C4C}" dt="2025-02-25T16:42:59.240" v="4010" actId="1036"/>
+          <ac:spMkLst>
+            <pc:docMk/>
+            <pc:sldMk cId="1888437868" sldId="298"/>
+            <ac:spMk id="19" creationId="{795E566D-9B19-4429-817F-335B8C788DAE}"/>
+          </ac:spMkLst>
+        </pc:spChg>
+        <pc:graphicFrameChg chg="mod modGraphic">
+          <ac:chgData name="Johanne Provençal" userId="91505ee1-49e7-4482-8c3c-80c96976f4a1" providerId="ADAL" clId="{C57D572C-E096-4C98-B414-31433A8D4C4C}" dt="2025-02-27T17:12:26.915" v="8017" actId="113"/>
+          <ac:graphicFrameMkLst>
+            <pc:docMk/>
+            <pc:sldMk cId="1888437868" sldId="298"/>
+            <ac:graphicFrameMk id="3" creationId="{B23FC19A-97CB-48DF-A09A-4AB3DF2FB449}"/>
+          </ac:graphicFrameMkLst>
+        </pc:graphicFrameChg>
+        <pc:graphicFrameChg chg="mod modGraphic">
+          <ac:chgData name="Johanne Provençal" userId="91505ee1-49e7-4482-8c3c-80c96976f4a1" providerId="ADAL" clId="{C57D572C-E096-4C98-B414-31433A8D4C4C}" dt="2025-02-27T17:12:34.971" v="8018" actId="113"/>
+          <ac:graphicFrameMkLst>
+            <pc:docMk/>
+            <pc:sldMk cId="1888437868" sldId="298"/>
+            <ac:graphicFrameMk id="5" creationId="{02A390DA-F508-4CB6-BB57-EDCD3201A54F}"/>
+          </ac:graphicFrameMkLst>
+        </pc:graphicFrameChg>
+      </pc:sldChg>
+      <pc:sldChg chg="modSp mod ord">
+        <pc:chgData name="Johanne Provençal" userId="91505ee1-49e7-4482-8c3c-80c96976f4a1" providerId="ADAL" clId="{C57D572C-E096-4C98-B414-31433A8D4C4C}" dt="2025-02-27T17:12:03.212" v="8016" actId="20577"/>
+        <pc:sldMkLst>
+          <pc:docMk/>
+          <pc:sldMk cId="2152791164" sldId="299"/>
+        </pc:sldMkLst>
+        <pc:spChg chg="mod">
+          <ac:chgData name="Johanne Provençal" userId="91505ee1-49e7-4482-8c3c-80c96976f4a1" providerId="ADAL" clId="{C57D572C-E096-4C98-B414-31433A8D4C4C}" dt="2025-02-27T17:12:03.212" v="8016" actId="20577"/>
+          <ac:spMkLst>
+            <pc:docMk/>
+            <pc:sldMk cId="2152791164" sldId="299"/>
+            <ac:spMk id="19" creationId="{795E566D-9B19-4429-817F-335B8C788DAE}"/>
+          </ac:spMkLst>
+        </pc:spChg>
+      </pc:sldChg>
+      <pc:sldChg chg="modSp mod">
+        <pc:chgData name="Johanne Provençal" userId="91505ee1-49e7-4482-8c3c-80c96976f4a1" providerId="ADAL" clId="{C57D572C-E096-4C98-B414-31433A8D4C4C}" dt="2025-02-27T18:18:49.410" v="10922" actId="20577"/>
+        <pc:sldMkLst>
+          <pc:docMk/>
+          <pc:sldMk cId="2974737869" sldId="300"/>
+        </pc:sldMkLst>
+        <pc:spChg chg="mod">
+          <ac:chgData name="Johanne Provençal" userId="91505ee1-49e7-4482-8c3c-80c96976f4a1" providerId="ADAL" clId="{C57D572C-E096-4C98-B414-31433A8D4C4C}" dt="2025-02-27T18:18:49.410" v="10922" actId="20577"/>
+          <ac:spMkLst>
+            <pc:docMk/>
+            <pc:sldMk cId="2974737869" sldId="300"/>
+            <ac:spMk id="19" creationId="{795E566D-9B19-4429-817F-335B8C788DAE}"/>
+          </ac:spMkLst>
+        </pc:spChg>
+      </pc:sldChg>
+      <pc:sldChg chg="modSp mod ord">
+        <pc:chgData name="Johanne Provençal" userId="91505ee1-49e7-4482-8c3c-80c96976f4a1" providerId="ADAL" clId="{C57D572C-E096-4C98-B414-31433A8D4C4C}" dt="2025-02-27T18:23:47.050" v="11003" actId="207"/>
+        <pc:sldMkLst>
+          <pc:docMk/>
+          <pc:sldMk cId="624593502" sldId="301"/>
+        </pc:sldMkLst>
+        <pc:spChg chg="mod">
+          <ac:chgData name="Johanne Provençal" userId="91505ee1-49e7-4482-8c3c-80c96976f4a1" providerId="ADAL" clId="{C57D572C-E096-4C98-B414-31433A8D4C4C}" dt="2025-02-27T18:23:47.050" v="11003" actId="207"/>
+          <ac:spMkLst>
+            <pc:docMk/>
+            <pc:sldMk cId="624593502" sldId="301"/>
+            <ac:spMk id="19" creationId="{795E566D-9B19-4429-817F-335B8C788DAE}"/>
+          </ac:spMkLst>
+        </pc:spChg>
+      </pc:sldChg>
+      <pc:sldChg chg="del">
+        <pc:chgData name="Johanne Provençal" userId="91505ee1-49e7-4482-8c3c-80c96976f4a1" providerId="ADAL" clId="{C57D572C-E096-4C98-B414-31433A8D4C4C}" dt="2025-02-25T16:44:37.445" v="4020" actId="2696"/>
+        <pc:sldMkLst>
+          <pc:docMk/>
+          <pc:sldMk cId="657576504" sldId="310"/>
+        </pc:sldMkLst>
+      </pc:sldChg>
+      <pc:sldChg chg="modSp mod ord">
+        <pc:chgData name="Johanne Provençal" userId="91505ee1-49e7-4482-8c3c-80c96976f4a1" providerId="ADAL" clId="{C57D572C-E096-4C98-B414-31433A8D4C4C}" dt="2025-02-27T17:09:32.931" v="7777" actId="13926"/>
+        <pc:sldMkLst>
+          <pc:docMk/>
+          <pc:sldMk cId="1867261588" sldId="311"/>
+        </pc:sldMkLst>
+        <pc:spChg chg="mod">
+          <ac:chgData name="Johanne Provençal" userId="91505ee1-49e7-4482-8c3c-80c96976f4a1" providerId="ADAL" clId="{C57D572C-E096-4C98-B414-31433A8D4C4C}" dt="2025-02-27T17:09:32.931" v="7777" actId="13926"/>
+          <ac:spMkLst>
+            <pc:docMk/>
+            <pc:sldMk cId="1867261588" sldId="311"/>
+            <ac:spMk id="19" creationId="{CB026A76-014A-9926-431A-782FCD6DA4A0}"/>
+          </ac:spMkLst>
+        </pc:spChg>
+      </pc:sldChg>
+      <pc:sldChg chg="modSp add mod">
+        <pc:chgData name="Johanne Provençal" userId="91505ee1-49e7-4482-8c3c-80c96976f4a1" providerId="ADAL" clId="{C57D572C-E096-4C98-B414-31433A8D4C4C}" dt="2025-02-25T16:57:36.375" v="4828" actId="14100"/>
+        <pc:sldMkLst>
+          <pc:docMk/>
+          <pc:sldMk cId="1408242251" sldId="312"/>
+        </pc:sldMkLst>
+        <pc:spChg chg="mod">
+          <ac:chgData name="Johanne Provençal" userId="91505ee1-49e7-4482-8c3c-80c96976f4a1" providerId="ADAL" clId="{C57D572C-E096-4C98-B414-31433A8D4C4C}" dt="2025-02-25T16:57:36.375" v="4828" actId="14100"/>
+          <ac:spMkLst>
+            <pc:docMk/>
+            <pc:sldMk cId="1408242251" sldId="312"/>
+            <ac:spMk id="8" creationId="{7E295623-AEA4-CC95-5959-BE7418D26084}"/>
+          </ac:spMkLst>
+        </pc:spChg>
+      </pc:sldChg>
+      <pc:sldChg chg="modSp add del mod">
+        <pc:chgData name="Johanne Provençal" userId="91505ee1-49e7-4482-8c3c-80c96976f4a1" providerId="ADAL" clId="{C57D572C-E096-4C98-B414-31433A8D4C4C}" dt="2025-02-25T15:56:16.121" v="867" actId="2696"/>
+        <pc:sldMkLst>
+          <pc:docMk/>
+          <pc:sldMk cId="2026054091" sldId="313"/>
+        </pc:sldMkLst>
+      </pc:sldChg>
+      <pc:sldChg chg="modSp add mod">
+        <pc:chgData name="Johanne Provençal" userId="91505ee1-49e7-4482-8c3c-80c96976f4a1" providerId="ADAL" clId="{C57D572C-E096-4C98-B414-31433A8D4C4C}" dt="2025-02-25T21:54:14.164" v="5252" actId="14100"/>
+        <pc:sldMkLst>
+          <pc:docMk/>
+          <pc:sldMk cId="3534518356" sldId="313"/>
+        </pc:sldMkLst>
+      </pc:sldChg>
+      <pc:sldChg chg="modSp add mod">
+        <pc:chgData name="Johanne Provençal" userId="91505ee1-49e7-4482-8c3c-80c96976f4a1" providerId="ADAL" clId="{C57D572C-E096-4C98-B414-31433A8D4C4C}" dt="2025-02-27T18:25:01.959" v="11018" actId="948"/>
+        <pc:sldMkLst>
+          <pc:docMk/>
+          <pc:sldMk cId="4114037885" sldId="314"/>
+        </pc:sldMkLst>
+        <pc:spChg chg="mod">
+          <ac:chgData name="Johanne Provençal" userId="91505ee1-49e7-4482-8c3c-80c96976f4a1" providerId="ADAL" clId="{C57D572C-E096-4C98-B414-31433A8D4C4C}" dt="2025-02-27T18:25:01.959" v="11018" actId="948"/>
+          <ac:spMkLst>
+            <pc:docMk/>
+            <pc:sldMk cId="4114037885" sldId="314"/>
+            <ac:spMk id="19" creationId="{6FE0A756-D48D-FDB2-AB49-7E855271B461}"/>
+          </ac:spMkLst>
+        </pc:spChg>
+      </pc:sldChg>
+      <pc:sldChg chg="modSp add mod">
+        <pc:chgData name="Johanne Provençal" userId="91505ee1-49e7-4482-8c3c-80c96976f4a1" providerId="ADAL" clId="{C57D572C-E096-4C98-B414-31433A8D4C4C}" dt="2025-02-27T18:28:17.112" v="11112" actId="20577"/>
+        <pc:sldMkLst>
+          <pc:docMk/>
+          <pc:sldMk cId="3219435398" sldId="315"/>
+        </pc:sldMkLst>
+        <pc:spChg chg="mod">
+          <ac:chgData name="Johanne Provençal" userId="91505ee1-49e7-4482-8c3c-80c96976f4a1" providerId="ADAL" clId="{C57D572C-E096-4C98-B414-31433A8D4C4C}" dt="2025-02-27T18:28:17.112" v="11112" actId="20577"/>
+          <ac:spMkLst>
+            <pc:docMk/>
+            <pc:sldMk cId="3219435398" sldId="315"/>
+            <ac:spMk id="19" creationId="{D0F4BF54-45CB-2DF6-4383-A2056DC25BEF}"/>
+          </ac:spMkLst>
+        </pc:spChg>
+      </pc:sldChg>
+      <pc:sldChg chg="modSp add mod">
+        <pc:chgData name="Johanne Provençal" userId="91505ee1-49e7-4482-8c3c-80c96976f4a1" providerId="ADAL" clId="{C57D572C-E096-4C98-B414-31433A8D4C4C}" dt="2025-02-27T18:31:08.951" v="11204" actId="20577"/>
+        <pc:sldMkLst>
+          <pc:docMk/>
+          <pc:sldMk cId="1375125008" sldId="316"/>
+        </pc:sldMkLst>
+        <pc:spChg chg="mod">
+          <ac:chgData name="Johanne Provençal" userId="91505ee1-49e7-4482-8c3c-80c96976f4a1" providerId="ADAL" clId="{C57D572C-E096-4C98-B414-31433A8D4C4C}" dt="2025-02-27T18:31:08.951" v="11204" actId="20577"/>
+          <ac:spMkLst>
+            <pc:docMk/>
+            <pc:sldMk cId="1375125008" sldId="316"/>
+            <ac:spMk id="19" creationId="{807A597D-B1D3-E997-FDD3-58896A19DAED}"/>
+          </ac:spMkLst>
+        </pc:spChg>
+      </pc:sldChg>
+      <pc:sldChg chg="modSp add mod">
+        <pc:chgData name="Johanne Provençal" userId="91505ee1-49e7-4482-8c3c-80c96976f4a1" providerId="ADAL" clId="{C57D572C-E096-4C98-B414-31433A8D4C4C}" dt="2025-02-27T17:13:31.802" v="8027" actId="13926"/>
+        <pc:sldMkLst>
+          <pc:docMk/>
+          <pc:sldMk cId="260664201" sldId="317"/>
+        </pc:sldMkLst>
+      </pc:sldChg>
+      <pc:sldChg chg="modSp add del mod ord">
+        <pc:chgData name="Johanne Provençal" userId="91505ee1-49e7-4482-8c3c-80c96976f4a1" providerId="ADAL" clId="{C57D572C-E096-4C98-B414-31433A8D4C4C}" dt="2025-02-27T17:05:20.696" v="7414"/>
+        <pc:sldMkLst>
+          <pc:docMk/>
+          <pc:sldMk cId="873667192" sldId="318"/>
+        </pc:sldMkLst>
+        <pc:spChg chg="mod">
+          <ac:chgData name="Johanne Provençal" userId="91505ee1-49e7-4482-8c3c-80c96976f4a1" providerId="ADAL" clId="{C57D572C-E096-4C98-B414-31433A8D4C4C}" dt="2025-02-27T17:04:56.401" v="7412" actId="948"/>
+          <ac:spMkLst>
+            <pc:docMk/>
+            <pc:sldMk cId="873667192" sldId="318"/>
+            <ac:spMk id="19" creationId="{84D2D941-155E-7765-5DB2-3BFE270DF2BF}"/>
+          </ac:spMkLst>
+        </pc:spChg>
+      </pc:sldChg>
+      <pc:sldChg chg="modSp add mod">
+        <pc:chgData name="Johanne Provençal" userId="91505ee1-49e7-4482-8c3c-80c96976f4a1" providerId="ADAL" clId="{C57D572C-E096-4C98-B414-31433A8D4C4C}" dt="2025-02-27T17:45:57.502" v="9626" actId="20577"/>
+        <pc:sldMkLst>
+          <pc:docMk/>
+          <pc:sldMk cId="327756674" sldId="319"/>
+        </pc:sldMkLst>
+        <pc:spChg chg="mod">
+          <ac:chgData name="Johanne Provençal" userId="91505ee1-49e7-4482-8c3c-80c96976f4a1" providerId="ADAL" clId="{C57D572C-E096-4C98-B414-31433A8D4C4C}" dt="2025-02-27T17:45:57.502" v="9626" actId="20577"/>
+          <ac:spMkLst>
+            <pc:docMk/>
+            <pc:sldMk cId="327756674" sldId="319"/>
+            <ac:spMk id="19" creationId="{9636EA13-002A-BF1B-CCF1-95264E5A4E74}"/>
+          </ac:spMkLst>
+        </pc:spChg>
+      </pc:sldChg>
+      <pc:sldChg chg="modSp add mod ord">
+        <pc:chgData name="Johanne Provençal" userId="91505ee1-49e7-4482-8c3c-80c96976f4a1" providerId="ADAL" clId="{C57D572C-E096-4C98-B414-31433A8D4C4C}" dt="2025-02-27T17:50:40.869" v="10033" actId="113"/>
+        <pc:sldMkLst>
+          <pc:docMk/>
+          <pc:sldMk cId="4231658747" sldId="320"/>
+        </pc:sldMkLst>
+        <pc:spChg chg="mod">
+          <ac:chgData name="Johanne Provençal" userId="91505ee1-49e7-4482-8c3c-80c96976f4a1" providerId="ADAL" clId="{C57D572C-E096-4C98-B414-31433A8D4C4C}" dt="2025-02-27T17:50:40.869" v="10033" actId="113"/>
+          <ac:spMkLst>
+            <pc:docMk/>
+            <pc:sldMk cId="4231658747" sldId="320"/>
+            <ac:spMk id="19" creationId="{23904B80-4C3E-3ABD-F824-BCFAA3484CDA}"/>
+          </ac:spMkLst>
+        </pc:spChg>
+      </pc:sldChg>
+    </pc:docChg>
+  </pc:docChgLst>
+  <pc:docChgLst>
+    <pc:chgData name="Natalie Harrower" userId="S::natalie.harrower@crdcn.ca::e53cfc70-a269-4ad5-8da5-0483a3863770" providerId="AD" clId="Web-{C40C32B7-D353-BDB6-4FF2-985F27B26937}"/>
+    <pc:docChg chg="mod">
+      <pc:chgData name="Natalie Harrower" userId="S::natalie.harrower@crdcn.ca::e53cfc70-a269-4ad5-8da5-0483a3863770" providerId="AD" clId="Web-{C40C32B7-D353-BDB6-4FF2-985F27B26937}" dt="2025-03-11T18:19:40.440" v="0"/>
+      <pc:docMkLst>
+        <pc:docMk/>
+      </pc:docMkLst>
+    </pc:docChg>
+  </pc:docChgLst>
+  <pc:docChgLst>
+    <pc:chgData name="Johanne Provençal" userId="91505ee1-49e7-4482-8c3c-80c96976f4a1" providerId="ADAL" clId="{69D2FBB1-8D2B-4E25-BB9F-7839E62F21A4}"/>
+    <pc:docChg chg="custSel addSld delSld modSld sldOrd">
+      <pc:chgData name="Johanne Provençal" userId="91505ee1-49e7-4482-8c3c-80c96976f4a1" providerId="ADAL" clId="{69D2FBB1-8D2B-4E25-BB9F-7839E62F21A4}" dt="2025-06-15T21:06:22.431" v="1941" actId="20577"/>
+      <pc:docMkLst>
+        <pc:docMk/>
+      </pc:docMkLst>
+      <pc:sldChg chg="modSp mod">
+        <pc:chgData name="Johanne Provençal" userId="91505ee1-49e7-4482-8c3c-80c96976f4a1" providerId="ADAL" clId="{69D2FBB1-8D2B-4E25-BB9F-7839E62F21A4}" dt="2025-06-15T21:06:13.372" v="1939" actId="13926"/>
+        <pc:sldMkLst>
+          <pc:docMk/>
+          <pc:sldMk cId="3367948393" sldId="273"/>
+        </pc:sldMkLst>
+        <pc:spChg chg="mod">
+          <ac:chgData name="Johanne Provençal" userId="91505ee1-49e7-4482-8c3c-80c96976f4a1" providerId="ADAL" clId="{69D2FBB1-8D2B-4E25-BB9F-7839E62F21A4}" dt="2025-06-15T21:06:13.372" v="1939" actId="13926"/>
+          <ac:spMkLst>
+            <pc:docMk/>
+            <pc:sldMk cId="3367948393" sldId="273"/>
+            <ac:spMk id="35" creationId="{34123E5D-9ACC-29AE-80DC-65B514A4E808}"/>
+          </ac:spMkLst>
+        </pc:spChg>
+      </pc:sldChg>
+      <pc:sldChg chg="modSp del mod">
+        <pc:chgData name="Johanne Provençal" userId="91505ee1-49e7-4482-8c3c-80c96976f4a1" providerId="ADAL" clId="{69D2FBB1-8D2B-4E25-BB9F-7839E62F21A4}" dt="2025-05-02T14:13:52.333" v="260" actId="2696"/>
+        <pc:sldMkLst>
+          <pc:docMk/>
+          <pc:sldMk cId="3534518356" sldId="313"/>
+        </pc:sldMkLst>
+        <pc:spChg chg="mod">
+          <ac:chgData name="Johanne Provençal" userId="91505ee1-49e7-4482-8c3c-80c96976f4a1" providerId="ADAL" clId="{69D2FBB1-8D2B-4E25-BB9F-7839E62F21A4}" dt="2025-05-02T14:12:45.359" v="179" actId="20577"/>
+          <ac:spMkLst>
+            <pc:docMk/>
+            <pc:sldMk cId="3534518356" sldId="313"/>
+            <ac:spMk id="19" creationId="{B9873847-0C54-6EA7-4029-DF38BFA5CAFB}"/>
+          </ac:spMkLst>
+        </pc:spChg>
+      </pc:sldChg>
+      <pc:sldChg chg="modSp mod">
+        <pc:chgData name="Johanne Provençal" userId="91505ee1-49e7-4482-8c3c-80c96976f4a1" providerId="ADAL" clId="{69D2FBB1-8D2B-4E25-BB9F-7839E62F21A4}" dt="2025-06-15T21:06:22.431" v="1941" actId="20577"/>
+        <pc:sldMkLst>
+          <pc:docMk/>
+          <pc:sldMk cId="873667192" sldId="318"/>
+        </pc:sldMkLst>
+        <pc:spChg chg="mod">
+          <ac:chgData name="Johanne Provençal" userId="91505ee1-49e7-4482-8c3c-80c96976f4a1" providerId="ADAL" clId="{69D2FBB1-8D2B-4E25-BB9F-7839E62F21A4}" dt="2025-06-15T21:06:22.431" v="1941" actId="20577"/>
+          <ac:spMkLst>
+            <pc:docMk/>
+            <pc:sldMk cId="873667192" sldId="318"/>
+            <ac:spMk id="19" creationId="{84D2D941-155E-7765-5DB2-3BFE270DF2BF}"/>
+          </ac:spMkLst>
+        </pc:spChg>
+      </pc:sldChg>
+      <pc:sldChg chg="modSp mod">
+        <pc:chgData name="Johanne Provençal" userId="91505ee1-49e7-4482-8c3c-80c96976f4a1" providerId="ADAL" clId="{69D2FBB1-8D2B-4E25-BB9F-7839E62F21A4}" dt="2025-05-02T14:11:43.014" v="127" actId="20577"/>
+        <pc:sldMkLst>
+          <pc:docMk/>
+          <pc:sldMk cId="327756674" sldId="319"/>
+        </pc:sldMkLst>
+        <pc:spChg chg="mod">
+          <ac:chgData name="Johanne Provençal" userId="91505ee1-49e7-4482-8c3c-80c96976f4a1" providerId="ADAL" clId="{69D2FBB1-8D2B-4E25-BB9F-7839E62F21A4}" dt="2025-05-02T14:11:43.014" v="127" actId="20577"/>
+          <ac:spMkLst>
+            <pc:docMk/>
+            <pc:sldMk cId="327756674" sldId="319"/>
+            <ac:spMk id="19" creationId="{9636EA13-002A-BF1B-CCF1-95264E5A4E74}"/>
+          </ac:spMkLst>
+        </pc:spChg>
+      </pc:sldChg>
+      <pc:sldChg chg="add">
+        <pc:chgData name="Johanne Provençal" userId="91505ee1-49e7-4482-8c3c-80c96976f4a1" providerId="ADAL" clId="{69D2FBB1-8D2B-4E25-BB9F-7839E62F21A4}" dt="2025-05-02T14:12:14.362" v="128" actId="2890"/>
+        <pc:sldMkLst>
+          <pc:docMk/>
+          <pc:sldMk cId="2875399862" sldId="323"/>
+        </pc:sldMkLst>
+      </pc:sldChg>
+      <pc:sldChg chg="modSp add mod ord">
+        <pc:chgData name="Johanne Provençal" userId="91505ee1-49e7-4482-8c3c-80c96976f4a1" providerId="ADAL" clId="{69D2FBB1-8D2B-4E25-BB9F-7839E62F21A4}" dt="2025-05-02T14:48:00.017" v="1938" actId="20578"/>
+        <pc:sldMkLst>
+          <pc:docMk/>
+          <pc:sldMk cId="686102749" sldId="324"/>
+        </pc:sldMkLst>
+        <pc:spChg chg="mod">
+          <ac:chgData name="Johanne Provençal" userId="91505ee1-49e7-4482-8c3c-80c96976f4a1" providerId="ADAL" clId="{69D2FBB1-8D2B-4E25-BB9F-7839E62F21A4}" dt="2025-05-02T14:48:00.017" v="1938" actId="20578"/>
+          <ac:spMkLst>
+            <pc:docMk/>
+            <pc:sldMk cId="686102749" sldId="324"/>
+            <ac:spMk id="19" creationId="{260F5777-799E-5A6E-428F-25E736291935}"/>
+          </ac:spMkLst>
+        </pc:spChg>
+      </pc:sldChg>
+    </pc:docChg>
+  </pc:docChgLst>
+  <pc:docChgLst>
+    <pc:chgData name="Grant Gibson" userId="S::grant.gibson@crdcn.ca::986fbb49-9b20-40cb-b792-7e1154e60928" providerId="AD" clId="Web-{F04AE268-3B4A-83C1-7CAD-D70ECDBAA027}"/>
+    <pc:docChg chg="modSld">
+      <pc:chgData name="Grant Gibson" userId="S::grant.gibson@crdcn.ca::986fbb49-9b20-40cb-b792-7e1154e60928" providerId="AD" clId="Web-{F04AE268-3B4A-83C1-7CAD-D70ECDBAA027}" dt="2024-05-30T11:33:54.127" v="16" actId="20577"/>
+      <pc:docMkLst>
+        <pc:docMk/>
+      </pc:docMkLst>
+      <pc:sldChg chg="addSp delSp modSp modCm">
+        <pc:chgData name="Grant Gibson" userId="S::grant.gibson@crdcn.ca::986fbb49-9b20-40cb-b792-7e1154e60928" providerId="AD" clId="Web-{F04AE268-3B4A-83C1-7CAD-D70ECDBAA027}" dt="2024-05-30T11:33:54.127" v="16" actId="20577"/>
+        <pc:sldMkLst>
+          <pc:docMk/>
+          <pc:sldMk cId="3367948393" sldId="273"/>
+        </pc:sldMkLst>
+      </pc:sldChg>
+    </pc:docChg>
+  </pc:docChgLst>
+  <pc:docChgLst>
+    <pc:chgData name="Tess Hudson" userId="9c726d75-65b4-46a9-92d0-bb94f222346d" providerId="ADAL" clId="{869ED8F7-41FF-4ECB-9ABE-B6028E7FDDEC}"/>
+    <pc:docChg chg="undo redo custSel modSld">
+      <pc:chgData name="Tess Hudson" userId="9c726d75-65b4-46a9-92d0-bb94f222346d" providerId="ADAL" clId="{869ED8F7-41FF-4ECB-9ABE-B6028E7FDDEC}" dt="2025-03-10T19:46:48.436" v="134" actId="1076"/>
+      <pc:docMkLst>
+        <pc:docMk/>
+      </pc:docMkLst>
+      <pc:sldChg chg="addSp delSp modSp mod">
+        <pc:chgData name="Tess Hudson" userId="9c726d75-65b4-46a9-92d0-bb94f222346d" providerId="ADAL" clId="{869ED8F7-41FF-4ECB-9ABE-B6028E7FDDEC}" dt="2025-03-10T19:37:26.565" v="30" actId="1076"/>
+        <pc:sldMkLst>
+          <pc:docMk/>
+          <pc:sldMk cId="1867261588" sldId="311"/>
+        </pc:sldMkLst>
+        <pc:spChg chg="mod">
+          <ac:chgData name="Tess Hudson" userId="9c726d75-65b4-46a9-92d0-bb94f222346d" providerId="ADAL" clId="{869ED8F7-41FF-4ECB-9ABE-B6028E7FDDEC}" dt="2025-03-10T19:31:35.909" v="8" actId="20577"/>
+          <ac:spMkLst>
+            <pc:docMk/>
+            <pc:sldMk cId="1867261588" sldId="311"/>
+            <ac:spMk id="19" creationId="{CB026A76-014A-9926-431A-782FCD6DA4A0}"/>
+          </ac:spMkLst>
+        </pc:spChg>
+        <pc:picChg chg="add mod">
+          <ac:chgData name="Tess Hudson" userId="9c726d75-65b4-46a9-92d0-bb94f222346d" providerId="ADAL" clId="{869ED8F7-41FF-4ECB-9ABE-B6028E7FDDEC}" dt="2025-03-10T19:37:26.565" v="30" actId="1076"/>
+          <ac:picMkLst>
+            <pc:docMk/>
+            <pc:sldMk cId="1867261588" sldId="311"/>
+            <ac:picMk id="8" creationId="{CAB25ED1-5C30-39B4-204C-9F091F89902F}"/>
+          </ac:picMkLst>
+        </pc:picChg>
+      </pc:sldChg>
+      <pc:sldChg chg="addSp modSp mod">
+        <pc:chgData name="Tess Hudson" userId="9c726d75-65b4-46a9-92d0-bb94f222346d" providerId="ADAL" clId="{869ED8F7-41FF-4ECB-9ABE-B6028E7FDDEC}" dt="2025-03-10T19:46:48.436" v="134" actId="1076"/>
+        <pc:sldMkLst>
+          <pc:docMk/>
+          <pc:sldMk cId="1408242251" sldId="312"/>
+        </pc:sldMkLst>
+        <pc:spChg chg="add mod">
+          <ac:chgData name="Tess Hudson" userId="9c726d75-65b4-46a9-92d0-bb94f222346d" providerId="ADAL" clId="{869ED8F7-41FF-4ECB-9ABE-B6028E7FDDEC}" dt="2025-03-10T19:46:41.844" v="133" actId="1076"/>
+          <ac:spMkLst>
+            <pc:docMk/>
+            <pc:sldMk cId="1408242251" sldId="312"/>
+            <ac:spMk id="7" creationId="{3D7B78C7-BC93-1CCB-D1D4-D54CF9A2BDE2}"/>
+          </ac:spMkLst>
+        </pc:spChg>
+        <pc:spChg chg="mod">
+          <ac:chgData name="Tess Hudson" userId="9c726d75-65b4-46a9-92d0-bb94f222346d" providerId="ADAL" clId="{869ED8F7-41FF-4ECB-9ABE-B6028E7FDDEC}" dt="2025-03-10T19:45:21.917" v="112" actId="21"/>
+          <ac:spMkLst>
+            <pc:docMk/>
+            <pc:sldMk cId="1408242251" sldId="312"/>
+            <ac:spMk id="8" creationId="{7E295623-AEA4-CC95-5959-BE7418D26084}"/>
+          </ac:spMkLst>
+        </pc:spChg>
+        <pc:spChg chg="add mod">
+          <ac:chgData name="Tess Hudson" userId="9c726d75-65b4-46a9-92d0-bb94f222346d" providerId="ADAL" clId="{869ED8F7-41FF-4ECB-9ABE-B6028E7FDDEC}" dt="2025-03-10T19:46:48.436" v="134" actId="1076"/>
+          <ac:spMkLst>
+            <pc:docMk/>
+            <pc:sldMk cId="1408242251" sldId="312"/>
+            <ac:spMk id="10" creationId="{B56D4067-17F1-8D66-31AF-21778A3BB0F9}"/>
+          </ac:spMkLst>
+        </pc:spChg>
+        <pc:picChg chg="add mod">
+          <ac:chgData name="Tess Hudson" userId="9c726d75-65b4-46a9-92d0-bb94f222346d" providerId="ADAL" clId="{869ED8F7-41FF-4ECB-9ABE-B6028E7FDDEC}" dt="2025-03-10T19:46:31.155" v="129" actId="1037"/>
+          <ac:picMkLst>
+            <pc:docMk/>
+            <pc:sldMk cId="1408242251" sldId="312"/>
+            <ac:picMk id="3" creationId="{4DC588B8-EDBB-D579-2F5E-D622A39561D5}"/>
+          </ac:picMkLst>
+        </pc:picChg>
+        <pc:picChg chg="add mod">
+          <ac:chgData name="Tess Hudson" userId="9c726d75-65b4-46a9-92d0-bb94f222346d" providerId="ADAL" clId="{869ED8F7-41FF-4ECB-9ABE-B6028E7FDDEC}" dt="2025-03-10T19:46:36.325" v="132" actId="1076"/>
+          <ac:picMkLst>
+            <pc:docMk/>
+            <pc:sldMk cId="1408242251" sldId="312"/>
+            <ac:picMk id="5" creationId="{5FB62437-4EDB-5131-9EC6-D3EEDC990E2A}"/>
+          </ac:picMkLst>
+        </pc:picChg>
+      </pc:sldChg>
+      <pc:sldChg chg="modSp mod">
+        <pc:chgData name="Tess Hudson" userId="9c726d75-65b4-46a9-92d0-bb94f222346d" providerId="ADAL" clId="{869ED8F7-41FF-4ECB-9ABE-B6028E7FDDEC}" dt="2025-03-10T19:38:21.659" v="32" actId="6549"/>
+        <pc:sldMkLst>
+          <pc:docMk/>
+          <pc:sldMk cId="1375125008" sldId="316"/>
+        </pc:sldMkLst>
+        <pc:spChg chg="mod">
+          <ac:chgData name="Tess Hudson" userId="9c726d75-65b4-46a9-92d0-bb94f222346d" providerId="ADAL" clId="{869ED8F7-41FF-4ECB-9ABE-B6028E7FDDEC}" dt="2025-03-10T19:38:21.659" v="32" actId="6549"/>
+          <ac:spMkLst>
+            <pc:docMk/>
+            <pc:sldMk cId="1375125008" sldId="316"/>
+            <ac:spMk id="19" creationId="{807A597D-B1D3-E997-FDD3-58896A19DAED}"/>
+          </ac:spMkLst>
+        </pc:spChg>
+      </pc:sldChg>
+      <pc:sldChg chg="modSp mod">
+        <pc:chgData name="Tess Hudson" userId="9c726d75-65b4-46a9-92d0-bb94f222346d" providerId="ADAL" clId="{869ED8F7-41FF-4ECB-9ABE-B6028E7FDDEC}" dt="2025-03-10T19:09:20.424" v="4" actId="5793"/>
+        <pc:sldMkLst>
+          <pc:docMk/>
+          <pc:sldMk cId="327756674" sldId="319"/>
+        </pc:sldMkLst>
+        <pc:spChg chg="mod">
+          <ac:chgData name="Tess Hudson" userId="9c726d75-65b4-46a9-92d0-bb94f222346d" providerId="ADAL" clId="{869ED8F7-41FF-4ECB-9ABE-B6028E7FDDEC}" dt="2025-03-10T19:09:20.424" v="4" actId="5793"/>
+          <ac:spMkLst>
+            <pc:docMk/>
+            <pc:sldMk cId="327756674" sldId="319"/>
+            <ac:spMk id="19" creationId="{9636EA13-002A-BF1B-CCF1-95264E5A4E74}"/>
+          </ac:spMkLst>
+        </pc:spChg>
+      </pc:sldChg>
+    </pc:docChg>
+  </pc:docChgLst>
+  <pc:docChgLst>
+    <pc:chgData name="Johanne Provençal" userId="S::johanne.provencal@crdcn.ca::91505ee1-49e7-4482-8c3c-80c96976f4a1" providerId="AD" clId="Web-{6C1A46D6-82E7-455C-B375-2C3F680BEBA3}"/>
+    <pc:docChg chg="mod">
+      <pc:chgData name="Johanne Provençal" userId="S::johanne.provencal@crdcn.ca::91505ee1-49e7-4482-8c3c-80c96976f4a1" providerId="AD" clId="Web-{6C1A46D6-82E7-455C-B375-2C3F680BEBA3}" dt="2024-05-29T20:25:18.039" v="4"/>
+      <pc:docMkLst>
+        <pc:docMk/>
+      </pc:docMkLst>
+      <pc:sldChg chg="addCm modCm">
+        <pc:chgData name="Johanne Provençal" userId="S::johanne.provencal@crdcn.ca::91505ee1-49e7-4482-8c3c-80c96976f4a1" providerId="AD" clId="Web-{6C1A46D6-82E7-455C-B375-2C3F680BEBA3}" dt="2024-05-29T20:25:18.039" v="4"/>
+        <pc:sldMkLst>
+          <pc:docMk/>
+          <pc:sldMk cId="3367948393" sldId="273"/>
+        </pc:sldMkLst>
+      </pc:sldChg>
+    </pc:docChg>
+  </pc:docChgLst>
+  <pc:docChgLst>
+    <pc:chgData name="Johanne Provençal" userId="S::johanne.provencal@crdcn.ca::91505ee1-49e7-4482-8c3c-80c96976f4a1" providerId="AD" clId="Web-{2610478D-CA26-43EA-B221-160596100E8B}"/>
+    <pc:docChg chg="modSld">
+      <pc:chgData name="Johanne Provençal" userId="S::johanne.provencal@crdcn.ca::91505ee1-49e7-4482-8c3c-80c96976f4a1" providerId="AD" clId="Web-{2610478D-CA26-43EA-B221-160596100E8B}" dt="2024-07-03T13:21:07.115" v="69" actId="20577"/>
+      <pc:docMkLst>
+        <pc:docMk/>
+      </pc:docMkLst>
+      <pc:sldChg chg="modSp">
+        <pc:chgData name="Johanne Provençal" userId="S::johanne.provencal@crdcn.ca::91505ee1-49e7-4482-8c3c-80c96976f4a1" providerId="AD" clId="Web-{2610478D-CA26-43EA-B221-160596100E8B}" dt="2024-07-03T13:21:07.115" v="69" actId="20577"/>
+        <pc:sldMkLst>
+          <pc:docMk/>
+          <pc:sldMk cId="723683264" sldId="266"/>
+        </pc:sldMkLst>
+      </pc:sldChg>
+    </pc:docChg>
+  </pc:docChgLst>
+  <pc:docChgLst>
+    <pc:chgData name="Tess Hudson" userId="9c726d75-65b4-46a9-92d0-bb94f222346d" providerId="ADAL" clId="{A9475B81-9230-4587-84C2-3291ECE54814}"/>
+    <pc:docChg chg="undo custSel modSld">
+      <pc:chgData name="Tess Hudson" userId="9c726d75-65b4-46a9-92d0-bb94f222346d" providerId="ADAL" clId="{A9475B81-9230-4587-84C2-3291ECE54814}" dt="2024-05-31T16:47:39.433" v="183"/>
+      <pc:docMkLst>
+        <pc:docMk/>
+      </pc:docMkLst>
+      <pc:sldChg chg="modSp mod">
+        <pc:chgData name="Tess Hudson" userId="9c726d75-65b4-46a9-92d0-bb94f222346d" providerId="ADAL" clId="{A9475B81-9230-4587-84C2-3291ECE54814}" dt="2024-05-31T16:47:39.433" v="183"/>
+        <pc:sldMkLst>
+          <pc:docMk/>
+          <pc:sldMk cId="1888437868" sldId="298"/>
+        </pc:sldMkLst>
+      </pc:sldChg>
+    </pc:docChg>
+  </pc:docChgLst>
+  <pc:docChgLst>
+    <pc:chgData name="Johanne Provençal" userId="S::johanne.provencal@crdcn.ca::91505ee1-49e7-4482-8c3c-80c96976f4a1" providerId="AD" clId="Web-{F31503FB-583A-68ED-21E0-408D14855089}"/>
+    <pc:docChg chg="addSld delSld modSld sldOrd">
+      <pc:chgData name="Johanne Provençal" userId="S::johanne.provencal@crdcn.ca::91505ee1-49e7-4482-8c3c-80c96976f4a1" providerId="AD" clId="Web-{F31503FB-583A-68ED-21E0-408D14855089}" dt="2025-06-17T01:04:13.551" v="520" actId="20577"/>
+      <pc:docMkLst>
+        <pc:docMk/>
+      </pc:docMkLst>
+      <pc:sldChg chg="addSp modSp">
+        <pc:chgData name="Johanne Provençal" userId="S::johanne.provencal@crdcn.ca::91505ee1-49e7-4482-8c3c-80c96976f4a1" providerId="AD" clId="Web-{F31503FB-583A-68ED-21E0-408D14855089}" dt="2025-06-17T00:58:00.994" v="365" actId="14100"/>
+        <pc:sldMkLst>
+          <pc:docMk/>
+          <pc:sldMk cId="1888437868" sldId="298"/>
+        </pc:sldMkLst>
+        <pc:spChg chg="add mod">
+          <ac:chgData name="Johanne Provençal" userId="S::johanne.provencal@crdcn.ca::91505ee1-49e7-4482-8c3c-80c96976f4a1" providerId="AD" clId="Web-{F31503FB-583A-68ED-21E0-408D14855089}" dt="2025-06-17T00:58:00.994" v="365" actId="14100"/>
+          <ac:spMkLst>
+            <pc:docMk/>
+            <pc:sldMk cId="1888437868" sldId="298"/>
+            <ac:spMk id="2" creationId="{66697EBB-4F7E-EB21-C5C6-096E6BA9C6B4}"/>
+          </ac:spMkLst>
+        </pc:spChg>
+      </pc:sldChg>
+      <pc:sldChg chg="modSp ord">
+        <pc:chgData name="Johanne Provençal" userId="S::johanne.provencal@crdcn.ca::91505ee1-49e7-4482-8c3c-80c96976f4a1" providerId="AD" clId="Web-{F31503FB-583A-68ED-21E0-408D14855089}" dt="2025-06-17T01:04:13.551" v="520" actId="20577"/>
+        <pc:sldMkLst>
+          <pc:docMk/>
+          <pc:sldMk cId="624593502" sldId="301"/>
+        </pc:sldMkLst>
+        <pc:spChg chg="mod">
+          <ac:chgData name="Johanne Provençal" userId="S::johanne.provencal@crdcn.ca::91505ee1-49e7-4482-8c3c-80c96976f4a1" providerId="AD" clId="Web-{F31503FB-583A-68ED-21E0-408D14855089}" dt="2025-06-17T01:04:13.551" v="520" actId="20577"/>
+          <ac:spMkLst>
+            <pc:docMk/>
+            <pc:sldMk cId="624593502" sldId="301"/>
+            <ac:spMk id="19" creationId="{795E566D-9B19-4429-817F-335B8C788DAE}"/>
+          </ac:spMkLst>
+        </pc:spChg>
+      </pc:sldChg>
+      <pc:sldChg chg="add del">
+        <pc:chgData name="Johanne Provençal" userId="S::johanne.provencal@crdcn.ca::91505ee1-49e7-4482-8c3c-80c96976f4a1" providerId="AD" clId="Web-{F31503FB-583A-68ED-21E0-408D14855089}" dt="2025-06-17T00:48:05.206" v="191"/>
+        <pc:sldMkLst>
+          <pc:docMk/>
+          <pc:sldMk cId="1867261588" sldId="311"/>
+        </pc:sldMkLst>
+      </pc:sldChg>
+      <pc:sldChg chg="addSp modSp ord">
+        <pc:chgData name="Johanne Provençal" userId="S::johanne.provencal@crdcn.ca::91505ee1-49e7-4482-8c3c-80c96976f4a1" providerId="AD" clId="Web-{F31503FB-583A-68ED-21E0-408D14855089}" dt="2025-06-17T01:00:14.508" v="444" actId="1076"/>
+        <pc:sldMkLst>
+          <pc:docMk/>
+          <pc:sldMk cId="3219435398" sldId="315"/>
+        </pc:sldMkLst>
+        <pc:spChg chg="add mod">
+          <ac:chgData name="Johanne Provençal" userId="S::johanne.provencal@crdcn.ca::91505ee1-49e7-4482-8c3c-80c96976f4a1" providerId="AD" clId="Web-{F31503FB-583A-68ED-21E0-408D14855089}" dt="2025-06-17T01:00:14.508" v="444" actId="1076"/>
+          <ac:spMkLst>
+            <pc:docMk/>
+            <pc:sldMk cId="3219435398" sldId="315"/>
+            <ac:spMk id="3" creationId="{D0978DE2-31AE-D9EA-CF6A-8BE0E4F0E721}"/>
+          </ac:spMkLst>
+        </pc:spChg>
+        <pc:spChg chg="mod">
+          <ac:chgData name="Johanne Provençal" userId="S::johanne.provencal@crdcn.ca::91505ee1-49e7-4482-8c3c-80c96976f4a1" providerId="AD" clId="Web-{F31503FB-583A-68ED-21E0-408D14855089}" dt="2025-06-17T00:59:11.134" v="373" actId="20577"/>
+          <ac:spMkLst>
+            <pc:docMk/>
+            <pc:sldMk cId="3219435398" sldId="315"/>
+            <ac:spMk id="19" creationId="{D0F4BF54-45CB-2DF6-4383-A2056DC25BEF}"/>
+          </ac:spMkLst>
+        </pc:spChg>
+      </pc:sldChg>
+      <pc:sldChg chg="ord">
+        <pc:chgData name="Johanne Provençal" userId="S::johanne.provencal@crdcn.ca::91505ee1-49e7-4482-8c3c-80c96976f4a1" providerId="AD" clId="Web-{F31503FB-583A-68ED-21E0-408D14855089}" dt="2025-06-17T00:55:24.997" v="315"/>
+        <pc:sldMkLst>
+          <pc:docMk/>
+          <pc:sldMk cId="1375125008" sldId="316"/>
+        </pc:sldMkLst>
+      </pc:sldChg>
+      <pc:sldChg chg="modSp">
+        <pc:chgData name="Johanne Provençal" userId="S::johanne.provencal@crdcn.ca::91505ee1-49e7-4482-8c3c-80c96976f4a1" providerId="AD" clId="Web-{F31503FB-583A-68ED-21E0-408D14855089}" dt="2025-06-17T00:56:33.761" v="339" actId="14100"/>
+        <pc:sldMkLst>
+          <pc:docMk/>
+          <pc:sldMk cId="873667192" sldId="318"/>
+        </pc:sldMkLst>
+        <pc:spChg chg="mod">
+          <ac:chgData name="Johanne Provençal" userId="S::johanne.provencal@crdcn.ca::91505ee1-49e7-4482-8c3c-80c96976f4a1" providerId="AD" clId="Web-{F31503FB-583A-68ED-21E0-408D14855089}" dt="2025-06-17T00:56:33.761" v="339" actId="14100"/>
+          <ac:spMkLst>
+            <pc:docMk/>
+            <pc:sldMk cId="873667192" sldId="318"/>
+            <ac:spMk id="19" creationId="{84D2D941-155E-7765-5DB2-3BFE270DF2BF}"/>
+          </ac:spMkLst>
+        </pc:spChg>
+      </pc:sldChg>
+      <pc:sldChg chg="modSp">
+        <pc:chgData name="Johanne Provençal" userId="S::johanne.provencal@crdcn.ca::91505ee1-49e7-4482-8c3c-80c96976f4a1" providerId="AD" clId="Web-{F31503FB-583A-68ED-21E0-408D14855089}" dt="2025-06-17T01:03:20.537" v="513" actId="20577"/>
+        <pc:sldMkLst>
+          <pc:docMk/>
+          <pc:sldMk cId="327756674" sldId="319"/>
+        </pc:sldMkLst>
+        <pc:spChg chg="mod">
+          <ac:chgData name="Johanne Provençal" userId="S::johanne.provencal@crdcn.ca::91505ee1-49e7-4482-8c3c-80c96976f4a1" providerId="AD" clId="Web-{F31503FB-583A-68ED-21E0-408D14855089}" dt="2025-06-17T01:03:20.537" v="513" actId="20577"/>
+          <ac:spMkLst>
+            <pc:docMk/>
+            <pc:sldMk cId="327756674" sldId="319"/>
+            <ac:spMk id="19" creationId="{9636EA13-002A-BF1B-CCF1-95264E5A4E74}"/>
+          </ac:spMkLst>
+        </pc:spChg>
+      </pc:sldChg>
+      <pc:sldChg chg="modSp">
+        <pc:chgData name="Johanne Provençal" userId="S::johanne.provencal@crdcn.ca::91505ee1-49e7-4482-8c3c-80c96976f4a1" providerId="AD" clId="Web-{F31503FB-583A-68ED-21E0-408D14855089}" dt="2025-06-17T00:47:13.441" v="188" actId="20577"/>
+        <pc:sldMkLst>
+          <pc:docMk/>
+          <pc:sldMk cId="4231658747" sldId="320"/>
+        </pc:sldMkLst>
+        <pc:spChg chg="mod">
+          <ac:chgData name="Johanne Provençal" userId="S::johanne.provencal@crdcn.ca::91505ee1-49e7-4482-8c3c-80c96976f4a1" providerId="AD" clId="Web-{F31503FB-583A-68ED-21E0-408D14855089}" dt="2025-06-17T00:47:13.441" v="188" actId="20577"/>
+          <ac:spMkLst>
+            <pc:docMk/>
+            <pc:sldMk cId="4231658747" sldId="320"/>
+            <ac:spMk id="19" creationId="{23904B80-4C3E-3ABD-F824-BCFAA3484CDA}"/>
+          </ac:spMkLst>
+        </pc:spChg>
+      </pc:sldChg>
+      <pc:sldChg chg="modSp">
+        <pc:chgData name="Johanne Provençal" userId="S::johanne.provencal@crdcn.ca::91505ee1-49e7-4482-8c3c-80c96976f4a1" providerId="AD" clId="Web-{F31503FB-583A-68ED-21E0-408D14855089}" dt="2025-06-17T01:02:51.521" v="505" actId="20577"/>
+        <pc:sldMkLst>
+          <pc:docMk/>
+          <pc:sldMk cId="3675876903" sldId="321"/>
+        </pc:sldMkLst>
+        <pc:spChg chg="mod">
+          <ac:chgData name="Johanne Provençal" userId="S::johanne.provencal@crdcn.ca::91505ee1-49e7-4482-8c3c-80c96976f4a1" providerId="AD" clId="Web-{F31503FB-583A-68ED-21E0-408D14855089}" dt="2025-06-17T01:02:51.521" v="505" actId="20577"/>
+          <ac:spMkLst>
+            <pc:docMk/>
+            <pc:sldMk cId="3675876903" sldId="321"/>
+            <ac:spMk id="19" creationId="{3CBF1FA5-EB18-BF41-63B7-E0CABB3E5FA6}"/>
+          </ac:spMkLst>
+        </pc:spChg>
+      </pc:sldChg>
+      <pc:sldChg chg="modSp del ord">
+        <pc:chgData name="Johanne Provençal" userId="S::johanne.provencal@crdcn.ca::91505ee1-49e7-4482-8c3c-80c96976f4a1" providerId="AD" clId="Web-{F31503FB-583A-68ED-21E0-408D14855089}" dt="2025-06-17T00:58:14.729" v="366"/>
+        <pc:sldMkLst>
+          <pc:docMk/>
+          <pc:sldMk cId="2875399862" sldId="323"/>
+        </pc:sldMkLst>
+        <pc:spChg chg="mod">
+          <ac:chgData name="Johanne Provençal" userId="S::johanne.provencal@crdcn.ca::91505ee1-49e7-4482-8c3c-80c96976f4a1" providerId="AD" clId="Web-{F31503FB-583A-68ED-21E0-408D14855089}" dt="2025-06-17T00:54:07.623" v="306" actId="20577"/>
+          <ac:spMkLst>
+            <pc:docMk/>
+            <pc:sldMk cId="2875399862" sldId="323"/>
+            <ac:spMk id="19" creationId="{2934C405-AFE6-A1A4-F9EC-785E5D4DEE08}"/>
+          </ac:spMkLst>
+        </pc:spChg>
+      </pc:sldChg>
+      <pc:sldChg chg="ord">
+        <pc:chgData name="Johanne Provençal" userId="S::johanne.provencal@crdcn.ca::91505ee1-49e7-4482-8c3c-80c96976f4a1" providerId="AD" clId="Web-{F31503FB-583A-68ED-21E0-408D14855089}" dt="2025-06-17T00:52:01.046" v="285"/>
+        <pc:sldMkLst>
+          <pc:docMk/>
+          <pc:sldMk cId="686102749" sldId="324"/>
+        </pc:sldMkLst>
+      </pc:sldChg>
+    </pc:docChg>
+  </pc:docChgLst>
+  <pc:docChgLst>
+    <pc:chgData name="Johanne Provençal" userId="S::johanne.provencal@crdcn.ca::91505ee1-49e7-4482-8c3c-80c96976f4a1" providerId="AD" clId="Web-{23A4CAF5-C57E-2CBE-D4C0-3F75509C9A35}"/>
+    <pc:docChg chg="modSld">
+      <pc:chgData name="Johanne Provençal" userId="S::johanne.provencal@crdcn.ca::91505ee1-49e7-4482-8c3c-80c96976f4a1" providerId="AD" clId="Web-{23A4CAF5-C57E-2CBE-D4C0-3F75509C9A35}" dt="2024-07-08T19:18:57.960" v="3" actId="20577"/>
+      <pc:docMkLst>
+        <pc:docMk/>
+      </pc:docMkLst>
+      <pc:sldChg chg="modSp">
+        <pc:chgData name="Johanne Provençal" userId="S::johanne.provencal@crdcn.ca::91505ee1-49e7-4482-8c3c-80c96976f4a1" providerId="AD" clId="Web-{23A4CAF5-C57E-2CBE-D4C0-3F75509C9A35}" dt="2024-07-08T19:18:57.960" v="3" actId="20577"/>
+        <pc:sldMkLst>
+          <pc:docMk/>
+          <pc:sldMk cId="723683264" sldId="266"/>
+        </pc:sldMkLst>
+      </pc:sldChg>
+    </pc:docChg>
+  </pc:docChgLst>
+  <pc:docChgLst>
+    <pc:chgData name="Johanne Provençal" userId="91505ee1-49e7-4482-8c3c-80c96976f4a1" providerId="ADAL" clId="{39BBCB26-F195-44F4-9341-78D5BF4BAA12}"/>
+    <pc:docChg chg="undo custSel addSld delSld modSld sldOrd">
+      <pc:chgData name="Johanne Provençal" userId="91505ee1-49e7-4482-8c3c-80c96976f4a1" providerId="ADAL" clId="{39BBCB26-F195-44F4-9341-78D5BF4BAA12}" dt="2024-07-03T19:31:15.474" v="7569" actId="948"/>
+      <pc:docMkLst>
+        <pc:docMk/>
+      </pc:docMkLst>
+      <pc:sldChg chg="modSp">
+        <pc:chgData name="Johanne Provençal" userId="91505ee1-49e7-4482-8c3c-80c96976f4a1" providerId="ADAL" clId="{39BBCB26-F195-44F4-9341-78D5BF4BAA12}" dt="2024-07-03T17:35:25.619" v="749" actId="20577"/>
+        <pc:sldMkLst>
+          <pc:docMk/>
+          <pc:sldMk cId="723683264" sldId="266"/>
+        </pc:sldMkLst>
+      </pc:sldChg>
+      <pc:sldChg chg="modSp">
+        <pc:chgData name="Johanne Provençal" userId="91505ee1-49e7-4482-8c3c-80c96976f4a1" providerId="ADAL" clId="{39BBCB26-F195-44F4-9341-78D5BF4BAA12}" dt="2024-07-03T17:35:46.365" v="757" actId="1035"/>
+        <pc:sldMkLst>
+          <pc:docMk/>
+          <pc:sldMk cId="3367948393" sldId="273"/>
+        </pc:sldMkLst>
+      </pc:sldChg>
+      <pc:sldChg chg="modSp">
+        <pc:chgData name="Johanne Provençal" userId="91505ee1-49e7-4482-8c3c-80c96976f4a1" providerId="ADAL" clId="{39BBCB26-F195-44F4-9341-78D5BF4BAA12}" dt="2024-07-03T19:31:15.474" v="7569" actId="948"/>
+        <pc:sldMkLst>
+          <pc:docMk/>
+          <pc:sldMk cId="59341068" sldId="284"/>
+        </pc:sldMkLst>
+      </pc:sldChg>
+      <pc:sldChg chg="addSp delSp modSp del">
+        <pc:chgData name="Johanne Provençal" userId="91505ee1-49e7-4482-8c3c-80c96976f4a1" providerId="ADAL" clId="{39BBCB26-F195-44F4-9341-78D5BF4BAA12}" dt="2024-07-03T18:18:10.738" v="3540" actId="2696"/>
+        <pc:sldMkLst>
+          <pc:docMk/>
+          <pc:sldMk cId="4209132346" sldId="292"/>
+        </pc:sldMkLst>
+      </pc:sldChg>
+      <pc:sldChg chg="delSp modSp">
+        <pc:chgData name="Johanne Provençal" userId="91505ee1-49e7-4482-8c3c-80c96976f4a1" providerId="ADAL" clId="{39BBCB26-F195-44F4-9341-78D5BF4BAA12}" dt="2024-07-03T18:39:49.738" v="4913" actId="1038"/>
+        <pc:sldMkLst>
+          <pc:docMk/>
+          <pc:sldMk cId="1888437868" sldId="298"/>
+        </pc:sldMkLst>
+      </pc:sldChg>
+      <pc:sldChg chg="modSp add ord">
+        <pc:chgData name="Johanne Provençal" userId="91505ee1-49e7-4482-8c3c-80c96976f4a1" providerId="ADAL" clId="{39BBCB26-F195-44F4-9341-78D5BF4BAA12}" dt="2024-07-03T19:07:05.018" v="6094" actId="20577"/>
+        <pc:sldMkLst>
+          <pc:docMk/>
+          <pc:sldMk cId="2152791164" sldId="299"/>
+        </pc:sldMkLst>
+      </pc:sldChg>
+      <pc:sldChg chg="modSp add ord">
+        <pc:chgData name="Johanne Provençal" userId="91505ee1-49e7-4482-8c3c-80c96976f4a1" providerId="ADAL" clId="{39BBCB26-F195-44F4-9341-78D5BF4BAA12}" dt="2024-07-03T19:06:31.348" v="6078" actId="20577"/>
+        <pc:sldMkLst>
+          <pc:docMk/>
+          <pc:sldMk cId="2974737869" sldId="300"/>
+        </pc:sldMkLst>
+      </pc:sldChg>
+      <pc:sldChg chg="modSp add">
+        <pc:chgData name="Johanne Provençal" userId="91505ee1-49e7-4482-8c3c-80c96976f4a1" providerId="ADAL" clId="{39BBCB26-F195-44F4-9341-78D5BF4BAA12}" dt="2024-07-03T18:55:19.829" v="5994" actId="20577"/>
+        <pc:sldMkLst>
+          <pc:docMk/>
+          <pc:sldMk cId="624593502" sldId="301"/>
+        </pc:sldMkLst>
+      </pc:sldChg>
+      <pc:sldChg chg="add del">
+        <pc:chgData name="Johanne Provençal" userId="91505ee1-49e7-4482-8c3c-80c96976f4a1" providerId="ADAL" clId="{39BBCB26-F195-44F4-9341-78D5BF4BAA12}" dt="2024-07-03T18:57:29.851" v="5996"/>
+        <pc:sldMkLst>
+          <pc:docMk/>
+          <pc:sldMk cId="840847305" sldId="302"/>
+        </pc:sldMkLst>
+      </pc:sldChg>
+      <pc:sldChg chg="addSp delSp modSp add ord setBg">
+        <pc:chgData name="Johanne Provençal" userId="91505ee1-49e7-4482-8c3c-80c96976f4a1" providerId="ADAL" clId="{39BBCB26-F195-44F4-9341-78D5BF4BAA12}" dt="2024-07-03T19:09:40.439" v="6147" actId="1035"/>
+        <pc:sldMkLst>
+          <pc:docMk/>
+          <pc:sldMk cId="657576504" sldId="310"/>
+        </pc:sldMkLst>
+      </pc:sldChg>
+      <pc:sldChg chg="modSp add del ord">
+        <pc:chgData name="Johanne Provençal" userId="91505ee1-49e7-4482-8c3c-80c96976f4a1" providerId="ADAL" clId="{39BBCB26-F195-44F4-9341-78D5BF4BAA12}" dt="2024-07-03T19:19:44.399" v="6368" actId="2696"/>
+        <pc:sldMkLst>
+          <pc:docMk/>
+          <pc:sldMk cId="1513551871" sldId="311"/>
+        </pc:sldMkLst>
+      </pc:sldChg>
+    </pc:docChg>
+  </pc:docChgLst>
+  <pc:docChgLst>
+    <pc:chgData name="Johanne Provençal" userId="S::johanne.provencal@crdcn.ca::91505ee1-49e7-4482-8c3c-80c96976f4a1" providerId="AD" clId="Web-{C7F75544-A993-036F-1E15-253BA8912D81}"/>
+    <pc:docChg chg="addSld modSld sldOrd">
+      <pc:chgData name="Johanne Provençal" userId="S::johanne.provencal@crdcn.ca::91505ee1-49e7-4482-8c3c-80c96976f4a1" providerId="AD" clId="Web-{C7F75544-A993-036F-1E15-253BA8912D81}" dt="2025-02-25T14:55:27.730" v="343" actId="20577"/>
+      <pc:docMkLst>
+        <pc:docMk/>
+      </pc:docMkLst>
+      <pc:sldChg chg="modSp">
+        <pc:chgData name="Johanne Provençal" userId="S::johanne.provencal@crdcn.ca::91505ee1-49e7-4482-8c3c-80c96976f4a1" providerId="AD" clId="Web-{C7F75544-A993-036F-1E15-253BA8912D81}" dt="2025-02-25T14:41:41.497" v="152" actId="14100"/>
+        <pc:sldMkLst>
+          <pc:docMk/>
+          <pc:sldMk cId="723683264" sldId="266"/>
+        </pc:sldMkLst>
+        <pc:spChg chg="mod">
+          <ac:chgData name="Johanne Provençal" userId="S::johanne.provencal@crdcn.ca::91505ee1-49e7-4482-8c3c-80c96976f4a1" providerId="AD" clId="Web-{C7F75544-A993-036F-1E15-253BA8912D81}" dt="2025-02-25T14:38:35.947" v="63" actId="20577"/>
+          <ac:spMkLst>
+            <pc:docMk/>
+            <pc:sldMk cId="723683264" sldId="266"/>
+            <ac:spMk id="7" creationId="{00000000-0000-0000-0000-000000000000}"/>
+          </ac:spMkLst>
+        </pc:spChg>
+        <pc:spChg chg="mod">
+          <ac:chgData name="Johanne Provençal" userId="S::johanne.provencal@crdcn.ca::91505ee1-49e7-4482-8c3c-80c96976f4a1" providerId="AD" clId="Web-{C7F75544-A993-036F-1E15-253BA8912D81}" dt="2025-02-25T14:41:41.497" v="152" actId="14100"/>
+          <ac:spMkLst>
+            <pc:docMk/>
+            <pc:sldMk cId="723683264" sldId="266"/>
+            <ac:spMk id="8" creationId="{00000000-0000-0000-0000-000000000000}"/>
+          </ac:spMkLst>
+        </pc:spChg>
+      </pc:sldChg>
+      <pc:sldChg chg="modSp ord">
+        <pc:chgData name="Johanne Provençal" userId="S::johanne.provencal@crdcn.ca::91505ee1-49e7-4482-8c3c-80c96976f4a1" providerId="AD" clId="Web-{C7F75544-A993-036F-1E15-253BA8912D81}" dt="2025-02-25T14:45:56.314" v="212"/>
+        <pc:sldMkLst>
+          <pc:docMk/>
+          <pc:sldMk cId="3367948393" sldId="273"/>
+        </pc:sldMkLst>
+        <pc:spChg chg="mod">
+          <ac:chgData name="Johanne Provençal" userId="S::johanne.provencal@crdcn.ca::91505ee1-49e7-4482-8c3c-80c96976f4a1" providerId="AD" clId="Web-{C7F75544-A993-036F-1E15-253BA8912D81}" dt="2025-02-25T14:43:34.546" v="206" actId="14100"/>
+          <ac:spMkLst>
+            <pc:docMk/>
+            <pc:sldMk cId="3367948393" sldId="273"/>
+            <ac:spMk id="6" creationId="{00000000-0000-0000-0000-000000000000}"/>
+          </ac:spMkLst>
+        </pc:spChg>
+        <pc:grpChg chg="mod">
+          <ac:chgData name="Johanne Provençal" userId="S::johanne.provencal@crdcn.ca::91505ee1-49e7-4482-8c3c-80c96976f4a1" providerId="AD" clId="Web-{C7F75544-A993-036F-1E15-253BA8912D81}" dt="2025-02-25T14:44:11.953" v="208" actId="1076"/>
+          <ac:grpSpMkLst>
+            <pc:docMk/>
+            <pc:sldMk cId="3367948393" sldId="273"/>
+            <ac:grpSpMk id="4" creationId="{00000000-0000-0000-0000-000000000000}"/>
+          </ac:grpSpMkLst>
+        </pc:grpChg>
+      </pc:sldChg>
+      <pc:sldChg chg="modSp">
+        <pc:chgData name="Johanne Provençal" userId="S::johanne.provencal@crdcn.ca::91505ee1-49e7-4482-8c3c-80c96976f4a1" providerId="AD" clId="Web-{C7F75544-A993-036F-1E15-253BA8912D81}" dt="2025-02-25T14:55:27.730" v="343" actId="20577"/>
+        <pc:sldMkLst>
+          <pc:docMk/>
+          <pc:sldMk cId="2974737869" sldId="300"/>
+        </pc:sldMkLst>
+        <pc:spChg chg="mod">
+          <ac:chgData name="Johanne Provençal" userId="S::johanne.provencal@crdcn.ca::91505ee1-49e7-4482-8c3c-80c96976f4a1" providerId="AD" clId="Web-{C7F75544-A993-036F-1E15-253BA8912D81}" dt="2025-02-25T14:55:27.730" v="343" actId="20577"/>
+          <ac:spMkLst>
+            <pc:docMk/>
+            <pc:sldMk cId="2974737869" sldId="300"/>
+            <ac:spMk id="19" creationId="{795E566D-9B19-4429-817F-335B8C788DAE}"/>
+          </ac:spMkLst>
+        </pc:spChg>
+      </pc:sldChg>
+      <pc:sldChg chg="add replId">
+        <pc:chgData name="Johanne Provençal" userId="S::johanne.provencal@crdcn.ca::91505ee1-49e7-4482-8c3c-80c96976f4a1" providerId="AD" clId="Web-{C7F75544-A993-036F-1E15-253BA8912D81}" dt="2025-02-25T14:45:30.095" v="209"/>
+        <pc:sldMkLst>
+          <pc:docMk/>
+          <pc:sldMk cId="1867261588" sldId="311"/>
+        </pc:sldMkLst>
+      </pc:sldChg>
+    </pc:docChg>
+  </pc:docChgLst>
+  <pc:docChgLst>
+    <pc:chgData name="Johanne Provençal" userId="S::johanne.provencal@crdcn.ca::91505ee1-49e7-4482-8c3c-80c96976f4a1" providerId="AD" clId="Web-{379D317A-F01E-B10B-9223-3313A82C9132}"/>
+    <pc:docChg chg="">
+      <pc:chgData name="Johanne Provençal" userId="S::johanne.provencal@crdcn.ca::91505ee1-49e7-4482-8c3c-80c96976f4a1" providerId="AD" clId="Web-{379D317A-F01E-B10B-9223-3313A82C9132}" dt="2024-06-03T12:41:32.496" v="3"/>
+      <pc:docMkLst>
+        <pc:docMk/>
+      </pc:docMkLst>
+    </pc:docChg>
+  </pc:docChgLst>
+  <pc:docChgLst>
+    <pc:chgData name="Johanne Provençal" userId="S::johanne.provencal@crdcn.ca::91505ee1-49e7-4482-8c3c-80c96976f4a1" providerId="AD" clId="Web-{5637CAF8-6A79-E75F-F5A1-8F9743938421}"/>
+    <pc:docChg chg="modSld">
+      <pc:chgData name="Johanne Provençal" userId="S::johanne.provencal@crdcn.ca::91505ee1-49e7-4482-8c3c-80c96976f4a1" providerId="AD" clId="Web-{5637CAF8-6A79-E75F-F5A1-8F9743938421}" dt="2025-03-05T15:45:01.449" v="106" actId="20577"/>
+      <pc:docMkLst>
+        <pc:docMk/>
+      </pc:docMkLst>
+      <pc:sldChg chg="modSp">
+        <pc:chgData name="Johanne Provençal" userId="S::johanne.provencal@crdcn.ca::91505ee1-49e7-4482-8c3c-80c96976f4a1" providerId="AD" clId="Web-{5637CAF8-6A79-E75F-F5A1-8F9743938421}" dt="2025-03-05T15:45:01.449" v="106" actId="20577"/>
+        <pc:sldMkLst>
+          <pc:docMk/>
+          <pc:sldMk cId="3675876903" sldId="321"/>
+        </pc:sldMkLst>
+        <pc:spChg chg="mod">
+          <ac:chgData name="Johanne Provençal" userId="S::johanne.provencal@crdcn.ca::91505ee1-49e7-4482-8c3c-80c96976f4a1" providerId="AD" clId="Web-{5637CAF8-6A79-E75F-F5A1-8F9743938421}" dt="2025-03-05T15:45:01.449" v="106" actId="20577"/>
+          <ac:spMkLst>
+            <pc:docMk/>
+            <pc:sldMk cId="3675876903" sldId="321"/>
+            <ac:spMk id="19" creationId="{3CBF1FA5-EB18-BF41-63B7-E0CABB3E5FA6}"/>
+          </ac:spMkLst>
+        </pc:spChg>
+      </pc:sldChg>
+    </pc:docChg>
+  </pc:docChgLst>
+  <pc:docChgLst>
+    <pc:chgData name="Johanne Provençal" userId="S::johanne.provencal@crdcn.ca::91505ee1-49e7-4482-8c3c-80c96976f4a1" providerId="AD" clId="Web-{BD9F1FBD-3CBA-9B84-A796-1601B7D9CA29}"/>
+    <pc:docChg chg="modSld">
+      <pc:chgData name="Johanne Provençal" userId="S::johanne.provencal@crdcn.ca::91505ee1-49e7-4482-8c3c-80c96976f4a1" providerId="AD" clId="Web-{BD9F1FBD-3CBA-9B84-A796-1601B7D9CA29}" dt="2025-03-04T14:51:24.358" v="9" actId="20577"/>
+      <pc:docMkLst>
+        <pc:docMk/>
+      </pc:docMkLst>
+      <pc:sldChg chg="modSp">
+        <pc:chgData name="Johanne Provençal" userId="S::johanne.provencal@crdcn.ca::91505ee1-49e7-4482-8c3c-80c96976f4a1" providerId="AD" clId="Web-{BD9F1FBD-3CBA-9B84-A796-1601B7D9CA29}" dt="2025-03-04T14:51:24.358" v="9" actId="20577"/>
+        <pc:sldMkLst>
+          <pc:docMk/>
+          <pc:sldMk cId="1375125008" sldId="316"/>
+        </pc:sldMkLst>
+        <pc:spChg chg="mod">
+          <ac:chgData name="Johanne Provençal" userId="S::johanne.provencal@crdcn.ca::91505ee1-49e7-4482-8c3c-80c96976f4a1" providerId="AD" clId="Web-{BD9F1FBD-3CBA-9B84-A796-1601B7D9CA29}" dt="2025-03-04T14:51:24.358" v="9" actId="20577"/>
+          <ac:spMkLst>
+            <pc:docMk/>
+            <pc:sldMk cId="1375125008" sldId="316"/>
+            <ac:spMk id="19" creationId="{807A597D-B1D3-E997-FDD3-58896A19DAED}"/>
+          </ac:spMkLst>
+        </pc:spChg>
+      </pc:sldChg>
+    </pc:docChg>
+  </pc:docChgLst>
+  <pc:docChgLst>
+    <pc:chgData name="Michèle Anderson" userId="S::michele.anderson@crdcn.ca::2fbc88df-71dd-498a-af0a-517750797bea" providerId="AD" clId="Web-{D9554990-3821-28DB-DCE5-89A730CF187F}"/>
+    <pc:docChg chg="mod modSld">
+      <pc:chgData name="Michèle Anderson" userId="S::michele.anderson@crdcn.ca::2fbc88df-71dd-498a-af0a-517750797bea" providerId="AD" clId="Web-{D9554990-3821-28DB-DCE5-89A730CF187F}" dt="2025-03-28T20:58:19.139" v="171" actId="20577"/>
+      <pc:docMkLst>
+        <pc:docMk/>
+      </pc:docMkLst>
+      <pc:sldChg chg="modSp">
+        <pc:chgData name="Michèle Anderson" userId="S::michele.anderson@crdcn.ca::2fbc88df-71dd-498a-af0a-517750797bea" providerId="AD" clId="Web-{D9554990-3821-28DB-DCE5-89A730CF187F}" dt="2025-03-28T20:52:59.552" v="71" actId="20577"/>
+        <pc:sldMkLst>
+          <pc:docMk/>
+          <pc:sldMk cId="2152791164" sldId="299"/>
+        </pc:sldMkLst>
+        <pc:spChg chg="mod">
+          <ac:chgData name="Michèle Anderson" userId="S::michele.anderson@crdcn.ca::2fbc88df-71dd-498a-af0a-517750797bea" providerId="AD" clId="Web-{D9554990-3821-28DB-DCE5-89A730CF187F}" dt="2025-03-28T20:52:59.552" v="71" actId="20577"/>
+          <ac:spMkLst>
+            <pc:docMk/>
+            <pc:sldMk cId="2152791164" sldId="299"/>
+            <ac:spMk id="19" creationId="{795E566D-9B19-4429-817F-335B8C788DAE}"/>
+          </ac:spMkLst>
+        </pc:spChg>
+      </pc:sldChg>
+      <pc:sldChg chg="modSp">
+        <pc:chgData name="Michèle Anderson" userId="S::michele.anderson@crdcn.ca::2fbc88df-71dd-498a-af0a-517750797bea" providerId="AD" clId="Web-{D9554990-3821-28DB-DCE5-89A730CF187F}" dt="2025-03-28T20:20:04.174" v="8" actId="20577"/>
+        <pc:sldMkLst>
+          <pc:docMk/>
+          <pc:sldMk cId="2974737869" sldId="300"/>
+        </pc:sldMkLst>
+        <pc:spChg chg="mod">
+          <ac:chgData name="Michèle Anderson" userId="S::michele.anderson@crdcn.ca::2fbc88df-71dd-498a-af0a-517750797bea" providerId="AD" clId="Web-{D9554990-3821-28DB-DCE5-89A730CF187F}" dt="2025-03-28T20:20:04.174" v="8" actId="20577"/>
+          <ac:spMkLst>
+            <pc:docMk/>
+            <pc:sldMk cId="2974737869" sldId="300"/>
+            <ac:spMk id="19" creationId="{795E566D-9B19-4429-817F-335B8C788DAE}"/>
+          </ac:spMkLst>
+        </pc:spChg>
+      </pc:sldChg>
+      <pc:sldChg chg="modSp">
+        <pc:chgData name="Michèle Anderson" userId="S::michele.anderson@crdcn.ca::2fbc88df-71dd-498a-af0a-517750797bea" providerId="AD" clId="Web-{D9554990-3821-28DB-DCE5-89A730CF187F}" dt="2025-03-28T20:58:19.139" v="171" actId="20577"/>
+        <pc:sldMkLst>
+          <pc:docMk/>
+          <pc:sldMk cId="624593502" sldId="301"/>
+        </pc:sldMkLst>
+        <pc:spChg chg="mod">
+          <ac:chgData name="Michèle Anderson" userId="S::michele.anderson@crdcn.ca::2fbc88df-71dd-498a-af0a-517750797bea" providerId="AD" clId="Web-{D9554990-3821-28DB-DCE5-89A730CF187F}" dt="2025-03-28T20:58:19.139" v="171" actId="20577"/>
+          <ac:spMkLst>
+            <pc:docMk/>
+            <pc:sldMk cId="624593502" sldId="301"/>
+            <ac:spMk id="19" creationId="{795E566D-9B19-4429-817F-335B8C788DAE}"/>
+          </ac:spMkLst>
+        </pc:spChg>
+      </pc:sldChg>
+      <pc:sldChg chg="modSp">
+        <pc:chgData name="Michèle Anderson" userId="S::michele.anderson@crdcn.ca::2fbc88df-71dd-498a-af0a-517750797bea" providerId="AD" clId="Web-{D9554990-3821-28DB-DCE5-89A730CF187F}" dt="2025-03-28T20:57:19.872" v="168" actId="1076"/>
+        <pc:sldMkLst>
+          <pc:docMk/>
+          <pc:sldMk cId="1867261588" sldId="311"/>
+        </pc:sldMkLst>
+        <pc:spChg chg="mod">
+          <ac:chgData name="Michèle Anderson" userId="S::michele.anderson@crdcn.ca::2fbc88df-71dd-498a-af0a-517750797bea" providerId="AD" clId="Web-{D9554990-3821-28DB-DCE5-89A730CF187F}" dt="2025-03-28T20:52:08.317" v="65" actId="14100"/>
+          <ac:spMkLst>
+            <pc:docMk/>
+            <pc:sldMk cId="1867261588" sldId="311"/>
+            <ac:spMk id="19" creationId="{CB026A76-014A-9926-431A-782FCD6DA4A0}"/>
+          </ac:spMkLst>
+        </pc:spChg>
+        <pc:picChg chg="mod">
+          <ac:chgData name="Michèle Anderson" userId="S::michele.anderson@crdcn.ca::2fbc88df-71dd-498a-af0a-517750797bea" providerId="AD" clId="Web-{D9554990-3821-28DB-DCE5-89A730CF187F}" dt="2025-03-28T20:57:19.872" v="168" actId="1076"/>
+          <ac:picMkLst>
+            <pc:docMk/>
+            <pc:sldMk cId="1867261588" sldId="311"/>
+            <ac:picMk id="8" creationId="{CAB25ED1-5C30-39B4-204C-9F091F89902F}"/>
+          </ac:picMkLst>
+        </pc:picChg>
+      </pc:sldChg>
+      <pc:sldChg chg="modSp">
+        <pc:chgData name="Michèle Anderson" userId="S::michele.anderson@crdcn.ca::2fbc88df-71dd-498a-af0a-517750797bea" providerId="AD" clId="Web-{D9554990-3821-28DB-DCE5-89A730CF187F}" dt="2025-03-28T20:49:28.001" v="42" actId="20577"/>
+        <pc:sldMkLst>
+          <pc:docMk/>
+          <pc:sldMk cId="873667192" sldId="318"/>
+        </pc:sldMkLst>
+        <pc:spChg chg="mod">
+          <ac:chgData name="Michèle Anderson" userId="S::michele.anderson@crdcn.ca::2fbc88df-71dd-498a-af0a-517750797bea" providerId="AD" clId="Web-{D9554990-3821-28DB-DCE5-89A730CF187F}" dt="2025-03-28T20:49:28.001" v="42" actId="20577"/>
+          <ac:spMkLst>
+            <pc:docMk/>
+            <pc:sldMk cId="873667192" sldId="318"/>
+            <ac:spMk id="19" creationId="{84D2D941-155E-7765-5DB2-3BFE270DF2BF}"/>
+          </ac:spMkLst>
+        </pc:spChg>
+      </pc:sldChg>
+    </pc:docChg>
+  </pc:docChgLst>
+  <pc:docChgLst>
+    <pc:chgData name="Johanne Provençal" userId="S::johanne.provencal@crdcn.ca::91505ee1-49e7-4482-8c3c-80c96976f4a1" providerId="AD" clId="Web-{179ED8F9-B7DA-DB6C-E5B6-ABD52675F213}"/>
+    <pc:docChg chg="modSld">
+      <pc:chgData name="Johanne Provençal" userId="S::johanne.provencal@crdcn.ca::91505ee1-49e7-4482-8c3c-80c96976f4a1" providerId="AD" clId="Web-{179ED8F9-B7DA-DB6C-E5B6-ABD52675F213}" dt="2024-07-09T15:12:41.152" v="52" actId="20577"/>
+      <pc:docMkLst>
+        <pc:docMk/>
+      </pc:docMkLst>
+      <pc:sldChg chg="modSp">
+        <pc:chgData name="Johanne Provençal" userId="S::johanne.provencal@crdcn.ca::91505ee1-49e7-4482-8c3c-80c96976f4a1" providerId="AD" clId="Web-{179ED8F9-B7DA-DB6C-E5B6-ABD52675F213}" dt="2024-07-09T15:11:47.354" v="16" actId="20577"/>
+        <pc:sldMkLst>
+          <pc:docMk/>
+          <pc:sldMk cId="1888437868" sldId="298"/>
+        </pc:sldMkLst>
+      </pc:sldChg>
+      <pc:sldChg chg="modSp">
+        <pc:chgData name="Johanne Provençal" userId="S::johanne.provencal@crdcn.ca::91505ee1-49e7-4482-8c3c-80c96976f4a1" providerId="AD" clId="Web-{179ED8F9-B7DA-DB6C-E5B6-ABD52675F213}" dt="2024-07-09T15:08:04.333" v="10" actId="20577"/>
+        <pc:sldMkLst>
+          <pc:docMk/>
+          <pc:sldMk cId="2152791164" sldId="299"/>
+        </pc:sldMkLst>
+      </pc:sldChg>
+      <pc:sldChg chg="modSp">
+        <pc:chgData name="Johanne Provençal" userId="S::johanne.provencal@crdcn.ca::91505ee1-49e7-4482-8c3c-80c96976f4a1" providerId="AD" clId="Web-{179ED8F9-B7DA-DB6C-E5B6-ABD52675F213}" dt="2024-07-09T15:08:09.005" v="13" actId="20577"/>
+        <pc:sldMkLst>
+          <pc:docMk/>
+          <pc:sldMk cId="624593502" sldId="301"/>
+        </pc:sldMkLst>
+      </pc:sldChg>
+    </pc:docChg>
+  </pc:docChgLst>
+  <pc:docChgLst>
+    <pc:chgData name="Johanne Provençal" userId="S::johanne.provencal@crdcn.ca::91505ee1-49e7-4482-8c3c-80c96976f4a1" providerId="AD" clId="Web-{34BC7B95-2636-2347-23D2-FA4B12DEE928}"/>
+    <pc:docChg chg="modSld">
+      <pc:chgData name="Johanne Provençal" userId="S::johanne.provencal@crdcn.ca::91505ee1-49e7-4482-8c3c-80c96976f4a1" providerId="AD" clId="Web-{34BC7B95-2636-2347-23D2-FA4B12DEE928}" dt="2025-05-05T20:15:56.519" v="3" actId="20577"/>
+      <pc:docMkLst>
+        <pc:docMk/>
+      </pc:docMkLst>
+      <pc:sldChg chg="modSp">
+        <pc:chgData name="Johanne Provençal" userId="S::johanne.provencal@crdcn.ca::91505ee1-49e7-4482-8c3c-80c96976f4a1" providerId="AD" clId="Web-{34BC7B95-2636-2347-23D2-FA4B12DEE928}" dt="2025-05-05T20:15:56.519" v="3" actId="20577"/>
+        <pc:sldMkLst>
+          <pc:docMk/>
+          <pc:sldMk cId="3367948393" sldId="273"/>
+        </pc:sldMkLst>
+        <pc:spChg chg="mod">
+          <ac:chgData name="Johanne Provençal" userId="S::johanne.provencal@crdcn.ca::91505ee1-49e7-4482-8c3c-80c96976f4a1" providerId="AD" clId="Web-{34BC7B95-2636-2347-23D2-FA4B12DEE928}" dt="2025-05-05T20:15:56.519" v="3" actId="20577"/>
+          <ac:spMkLst>
+            <pc:docMk/>
+            <pc:sldMk cId="3367948393" sldId="273"/>
+            <ac:spMk id="35" creationId="{34123E5D-9ACC-29AE-80DC-65B514A4E808}"/>
+          </ac:spMkLst>
+        </pc:spChg>
+      </pc:sldChg>
+    </pc:docChg>
+  </pc:docChgLst>
+  <pc:docChgLst>
+    <pc:chgData name="Johanne Provençal" userId="S::johanne.provencal@crdcn.ca::91505ee1-49e7-4482-8c3c-80c96976f4a1" providerId="AD" clId="Web-{E29F630B-0884-232A-F2FC-A4288BBADA5D}"/>
+    <pc:docChg chg="modSld">
+      <pc:chgData name="Johanne Provençal" userId="S::johanne.provencal@crdcn.ca::91505ee1-49e7-4482-8c3c-80c96976f4a1" providerId="AD" clId="Web-{E29F630B-0884-232A-F2FC-A4288BBADA5D}" dt="2025-03-06T14:10:14.821" v="35" actId="20577"/>
+      <pc:docMkLst>
+        <pc:docMk/>
+      </pc:docMkLst>
+      <pc:sldChg chg="modSp">
+        <pc:chgData name="Johanne Provençal" userId="S::johanne.provencal@crdcn.ca::91505ee1-49e7-4482-8c3c-80c96976f4a1" providerId="AD" clId="Web-{E29F630B-0884-232A-F2FC-A4288BBADA5D}" dt="2025-03-06T14:10:14.821" v="35" actId="20577"/>
+        <pc:sldMkLst>
+          <pc:docMk/>
+          <pc:sldMk cId="3219435398" sldId="315"/>
+        </pc:sldMkLst>
+        <pc:spChg chg="mod">
+          <ac:chgData name="Johanne Provençal" userId="S::johanne.provencal@crdcn.ca::91505ee1-49e7-4482-8c3c-80c96976f4a1" providerId="AD" clId="Web-{E29F630B-0884-232A-F2FC-A4288BBADA5D}" dt="2025-03-06T14:10:14.821" v="35" actId="20577"/>
+          <ac:spMkLst>
+            <pc:docMk/>
+            <pc:sldMk cId="3219435398" sldId="315"/>
+            <ac:spMk id="19" creationId="{D0F4BF54-45CB-2DF6-4383-A2056DC25BEF}"/>
+          </ac:spMkLst>
+        </pc:spChg>
+      </pc:sldChg>
+    </pc:docChg>
+  </pc:docChgLst>
+  <pc:docChgLst>
+    <pc:chgData name="Johanne Provençal" userId="S::johanne.provencal@crdcn.ca::91505ee1-49e7-4482-8c3c-80c96976f4a1" providerId="AD" clId="Web-{36538F86-BD32-45CF-98FA-4155F6A0CC0A}"/>
+    <pc:docChg chg="delSld modSld">
+      <pc:chgData name="Johanne Provençal" userId="S::johanne.provencal@crdcn.ca::91505ee1-49e7-4482-8c3c-80c96976f4a1" providerId="AD" clId="Web-{36538F86-BD32-45CF-98FA-4155F6A0CC0A}" dt="2024-05-29T20:22:10.033" v="119" actId="1076"/>
+      <pc:docMkLst>
+        <pc:docMk/>
+      </pc:docMkLst>
+      <pc:sldChg chg="modSp">
+        <pc:chgData name="Johanne Provençal" userId="S::johanne.provencal@crdcn.ca::91505ee1-49e7-4482-8c3c-80c96976f4a1" providerId="AD" clId="Web-{36538F86-BD32-45CF-98FA-4155F6A0CC0A}" dt="2024-05-29T20:21:41.080" v="117" actId="20577"/>
+        <pc:sldMkLst>
+          <pc:docMk/>
+          <pc:sldMk cId="59341068" sldId="284"/>
+        </pc:sldMkLst>
+      </pc:sldChg>
+    </pc:docChg>
+  </pc:docChgLst>
+</pc:chgInfo>
 </file>
 
 <file path=ppt/notesMasters/notesMaster1.xml><?xml version="1.0" encoding="utf-8"?>
@@ -258,7 +2242,7 @@
           <a:p>
             <a:fld id="{372866AB-5879-457F-8F72-7A0AF9BD56BB}" type="datetimeFigureOut">
               <a:rPr lang="en-CA" smtClean="0"/>
-              <a:t>2025-06-15</a:t>
+              <a:t>2025-06-16</a:t>
             </a:fld>
             <a:endParaRPr lang="en-CA"/>
           </a:p>
@@ -675,7 +2659,7 @@
           <a:p>
             <a:fld id="{17F47CE0-5509-430C-BE72-EA262CB2E4BD}" type="datetimeFigureOut">
               <a:rPr lang="en-CA" smtClean="0"/>
-              <a:t>2025-06-15</a:t>
+              <a:t>2025-06-16</a:t>
             </a:fld>
             <a:endParaRPr lang="en-CA"/>
           </a:p>
@@ -928,7 +2912,7 @@
             <a:fld id="{1D8BD707-D9CF-40AE-B4C6-C98DA3205C09}" type="datetimeFigureOut">
               <a:rPr lang="en-US" smtClean="0"/>
               <a:pPr/>
-              <a:t>6/15/2025</a:t>
+              <a:t>6/16/2025</a:t>
             </a:fld>
             <a:endParaRPr lang="en-US"/>
           </a:p>
@@ -1093,7 +3077,7 @@
             <a:fld id="{1D8BD707-D9CF-40AE-B4C6-C98DA3205C09}" type="datetimeFigureOut">
               <a:rPr lang="en-US" smtClean="0"/>
               <a:pPr/>
-              <a:t>6/15/2025</a:t>
+              <a:t>6/16/2025</a:t>
             </a:fld>
             <a:endParaRPr lang="en-US"/>
           </a:p>
@@ -1335,7 +3319,7 @@
             <a:fld id="{1D8BD707-D9CF-40AE-B4C6-C98DA3205C09}" type="datetimeFigureOut">
               <a:rPr lang="en-US" smtClean="0"/>
               <a:pPr/>
-              <a:t>6/15/2025</a:t>
+              <a:t>6/16/2025</a:t>
             </a:fld>
             <a:endParaRPr lang="en-US"/>
           </a:p>
@@ -1622,7 +3606,7 @@
             <a:fld id="{1D8BD707-D9CF-40AE-B4C6-C98DA3205C09}" type="datetimeFigureOut">
               <a:rPr lang="en-US" smtClean="0"/>
               <a:pPr/>
-              <a:t>6/15/2025</a:t>
+              <a:t>6/16/2025</a:t>
             </a:fld>
             <a:endParaRPr lang="en-US"/>
           </a:p>
@@ -2043,7 +4027,7 @@
             <a:fld id="{1D8BD707-D9CF-40AE-B4C6-C98DA3205C09}" type="datetimeFigureOut">
               <a:rPr lang="en-US" smtClean="0"/>
               <a:pPr/>
-              <a:t>6/15/2025</a:t>
+              <a:t>6/16/2025</a:t>
             </a:fld>
             <a:endParaRPr lang="en-US"/>
           </a:p>
@@ -2290,7 +4274,7 @@
             <a:fld id="{1D8BD707-D9CF-40AE-B4C6-C98DA3205C09}" type="datetimeFigureOut">
               <a:rPr lang="en-US" smtClean="0"/>
               <a:pPr/>
-              <a:t>6/15/2025</a:t>
+              <a:t>6/16/2025</a:t>
             </a:fld>
             <a:endParaRPr lang="en-US"/>
           </a:p>
@@ -2572,7 +4556,7 @@
             <a:fld id="{1D8BD707-D9CF-40AE-B4C6-C98DA3205C09}" type="datetimeFigureOut">
               <a:rPr lang="en-US" smtClean="0"/>
               <a:pPr/>
-              <a:t>6/15/2025</a:t>
+              <a:t>6/16/2025</a:t>
             </a:fld>
             <a:endParaRPr lang="en-US"/>
           </a:p>
@@ -2988,7 +4972,7 @@
             <a:fld id="{1D8BD707-D9CF-40AE-B4C6-C98DA3205C09}" type="datetimeFigureOut">
               <a:rPr lang="en-US" smtClean="0"/>
               <a:pPr/>
-              <a:t>6/15/2025</a:t>
+              <a:t>6/16/2025</a:t>
             </a:fld>
             <a:endParaRPr lang="en-US"/>
           </a:p>
@@ -3102,7 +5086,7 @@
             <a:fld id="{1D8BD707-D9CF-40AE-B4C6-C98DA3205C09}" type="datetimeFigureOut">
               <a:rPr lang="en-US" smtClean="0"/>
               <a:pPr/>
-              <a:t>6/15/2025</a:t>
+              <a:t>6/16/2025</a:t>
             </a:fld>
             <a:endParaRPr lang="en-US"/>
           </a:p>
@@ -3194,7 +5178,7 @@
             <a:fld id="{1D8BD707-D9CF-40AE-B4C6-C98DA3205C09}" type="datetimeFigureOut">
               <a:rPr lang="en-US" smtClean="0"/>
               <a:pPr/>
-              <a:t>6/15/2025</a:t>
+              <a:t>6/16/2025</a:t>
             </a:fld>
             <a:endParaRPr lang="en-US"/>
           </a:p>
@@ -3378,7 +5362,7 @@
           <a:p>
             <a:fld id="{17F47CE0-5509-430C-BE72-EA262CB2E4BD}" type="datetimeFigureOut">
               <a:rPr lang="en-CA" smtClean="0"/>
-              <a:t>2025-06-15</a:t>
+              <a:t>2025-06-16</a:t>
             </a:fld>
             <a:endParaRPr lang="en-CA"/>
           </a:p>
@@ -3666,7 +5650,7 @@
             <a:fld id="{1D8BD707-D9CF-40AE-B4C6-C98DA3205C09}" type="datetimeFigureOut">
               <a:rPr lang="en-US" smtClean="0"/>
               <a:pPr/>
-              <a:t>6/15/2025</a:t>
+              <a:t>6/16/2025</a:t>
             </a:fld>
             <a:endParaRPr lang="en-US"/>
           </a:p>
@@ -3920,7 +5904,7 @@
             <a:fld id="{1D8BD707-D9CF-40AE-B4C6-C98DA3205C09}" type="datetimeFigureOut">
               <a:rPr lang="en-US" smtClean="0"/>
               <a:pPr/>
-              <a:t>6/15/2025</a:t>
+              <a:t>6/16/2025</a:t>
             </a:fld>
             <a:endParaRPr lang="en-US"/>
           </a:p>
@@ -4197,7 +6181,7 @@
             <a:fld id="{1D8BD707-D9CF-40AE-B4C6-C98DA3205C09}" type="datetimeFigureOut">
               <a:rPr lang="en-US" smtClean="0"/>
               <a:pPr/>
-              <a:t>6/15/2025</a:t>
+              <a:t>6/16/2025</a:t>
             </a:fld>
             <a:endParaRPr lang="en-US"/>
           </a:p>
@@ -4446,7 +6430,7 @@
             <a:fld id="{1D8BD707-D9CF-40AE-B4C6-C98DA3205C09}" type="datetimeFigureOut">
               <a:rPr lang="en-US" smtClean="0"/>
               <a:pPr/>
-              <a:t>6/15/2025</a:t>
+              <a:t>6/16/2025</a:t>
             </a:fld>
             <a:endParaRPr lang="en-US"/>
           </a:p>
@@ -4611,7 +6595,7 @@
             <a:fld id="{1D8BD707-D9CF-40AE-B4C6-C98DA3205C09}" type="datetimeFigureOut">
               <a:rPr lang="en-US" smtClean="0"/>
               <a:pPr/>
-              <a:t>6/15/2025</a:t>
+              <a:t>6/16/2025</a:t>
             </a:fld>
             <a:endParaRPr lang="en-US"/>
           </a:p>
@@ -4786,7 +6770,7 @@
             <a:fld id="{1D8BD707-D9CF-40AE-B4C6-C98DA3205C09}" type="datetimeFigureOut">
               <a:rPr lang="en-US" smtClean="0"/>
               <a:pPr/>
-              <a:t>6/15/2025</a:t>
+              <a:t>6/16/2025</a:t>
             </a:fld>
             <a:endParaRPr lang="en-US"/>
           </a:p>
@@ -5046,7 +7030,7 @@
           <a:p>
             <a:fld id="{17F47CE0-5509-430C-BE72-EA262CB2E4BD}" type="datetimeFigureOut">
               <a:rPr lang="en-CA" smtClean="0"/>
-              <a:t>2025-06-15</a:t>
+              <a:t>2025-06-16</a:t>
             </a:fld>
             <a:endParaRPr lang="en-CA"/>
           </a:p>
@@ -5314,7 +7298,7 @@
           <a:p>
             <a:fld id="{17F47CE0-5509-430C-BE72-EA262CB2E4BD}" type="datetimeFigureOut">
               <a:rPr lang="en-CA" smtClean="0"/>
-              <a:t>2025-06-15</a:t>
+              <a:t>2025-06-16</a:t>
             </a:fld>
             <a:endParaRPr lang="en-CA"/>
           </a:p>
@@ -5729,7 +7713,7 @@
           <a:p>
             <a:fld id="{17F47CE0-5509-430C-BE72-EA262CB2E4BD}" type="datetimeFigureOut">
               <a:rPr lang="en-CA" smtClean="0"/>
-              <a:t>2025-06-15</a:t>
+              <a:t>2025-06-16</a:t>
             </a:fld>
             <a:endParaRPr lang="en-CA"/>
           </a:p>
@@ -5871,7 +7855,7 @@
           <a:p>
             <a:fld id="{17F47CE0-5509-430C-BE72-EA262CB2E4BD}" type="datetimeFigureOut">
               <a:rPr lang="en-CA" smtClean="0"/>
-              <a:t>2025-06-15</a:t>
+              <a:t>2025-06-16</a:t>
             </a:fld>
             <a:endParaRPr lang="en-CA"/>
           </a:p>
@@ -5984,7 +7968,7 @@
           <a:p>
             <a:fld id="{17F47CE0-5509-430C-BE72-EA262CB2E4BD}" type="datetimeFigureOut">
               <a:rPr lang="en-CA" smtClean="0"/>
-              <a:t>2025-06-15</a:t>
+              <a:t>2025-06-16</a:t>
             </a:fld>
             <a:endParaRPr lang="en-CA"/>
           </a:p>
@@ -6297,7 +8281,7 @@
           <a:p>
             <a:fld id="{17F47CE0-5509-430C-BE72-EA262CB2E4BD}" type="datetimeFigureOut">
               <a:rPr lang="en-CA" smtClean="0"/>
-              <a:t>2025-06-15</a:t>
+              <a:t>2025-06-16</a:t>
             </a:fld>
             <a:endParaRPr lang="en-CA"/>
           </a:p>
@@ -6586,7 +8570,7 @@
           <a:p>
             <a:fld id="{17F47CE0-5509-430C-BE72-EA262CB2E4BD}" type="datetimeFigureOut">
               <a:rPr lang="en-CA" smtClean="0"/>
-              <a:t>2025-06-15</a:t>
+              <a:t>2025-06-16</a:t>
             </a:fld>
             <a:endParaRPr lang="en-CA"/>
           </a:p>
@@ -6865,7 +8849,7 @@
           <a:p>
             <a:fld id="{17F47CE0-5509-430C-BE72-EA262CB2E4BD}" type="datetimeFigureOut">
               <a:rPr lang="en-CA" smtClean="0"/>
-              <a:t>2025-06-15</a:t>
+              <a:t>2025-06-16</a:t>
             </a:fld>
             <a:endParaRPr lang="en-CA"/>
           </a:p>
@@ -7414,7 +9398,7 @@
             <a:fld id="{1D8BD707-D9CF-40AE-B4C6-C98DA3205C09}" type="datetimeFigureOut">
               <a:rPr lang="en-US" smtClean="0"/>
               <a:pPr/>
-              <a:t>6/15/2025</a:t>
+              <a:t>6/16/2025</a:t>
             </a:fld>
             <a:endParaRPr lang="en-US"/>
           </a:p>
@@ -8199,300 +10183,6 @@
   <p:cSld>
     <p:spTree>
       <p:nvGrpSpPr>
-        <p:cNvPr id="1" name=""/>
-        <p:cNvGrpSpPr/>
-        <p:nvPr/>
-      </p:nvGrpSpPr>
-      <p:grpSpPr>
-        <a:xfrm>
-          <a:off x="0" y="0"/>
-          <a:ext cx="0" cy="0"/>
-          <a:chOff x="0" y="0"/>
-          <a:chExt cx="0" cy="0"/>
-        </a:xfrm>
-      </p:grpSpPr>
-      <p:sp>
-        <p:nvSpPr>
-          <p:cNvPr id="19" name="TextBox 18">
-            <a:extLst>
-              <a:ext uri="{FF2B5EF4-FFF2-40B4-BE49-F238E27FC236}">
-                <a16:creationId xmlns:a16="http://schemas.microsoft.com/office/drawing/2014/main" id="{795E566D-9B19-4429-817F-335B8C788DAE}"/>
-              </a:ext>
-            </a:extLst>
-          </p:cNvPr>
-          <p:cNvSpPr txBox="1"/>
-          <p:nvPr/>
-        </p:nvSpPr>
-        <p:spPr>
-          <a:xfrm>
-            <a:off x="247135" y="1190212"/>
-            <a:ext cx="11809743" cy="4862870"/>
-          </a:xfrm>
-          <a:prstGeom prst="rect">
-            <a:avLst/>
-          </a:prstGeom>
-          <a:noFill/>
-        </p:spPr>
-        <p:txBody>
-          <a:bodyPr wrap="square" lIns="91440" tIns="45720" rIns="91440" bIns="45720" anchor="t">
-            <a:spAutoFit/>
-          </a:bodyPr>
-          <a:lstStyle/>
-          <a:p>
-            <a:pPr fontAlgn="base">
-              <a:spcBef>
-                <a:spcPts val="1200"/>
-              </a:spcBef>
-              <a:spcAft>
-                <a:spcPts val="600"/>
-              </a:spcAft>
-            </a:pPr>
-            <a:r>
-              <a:rPr lang="en-US" sz="3200" b="1">
-                <a:solidFill>
-                  <a:schemeClr val="accent1"/>
-                </a:solidFill>
-                <a:latin typeface="Arial"/>
-                <a:cs typeface="Arial"/>
-              </a:rPr>
-              <a:t>What Network researchers do</a:t>
-            </a:r>
-          </a:p>
-          <a:p>
-            <a:pPr fontAlgn="base">
-              <a:spcBef>
-                <a:spcPts val="600"/>
-              </a:spcBef>
-              <a:spcAft>
-                <a:spcPts val="1200"/>
-              </a:spcAft>
-            </a:pPr>
-            <a:r>
-              <a:rPr lang="en-US" sz="2000"/>
-              <a:t>CRDCN researchers are independent, credible and highly skilled in data analysis and research methods.</a:t>
-            </a:r>
-          </a:p>
-          <a:p>
-            <a:pPr fontAlgn="base">
-              <a:spcBef>
-                <a:spcPts val="600"/>
-              </a:spcBef>
-              <a:spcAft>
-                <a:spcPts val="600"/>
-              </a:spcAft>
-            </a:pPr>
-            <a:r>
-              <a:rPr lang="en-US" sz="2000" b="1">
-                <a:solidFill>
-                  <a:srgbClr val="63656A"/>
-                </a:solidFill>
-              </a:rPr>
-              <a:t>The CRDCN central team can leverage the Network to</a:t>
-            </a:r>
-            <a:r>
-              <a:rPr lang="en-US" sz="2000">
-                <a:solidFill>
-                  <a:srgbClr val="63656A"/>
-                </a:solidFill>
-              </a:rPr>
-              <a:t>:</a:t>
-            </a:r>
-          </a:p>
-          <a:p>
-            <a:pPr marL="342900" indent="-342900" fontAlgn="base">
-              <a:spcBef>
-                <a:spcPts val="600"/>
-              </a:spcBef>
-              <a:spcAft>
-                <a:spcPts val="600"/>
-              </a:spcAft>
-              <a:buFont typeface="Wingdings" panose="05000000000000000000" pitchFamily="2" charset="2"/>
-              <a:buChar char="§"/>
-            </a:pPr>
-            <a:r>
-              <a:rPr lang="en-US" sz="2000" i="1">
-                <a:solidFill>
-                  <a:schemeClr val="accent1"/>
-                </a:solidFill>
-              </a:rPr>
-              <a:t>help fill gaps </a:t>
-            </a:r>
-            <a:r>
-              <a:rPr lang="en-US" sz="2000"/>
-              <a:t>in data analysis and research capacity</a:t>
-            </a:r>
-          </a:p>
-          <a:p>
-            <a:pPr marL="342900" indent="-342900" fontAlgn="base">
-              <a:spcBef>
-                <a:spcPts val="600"/>
-              </a:spcBef>
-              <a:spcAft>
-                <a:spcPts val="600"/>
-              </a:spcAft>
-              <a:buFont typeface="Wingdings" panose="05000000000000000000" pitchFamily="2" charset="2"/>
-              <a:buChar char="§"/>
-            </a:pPr>
-            <a:r>
-              <a:rPr lang="en-US" sz="2000" i="1">
-                <a:solidFill>
-                  <a:schemeClr val="accent1"/>
-                </a:solidFill>
-              </a:rPr>
-              <a:t>advise </a:t>
-            </a:r>
-            <a:r>
-              <a:rPr lang="en-US" sz="2000"/>
-              <a:t>on data sources and data analysis to </a:t>
-            </a:r>
-            <a:r>
-              <a:rPr lang="en-US" sz="2000" i="1">
-                <a:solidFill>
-                  <a:schemeClr val="accent1"/>
-                </a:solidFill>
-              </a:rPr>
-              <a:t>provide insights </a:t>
-            </a:r>
-            <a:r>
-              <a:rPr lang="en-US" sz="2000"/>
-              <a:t>in priority areas</a:t>
-            </a:r>
-          </a:p>
-          <a:p>
-            <a:pPr marL="342900" indent="-342900" fontAlgn="base">
-              <a:spcBef>
-                <a:spcPts val="600"/>
-              </a:spcBef>
-              <a:spcAft>
-                <a:spcPts val="600"/>
-              </a:spcAft>
-              <a:buFont typeface="Wingdings" panose="05000000000000000000" pitchFamily="2" charset="2"/>
-              <a:buChar char="§"/>
-            </a:pPr>
-            <a:r>
-              <a:rPr lang="en-US" sz="2000"/>
-              <a:t>provide an </a:t>
-            </a:r>
-            <a:r>
-              <a:rPr lang="en-US" sz="2000" i="1">
-                <a:solidFill>
-                  <a:schemeClr val="accent1"/>
-                </a:solidFill>
-              </a:rPr>
-              <a:t>assessment of research questions and finding</a:t>
-            </a:r>
-            <a:r>
-              <a:rPr lang="en-US" sz="2000"/>
-              <a:t>​s</a:t>
-            </a:r>
-          </a:p>
-          <a:p>
-            <a:pPr marL="342900" indent="-342900" fontAlgn="base">
-              <a:spcBef>
-                <a:spcPts val="600"/>
-              </a:spcBef>
-              <a:spcAft>
-                <a:spcPts val="600"/>
-              </a:spcAft>
-              <a:buFont typeface="Wingdings" panose="05000000000000000000" pitchFamily="2" charset="2"/>
-              <a:buChar char="§"/>
-            </a:pPr>
-            <a:r>
-              <a:rPr lang="en-US" sz="2000"/>
-              <a:t>conduct data analysis and research to </a:t>
-            </a:r>
-            <a:r>
-              <a:rPr lang="en-US" sz="2000" i="1">
-                <a:solidFill>
-                  <a:schemeClr val="accent1"/>
-                </a:solidFill>
-              </a:rPr>
-              <a:t>inform policy, programs and practice</a:t>
-            </a:r>
-            <a:endParaRPr lang="en-US" sz="2000"/>
-          </a:p>
-          <a:p>
-            <a:pPr marL="342900" indent="-342900" fontAlgn="base">
-              <a:spcBef>
-                <a:spcPts val="600"/>
-              </a:spcBef>
-              <a:spcAft>
-                <a:spcPts val="600"/>
-              </a:spcAft>
-              <a:buFont typeface="Wingdings" panose="05000000000000000000" pitchFamily="2" charset="2"/>
-              <a:buChar char="§"/>
-            </a:pPr>
-            <a:r>
-              <a:rPr lang="en-US" sz="2000" i="1">
-                <a:solidFill>
-                  <a:schemeClr val="accent1"/>
-                </a:solidFill>
-              </a:rPr>
-              <a:t>diversify and enrich engagement </a:t>
-            </a:r>
-            <a:r>
-              <a:rPr lang="en-US" sz="2000"/>
-              <a:t>with stakeholders​</a:t>
-            </a:r>
-          </a:p>
-          <a:p>
-            <a:pPr marL="342900" indent="-342900" fontAlgn="base">
-              <a:spcBef>
-                <a:spcPts val="600"/>
-              </a:spcBef>
-              <a:spcAft>
-                <a:spcPts val="600"/>
-              </a:spcAft>
-              <a:buFont typeface="Wingdings" panose="05000000000000000000" pitchFamily="2" charset="2"/>
-              <a:buChar char="§"/>
-            </a:pPr>
-            <a:r>
-              <a:rPr lang="en-US" sz="2000"/>
-              <a:t>share research findings to </a:t>
-            </a:r>
-            <a:r>
-              <a:rPr lang="en-US" sz="2000" i="1">
-                <a:solidFill>
-                  <a:schemeClr val="accent1"/>
-                </a:solidFill>
-              </a:rPr>
-              <a:t>enhance public understanding and trust in science/research</a:t>
-            </a:r>
-            <a:endParaRPr lang="en-US" sz="2000"/>
-          </a:p>
-          <a:p>
-            <a:pPr marL="285750" indent="-285750" algn="l" rtl="0" fontAlgn="base">
-              <a:spcBef>
-                <a:spcPts val="600"/>
-              </a:spcBef>
-              <a:spcAft>
-                <a:spcPts val="600"/>
-              </a:spcAft>
-              <a:buFont typeface="Wingdings" panose="05000000000000000000" pitchFamily="2" charset="2"/>
-              <a:buChar char="Ø"/>
-            </a:pPr>
-            <a:endParaRPr lang="en-US"/>
-          </a:p>
-        </p:txBody>
-      </p:sp>
-    </p:spTree>
-    <p:extLst>
-      <p:ext uri="{BB962C8B-B14F-4D97-AF65-F5344CB8AC3E}">
-        <p14:creationId xmlns:p14="http://schemas.microsoft.com/office/powerpoint/2010/main" val="624593502"/>
-      </p:ext>
-    </p:extLst>
-  </p:cSld>
-  <p:clrMapOvr>
-    <a:masterClrMapping/>
-  </p:clrMapOvr>
-</p:sld>
-</file>
-
-<file path=ppt/slides/slide11.xml><?xml version="1.0" encoding="utf-8"?>
-<p:sld xmlns:a="http://schemas.openxmlformats.org/drawingml/2006/main" xmlns:r="http://schemas.openxmlformats.org/officeDocument/2006/relationships" xmlns:p="http://schemas.openxmlformats.org/presentationml/2006/main">
-  <p:cSld>
-    <p:spTree>
-      <p:nvGrpSpPr>
         <p:cNvPr id="1" name="">
           <a:extLst>
             <a:ext uri="{FF2B5EF4-FFF2-40B4-BE49-F238E27FC236}">
@@ -8827,7 +10517,7 @@
 </p:sld>
 </file>
 
-<file path=ppt/slides/slide12.xml><?xml version="1.0" encoding="utf-8"?>
+<file path=ppt/slides/slide11.xml><?xml version="1.0" encoding="utf-8"?>
 <p:sld xmlns:a="http://schemas.openxmlformats.org/drawingml/2006/main" xmlns:r="http://schemas.openxmlformats.org/officeDocument/2006/relationships" xmlns:p="http://schemas.openxmlformats.org/presentationml/2006/main">
   <p:cSld>
     <p:spTree>
@@ -8835,7 +10525,7 @@
         <p:cNvPr id="1" name="">
           <a:extLst>
             <a:ext uri="{FF2B5EF4-FFF2-40B4-BE49-F238E27FC236}">
-              <a16:creationId xmlns:a16="http://schemas.microsoft.com/office/drawing/2014/main" id="{AE1AFDE6-C245-8C8C-A2C8-94FCFC26102D}"/>
+              <a16:creationId xmlns:a16="http://schemas.microsoft.com/office/drawing/2014/main" id="{E7B30BB1-BE21-26EF-036F-AD895ACB7A49}"/>
             </a:ext>
           </a:extLst>
         </p:cNvPr>
@@ -8855,7 +10545,7 @@
           <p:cNvPr id="19" name="TextBox 18">
             <a:extLst>
               <a:ext uri="{FF2B5EF4-FFF2-40B4-BE49-F238E27FC236}">
-                <a16:creationId xmlns:a16="http://schemas.microsoft.com/office/drawing/2014/main" id="{2934C405-AFE6-A1A4-F9EC-785E5D4DEE08}"/>
+                <a16:creationId xmlns:a16="http://schemas.microsoft.com/office/drawing/2014/main" id="{D0F4BF54-45CB-2DF6-4383-A2056DC25BEF}"/>
               </a:ext>
             </a:extLst>
           </p:cNvPr>
@@ -8864,8 +10554,8 @@
         </p:nvSpPr>
         <p:spPr>
           <a:xfrm>
-            <a:off x="0" y="2836132"/>
-            <a:ext cx="12056878" cy="584775"/>
+            <a:off x="247135" y="1304512"/>
+            <a:ext cx="11034275" cy="5401479"/>
           </a:xfrm>
           <a:prstGeom prst="rect">
             <a:avLst/>
@@ -8878,31 +10568,191 @@
           </a:bodyPr>
           <a:lstStyle/>
           <a:p>
-            <a:pPr algn="ctr" rtl="0" fontAlgn="base">
+            <a:pPr fontAlgn="base">
               <a:spcBef>
                 <a:spcPts val="1200"/>
               </a:spcBef>
               <a:spcAft>
-                <a:spcPts val="1800"/>
+                <a:spcPts val="1200"/>
               </a:spcAft>
             </a:pPr>
             <a:r>
-              <a:rPr lang="en-US" sz="3200" b="1">
+              <a:rPr lang="en-US" sz="3200" b="1" dirty="0">
                 <a:solidFill>
                   <a:schemeClr val="accent1"/>
                 </a:solidFill>
-                <a:latin typeface="Arial" panose="020B0604020202020204" pitchFamily="34" charset="0"/>
-                <a:cs typeface="Arial" panose="020B0604020202020204" pitchFamily="34" charset="0"/>
+                <a:latin typeface="Arial"/>
+                <a:cs typeface="Arial"/>
               </a:rPr>
-              <a:t>CRDCN mechanisms to connect research and policy</a:t>
-            </a:r>
+              <a:t>CRDCN policy, data and research collaboration circles</a:t>
+            </a:r>
+          </a:p>
+          <a:p>
+            <a:pPr fontAlgn="base">
+              <a:spcAft>
+                <a:spcPts val="600"/>
+              </a:spcAft>
+            </a:pPr>
+            <a:r>
+              <a:rPr lang="en-US" sz="2000" b="1" dirty="0"/>
+              <a:t>Policy and data circles</a:t>
+            </a:r>
+            <a:endParaRPr lang="en-US" sz="2000" dirty="0"/>
+          </a:p>
+          <a:p>
+            <a:pPr marL="342900" indent="-342900" fontAlgn="base">
+              <a:buFont typeface="Arial" panose="020B0604020202020204" pitchFamily="34" charset="0"/>
+              <a:buChar char="•"/>
+            </a:pPr>
+            <a:r>
+              <a:rPr lang="en-US" sz="2000" dirty="0"/>
+              <a:t>In October 2024, invitation sent to CRDCN researchers to opt into data or policy circles. </a:t>
+            </a:r>
+          </a:p>
+          <a:p>
+            <a:pPr marL="342900" indent="-342900" fontAlgn="base">
+              <a:spcAft>
+                <a:spcPts val="600"/>
+              </a:spcAft>
+              <a:buFont typeface="Arial" panose="020B0604020202020204" pitchFamily="34" charset="0"/>
+              <a:buChar char="•"/>
+            </a:pPr>
+            <a:r>
+              <a:rPr lang="en-US" sz="2000" dirty="0"/>
+              <a:t>Top research disciplines of respondents: economics, epidemiology, sociology, demography, and public health. CRDCN will be hosting policy circles in the fall of 2025.</a:t>
+            </a:r>
+          </a:p>
+          <a:p>
+            <a:pPr marL="342900" indent="-342900" fontAlgn="base">
+              <a:spcAft>
+                <a:spcPts val="1800"/>
+              </a:spcAft>
+              <a:buFont typeface="Arial" panose="020B0604020202020204" pitchFamily="34" charset="0"/>
+              <a:buChar char="•"/>
+            </a:pPr>
+            <a:r>
+              <a:rPr lang="en-US" sz="2000" dirty="0"/>
+              <a:t>Data circles: </a:t>
+            </a:r>
+            <a:r>
+              <a:rPr lang="en-US" sz="2000" b="0" i="0" dirty="0">
+                <a:effectLst/>
+              </a:rPr>
+              <a:t>Census, Canadian Community Health Survey (CCHS), Longitudinal Immigration Database (IMDB), Education and Labour Market Longitudinal Platform (ELMLP), and the Longitudinal Administrative Databank (LAD). </a:t>
+            </a:r>
+            <a:endParaRPr lang="en-US" sz="2000" dirty="0"/>
+          </a:p>
+          <a:p>
+            <a:pPr fontAlgn="base">
+              <a:spcAft>
+                <a:spcPts val="600"/>
+              </a:spcAft>
+            </a:pPr>
+            <a:r>
+              <a:rPr lang="en-US" sz="2000" b="1" dirty="0"/>
+              <a:t>Research collaboration circles</a:t>
+            </a:r>
+          </a:p>
+          <a:p>
+            <a:pPr marL="342900" indent="-342900" fontAlgn="base">
+              <a:spcAft>
+                <a:spcPts val="600"/>
+              </a:spcAft>
+              <a:buFont typeface="Wingdings" panose="05000000000000000000" pitchFamily="2" charset="2"/>
+              <a:buChar char="§"/>
+            </a:pPr>
+            <a:r>
+              <a:rPr lang="en-US" sz="2000" dirty="0"/>
+              <a:t>In December 2025, CRDCN will be inviting researchers to opt into research collaboration circles based on interest expressed by the CRDCN research community.</a:t>
+            </a:r>
+          </a:p>
+          <a:p>
+            <a:pPr marL="342900" indent="-342900">
+              <a:spcAft>
+                <a:spcPts val="600"/>
+              </a:spcAft>
+              <a:buFont typeface="Wingdings" panose="05000000000000000000" pitchFamily="2" charset="2"/>
+              <a:buChar char="§"/>
+            </a:pPr>
+            <a:endParaRPr lang="en-US" sz="2000" dirty="0"/>
+          </a:p>
+          <a:p>
+            <a:pPr marL="342900" indent="-342900">
+              <a:spcAft>
+                <a:spcPts val="600"/>
+              </a:spcAft>
+              <a:buFont typeface="Wingdings" panose="05000000000000000000" pitchFamily="2" charset="2"/>
+              <a:buChar char="§"/>
+            </a:pPr>
+            <a:endParaRPr lang="en-US" sz="2000" dirty="0"/>
+          </a:p>
+          <a:p>
+            <a:pPr marL="342900" indent="-342900" fontAlgn="base">
+              <a:spcAft>
+                <a:spcPts val="600"/>
+              </a:spcAft>
+              <a:buFont typeface="Wingdings" panose="05000000000000000000" pitchFamily="2" charset="2"/>
+              <a:buChar char="§"/>
+            </a:pPr>
+            <a:endParaRPr lang="en-US"/>
+          </a:p>
+        </p:txBody>
+      </p:sp>
+      <p:sp>
+        <p:nvSpPr>
+          <p:cNvPr id="3" name="TextBox 2">
+            <a:extLst>
+              <a:ext uri="{FF2B5EF4-FFF2-40B4-BE49-F238E27FC236}">
+                <a16:creationId xmlns:a16="http://schemas.microsoft.com/office/drawing/2014/main" id="{D0978DE2-31AE-D9EA-CF6A-8BE0E4F0E721}"/>
+              </a:ext>
+            </a:extLst>
+          </p:cNvPr>
+          <p:cNvSpPr txBox="1"/>
+          <p:nvPr/>
+        </p:nvSpPr>
+        <p:spPr>
+          <a:xfrm>
+            <a:off x="55639" y="5885544"/>
+            <a:ext cx="10097102" cy="400110"/>
+          </a:xfrm>
+          <a:prstGeom prst="rect">
+            <a:avLst/>
+          </a:prstGeom>
+          <a:noFill/>
+        </p:spPr>
+        <p:txBody>
+          <a:bodyPr rot="0" spcFirstLastPara="0" vertOverflow="overflow" horzOverflow="overflow" vert="horz" wrap="square" lIns="91440" tIns="45720" rIns="91440" bIns="45720" numCol="1" spcCol="0" rtlCol="0" fromWordArt="0" anchor="t" anchorCtr="0" forceAA="0" compatLnSpc="1">
+            <a:prstTxWarp prst="textNoShape">
+              <a:avLst/>
+            </a:prstTxWarp>
+            <a:spAutoFit/>
+          </a:bodyPr>
+          <a:lstStyle/>
+          <a:p>
+            <a:r>
+              <a:rPr lang="en-US" sz="2000" b="1" dirty="0">
+                <a:solidFill>
+                  <a:srgbClr val="527CA6"/>
+                </a:solidFill>
+              </a:rPr>
+              <a:t>Question to the group: </a:t>
+            </a:r>
+            <a:r>
+              <a:rPr lang="en-US" sz="2000" dirty="0">
+                <a:solidFill>
+                  <a:srgbClr val="63656A"/>
+                </a:solidFill>
+              </a:rPr>
+              <a:t>What research, policy or data circles would be of interest to you? </a:t>
+            </a:r>
+            <a:endParaRPr lang="en-US" sz="2000" dirty="0"/>
           </a:p>
         </p:txBody>
       </p:sp>
     </p:spTree>
     <p:extLst>
       <p:ext uri="{BB962C8B-B14F-4D97-AF65-F5344CB8AC3E}">
-        <p14:creationId xmlns:p14="http://schemas.microsoft.com/office/powerpoint/2010/main" val="2875399862"/>
+        <p14:creationId xmlns:p14="http://schemas.microsoft.com/office/powerpoint/2010/main" val="3219435398"/>
       </p:ext>
     </p:extLst>
   </p:cSld>
@@ -8912,7 +10762,7 @@
 </p:sld>
 </file>
 
-<file path=ppt/slides/slide13.xml><?xml version="1.0" encoding="utf-8"?>
+<file path=ppt/slides/slide12.xml><?xml version="1.0" encoding="utf-8"?>
 <p:sld xmlns:a="http://schemas.openxmlformats.org/drawingml/2006/main" xmlns:r="http://schemas.openxmlformats.org/officeDocument/2006/relationships" xmlns:p="http://schemas.openxmlformats.org/presentationml/2006/main">
   <p:cSld>
     <p:spTree>
@@ -9149,18 +10999,12 @@
 </p:sld>
 </file>
 
-<file path=ppt/slides/slide14.xml><?xml version="1.0" encoding="utf-8"?>
+<file path=ppt/slides/slide13.xml><?xml version="1.0" encoding="utf-8"?>
 <p:sld xmlns:a="http://schemas.openxmlformats.org/drawingml/2006/main" xmlns:r="http://schemas.openxmlformats.org/officeDocument/2006/relationships" xmlns:p="http://schemas.openxmlformats.org/presentationml/2006/main">
   <p:cSld>
     <p:spTree>
       <p:nvGrpSpPr>
-        <p:cNvPr id="1" name="">
-          <a:extLst>
-            <a:ext uri="{FF2B5EF4-FFF2-40B4-BE49-F238E27FC236}">
-              <a16:creationId xmlns:a16="http://schemas.microsoft.com/office/drawing/2014/main" id="{E7B30BB1-BE21-26EF-036F-AD895ACB7A49}"/>
-            </a:ext>
-          </a:extLst>
-        </p:cNvPr>
+        <p:cNvPr id="1" name=""/>
         <p:cNvGrpSpPr/>
         <p:nvPr/>
       </p:nvGrpSpPr>
@@ -9177,7 +11021,7 @@
           <p:cNvPr id="19" name="TextBox 18">
             <a:extLst>
               <a:ext uri="{FF2B5EF4-FFF2-40B4-BE49-F238E27FC236}">
-                <a16:creationId xmlns:a16="http://schemas.microsoft.com/office/drawing/2014/main" id="{D0F4BF54-45CB-2DF6-4383-A2056DC25BEF}"/>
+                <a16:creationId xmlns:a16="http://schemas.microsoft.com/office/drawing/2014/main" id="{795E566D-9B19-4429-817F-335B8C788DAE}"/>
               </a:ext>
             </a:extLst>
           </p:cNvPr>
@@ -9186,8 +11030,8 @@
         </p:nvSpPr>
         <p:spPr>
           <a:xfrm>
-            <a:off x="247135" y="1304512"/>
-            <a:ext cx="11034275" cy="4632037"/>
+            <a:off x="247135" y="1190212"/>
+            <a:ext cx="11809743" cy="4862870"/>
           </a:xfrm>
           <a:prstGeom prst="rect">
             <a:avLst/>
@@ -9205,100 +11049,65 @@
                 <a:spcPts val="1200"/>
               </a:spcBef>
               <a:spcAft>
-                <a:spcPts val="1200"/>
+                <a:spcPts val="600"/>
               </a:spcAft>
             </a:pPr>
             <a:r>
-              <a:rPr lang="en-US" sz="3200" b="1">
+              <a:rPr lang="en-US" sz="3200" b="1" dirty="0">
                 <a:solidFill>
                   <a:schemeClr val="accent1"/>
                 </a:solidFill>
                 <a:latin typeface="Arial"/>
                 <a:cs typeface="Arial"/>
               </a:rPr>
-              <a:t>CRDCN policy, data and research collaboration circles</a:t>
+              <a:t>What CRDCN researchers do</a:t>
             </a:r>
           </a:p>
           <a:p>
             <a:pPr fontAlgn="base">
+              <a:spcBef>
+                <a:spcPts val="600"/>
+              </a:spcBef>
+              <a:spcAft>
+                <a:spcPts val="1200"/>
+              </a:spcAft>
+            </a:pPr>
+            <a:r>
+              <a:rPr lang="en-US" sz="2000" dirty="0"/>
+              <a:t>CRDCN researchers are independent, credible and highly skilled in data analysis and research methods.</a:t>
+            </a:r>
+          </a:p>
+          <a:p>
+            <a:pPr fontAlgn="base">
+              <a:spcBef>
+                <a:spcPts val="600"/>
+              </a:spcBef>
               <a:spcAft>
                 <a:spcPts val="600"/>
               </a:spcAft>
             </a:pPr>
             <a:r>
-              <a:rPr lang="en-US" sz="2000" b="1"/>
-              <a:t>Policy and data circles</a:t>
-            </a:r>
-            <a:endParaRPr lang="en-US" sz="2000"/>
+              <a:rPr lang="en-US" sz="2000" b="1" dirty="0">
+                <a:solidFill>
+                  <a:srgbClr val="63656A"/>
+                </a:solidFill>
+              </a:rPr>
+              <a:t>The CRDCN central team can leverage the Network to</a:t>
+            </a:r>
+            <a:r>
+              <a:rPr lang="en-US" sz="2000" dirty="0">
+                <a:solidFill>
+                  <a:srgbClr val="63656A"/>
+                </a:solidFill>
+              </a:rPr>
+              <a:t>:</a:t>
+            </a:r>
           </a:p>
           <a:p>
             <a:pPr marL="342900" indent="-342900" fontAlgn="base">
-              <a:buFont typeface="Arial" panose="020B0604020202020204" pitchFamily="34" charset="0"/>
-              <a:buChar char="•"/>
-            </a:pPr>
-            <a:r>
-              <a:rPr lang="en-US" sz="2000"/>
-              <a:t>In October 2024, invitation sent to CRDCN researchers to opt into data or policy circles. </a:t>
-            </a:r>
-          </a:p>
-          <a:p>
-            <a:pPr marL="342900" indent="-342900" fontAlgn="base">
-              <a:spcAft>
+              <a:spcBef>
                 <a:spcPts val="600"/>
-              </a:spcAft>
-              <a:buFont typeface="Arial" panose="020B0604020202020204" pitchFamily="34" charset="0"/>
-              <a:buChar char="•"/>
-            </a:pPr>
-            <a:r>
-              <a:rPr lang="en-US" sz="2000"/>
-              <a:t>Top research disciplines of respondents: economics, epidemiology, sociology, demography, and public health. CRDCN will be hosting policy circles in the fall of 2025.</a:t>
-            </a:r>
-          </a:p>
-          <a:p>
-            <a:pPr marL="342900" indent="-342900" fontAlgn="base">
-              <a:spcAft>
-                <a:spcPts val="1800"/>
-              </a:spcAft>
-              <a:buFont typeface="Arial" panose="020B0604020202020204" pitchFamily="34" charset="0"/>
-              <a:buChar char="•"/>
-            </a:pPr>
-            <a:r>
-              <a:rPr lang="en-US" sz="2000"/>
-              <a:t>Data circles: </a:t>
-            </a:r>
-            <a:r>
-              <a:rPr lang="en-US" sz="2000" b="0" i="0">
-                <a:effectLst/>
-              </a:rPr>
-              <a:t>Census, Canadian Community Health Survey (CCHS), Longitudinal Immigration Database (IMDB), Education and </a:t>
-            </a:r>
-            <a:r>
-              <a:rPr lang="en-US" sz="2000" b="0" i="0" err="1">
-                <a:effectLst/>
-              </a:rPr>
-              <a:t>Labour</a:t>
-            </a:r>
-            <a:r>
-              <a:rPr lang="en-US" sz="2000" b="0" i="0">
-                <a:effectLst/>
-              </a:rPr>
-              <a:t> Market Longitudinal Platform (ELMLP), and the Longitudinal Administrative Databank (LAD). </a:t>
-            </a:r>
-            <a:endParaRPr lang="en-US" sz="2000"/>
-          </a:p>
-          <a:p>
-            <a:pPr fontAlgn="base">
-              <a:spcAft>
-                <a:spcPts val="600"/>
-              </a:spcAft>
-            </a:pPr>
-            <a:r>
-              <a:rPr lang="en-US" sz="2000" b="1"/>
-              <a:t>Research collaboration circles</a:t>
-            </a:r>
-          </a:p>
-          <a:p>
-            <a:pPr marL="342900" indent="-342900" fontAlgn="base">
+              </a:spcBef>
               <a:spcAft>
                 <a:spcPts val="600"/>
               </a:spcAft>
@@ -9306,18 +11115,175 @@
               <a:buChar char="§"/>
             </a:pPr>
             <a:r>
-              <a:rPr lang="en-US" sz="2000"/>
-              <a:t>In December 2025, CRDCN will be inviting researchers to opt into research collaboration circles based on interest expressed by the CRDCN research community.</a:t>
+              <a:rPr lang="en-US" sz="2000" i="1" dirty="0">
+                <a:solidFill>
+                  <a:schemeClr val="accent1"/>
+                </a:solidFill>
+              </a:rPr>
+              <a:t>help fill gaps </a:t>
+            </a:r>
+            <a:r>
+              <a:rPr lang="en-US" sz="2000" dirty="0"/>
+              <a:t>in data analysis and research capacity</a:t>
             </a:r>
           </a:p>
           <a:p>
             <a:pPr marL="342900" indent="-342900" fontAlgn="base">
+              <a:spcBef>
+                <a:spcPts val="600"/>
+              </a:spcBef>
               <a:spcAft>
                 <a:spcPts val="600"/>
               </a:spcAft>
               <a:buFont typeface="Wingdings" panose="05000000000000000000" pitchFamily="2" charset="2"/>
               <a:buChar char="§"/>
             </a:pPr>
+            <a:r>
+              <a:rPr lang="en-US" sz="2000" i="1" dirty="0">
+                <a:solidFill>
+                  <a:schemeClr val="accent1"/>
+                </a:solidFill>
+              </a:rPr>
+              <a:t>advise </a:t>
+            </a:r>
+            <a:r>
+              <a:rPr lang="en-US" sz="2000" dirty="0"/>
+              <a:t>on data sources and data analysis to </a:t>
+            </a:r>
+            <a:r>
+              <a:rPr lang="en-US" sz="2000" i="1" dirty="0">
+                <a:solidFill>
+                  <a:schemeClr val="accent1"/>
+                </a:solidFill>
+              </a:rPr>
+              <a:t>provide insights </a:t>
+            </a:r>
+            <a:r>
+              <a:rPr lang="en-US" sz="2000" dirty="0"/>
+              <a:t>in priority areas</a:t>
+            </a:r>
+          </a:p>
+          <a:p>
+            <a:pPr marL="342900" indent="-342900" fontAlgn="base">
+              <a:spcBef>
+                <a:spcPts val="600"/>
+              </a:spcBef>
+              <a:spcAft>
+                <a:spcPts val="600"/>
+              </a:spcAft>
+              <a:buFont typeface="Wingdings" panose="05000000000000000000" pitchFamily="2" charset="2"/>
+              <a:buChar char="§"/>
+            </a:pPr>
+            <a:r>
+              <a:rPr lang="en-US" sz="2000" dirty="0"/>
+              <a:t>provide an </a:t>
+            </a:r>
+            <a:r>
+              <a:rPr lang="en-US" sz="2000" i="1" dirty="0">
+                <a:solidFill>
+                  <a:schemeClr val="accent1"/>
+                </a:solidFill>
+              </a:rPr>
+              <a:t>assessment of research questions and finding</a:t>
+            </a:r>
+            <a:r>
+              <a:rPr lang="en-US" sz="2000" dirty="0"/>
+              <a:t>​s</a:t>
+            </a:r>
+          </a:p>
+          <a:p>
+            <a:pPr marL="342900" indent="-342900" fontAlgn="base">
+              <a:spcBef>
+                <a:spcPts val="600"/>
+              </a:spcBef>
+              <a:spcAft>
+                <a:spcPts val="600"/>
+              </a:spcAft>
+              <a:buFont typeface="Wingdings" panose="05000000000000000000" pitchFamily="2" charset="2"/>
+              <a:buChar char="§"/>
+            </a:pPr>
+            <a:r>
+              <a:rPr lang="en-US" sz="2000" dirty="0"/>
+              <a:t>conduct data analysis and research to </a:t>
+            </a:r>
+            <a:r>
+              <a:rPr lang="en-US" sz="2000" i="1" dirty="0">
+                <a:solidFill>
+                  <a:schemeClr val="accent1"/>
+                </a:solidFill>
+              </a:rPr>
+              <a:t>inform policy, programs and practice</a:t>
+            </a:r>
+            <a:endParaRPr lang="en-US" sz="2000" dirty="0">
+              <a:solidFill>
+                <a:schemeClr val="accent1"/>
+              </a:solidFill>
+            </a:endParaRPr>
+          </a:p>
+          <a:p>
+            <a:pPr marL="342900" indent="-342900" fontAlgn="base">
+              <a:spcBef>
+                <a:spcPts val="600"/>
+              </a:spcBef>
+              <a:spcAft>
+                <a:spcPts val="600"/>
+              </a:spcAft>
+              <a:buFont typeface="Wingdings" panose="05000000000000000000" pitchFamily="2" charset="2"/>
+              <a:buChar char="§"/>
+            </a:pPr>
+            <a:r>
+              <a:rPr lang="en-US" sz="2000" i="1" dirty="0">
+                <a:solidFill>
+                  <a:schemeClr val="accent1"/>
+                </a:solidFill>
+              </a:rPr>
+              <a:t>diversify and enrich engagement </a:t>
+            </a:r>
+            <a:r>
+              <a:rPr lang="en-US" sz="2000" dirty="0"/>
+              <a:t>with stakeholders​</a:t>
+            </a:r>
+          </a:p>
+          <a:p>
+            <a:pPr marL="342900" indent="-342900" fontAlgn="base">
+              <a:spcBef>
+                <a:spcPts val="600"/>
+              </a:spcBef>
+              <a:spcAft>
+                <a:spcPts val="600"/>
+              </a:spcAft>
+              <a:buFont typeface="Wingdings" panose="05000000000000000000" pitchFamily="2" charset="2"/>
+              <a:buChar char="§"/>
+            </a:pPr>
+            <a:r>
+              <a:rPr lang="en-US" sz="2000" dirty="0"/>
+              <a:t>share research findings to </a:t>
+            </a:r>
+            <a:r>
+              <a:rPr lang="en-US" sz="2000" i="1" dirty="0">
+                <a:solidFill>
+                  <a:schemeClr val="accent1"/>
+                </a:solidFill>
+              </a:rPr>
+              <a:t>enhance public understanding and trust in science/research</a:t>
+            </a:r>
+            <a:endParaRPr lang="en-US" sz="2000" dirty="0">
+              <a:solidFill>
+                <a:schemeClr val="accent1"/>
+              </a:solidFill>
+            </a:endParaRPr>
+          </a:p>
+          <a:p>
+            <a:pPr marL="285750" indent="-285750" algn="l" rtl="0" fontAlgn="base">
+              <a:spcBef>
+                <a:spcPts val="600"/>
+              </a:spcBef>
+              <a:spcAft>
+                <a:spcPts val="600"/>
+              </a:spcAft>
+              <a:buFont typeface="Wingdings" panose="05000000000000000000" pitchFamily="2" charset="2"/>
+              <a:buChar char="Ø"/>
+            </a:pPr>
             <a:endParaRPr lang="en-US"/>
           </a:p>
         </p:txBody>
@@ -9325,7 +11291,7 @@
     </p:spTree>
     <p:extLst>
       <p:ext uri="{BB962C8B-B14F-4D97-AF65-F5344CB8AC3E}">
-        <p14:creationId xmlns:p14="http://schemas.microsoft.com/office/powerpoint/2010/main" val="3219435398"/>
+        <p14:creationId xmlns:p14="http://schemas.microsoft.com/office/powerpoint/2010/main" val="624593502"/>
       </p:ext>
     </p:extLst>
   </p:cSld>
@@ -9335,212 +11301,7 @@
 </p:sld>
 </file>
 
-<file path=ppt/slides/slide15.xml><?xml version="1.0" encoding="utf-8"?>
-<p:sld xmlns:a="http://schemas.openxmlformats.org/drawingml/2006/main" xmlns:r="http://schemas.openxmlformats.org/officeDocument/2006/relationships" xmlns:p="http://schemas.openxmlformats.org/presentationml/2006/main">
-  <p:cSld>
-    <p:spTree>
-      <p:nvGrpSpPr>
-        <p:cNvPr id="1" name="">
-          <a:extLst>
-            <a:ext uri="{FF2B5EF4-FFF2-40B4-BE49-F238E27FC236}">
-              <a16:creationId xmlns:a16="http://schemas.microsoft.com/office/drawing/2014/main" id="{6A42E733-9B9F-32E0-25EE-E9C6128DAC09}"/>
-            </a:ext>
-          </a:extLst>
-        </p:cNvPr>
-        <p:cNvGrpSpPr/>
-        <p:nvPr/>
-      </p:nvGrpSpPr>
-      <p:grpSpPr>
-        <a:xfrm>
-          <a:off x="0" y="0"/>
-          <a:ext cx="0" cy="0"/>
-          <a:chOff x="0" y="0"/>
-          <a:chExt cx="0" cy="0"/>
-        </a:xfrm>
-      </p:grpSpPr>
-      <p:sp>
-        <p:nvSpPr>
-          <p:cNvPr id="19" name="TextBox 18">
-            <a:extLst>
-              <a:ext uri="{FF2B5EF4-FFF2-40B4-BE49-F238E27FC236}">
-                <a16:creationId xmlns:a16="http://schemas.microsoft.com/office/drawing/2014/main" id="{807A597D-B1D3-E997-FDD3-58896A19DAED}"/>
-              </a:ext>
-            </a:extLst>
-          </p:cNvPr>
-          <p:cNvSpPr txBox="1"/>
-          <p:nvPr/>
-        </p:nvSpPr>
-        <p:spPr>
-          <a:xfrm>
-            <a:off x="247135" y="1224502"/>
-            <a:ext cx="11809743" cy="4662815"/>
-          </a:xfrm>
-          <a:prstGeom prst="rect">
-            <a:avLst/>
-          </a:prstGeom>
-          <a:noFill/>
-        </p:spPr>
-        <p:txBody>
-          <a:bodyPr wrap="square" lIns="91440" tIns="45720" rIns="91440" bIns="45720" anchor="t">
-            <a:spAutoFit/>
-          </a:bodyPr>
-          <a:lstStyle/>
-          <a:p>
-            <a:pPr algn="l" rtl="0" fontAlgn="base">
-              <a:spcBef>
-                <a:spcPts val="1200"/>
-              </a:spcBef>
-              <a:spcAft>
-                <a:spcPts val="1200"/>
-              </a:spcAft>
-            </a:pPr>
-            <a:r>
-              <a:rPr lang="en-US" sz="3200" b="1">
-                <a:solidFill>
-                  <a:schemeClr val="accent1"/>
-                </a:solidFill>
-                <a:latin typeface="Arial" panose="020B0604020202020204" pitchFamily="34" charset="0"/>
-                <a:cs typeface="Arial" panose="020B0604020202020204" pitchFamily="34" charset="0"/>
-              </a:rPr>
-              <a:t>CRDCN training and knowledge mobilization </a:t>
-            </a:r>
-          </a:p>
-          <a:p>
-            <a:pPr fontAlgn="base">
-              <a:spcAft>
-                <a:spcPts val="600"/>
-              </a:spcAft>
-            </a:pPr>
-            <a:r>
-              <a:rPr lang="en-US" sz="2000" b="1"/>
-              <a:t>Training</a:t>
-            </a:r>
-            <a:endParaRPr lang="en-US" sz="2000"/>
-          </a:p>
-          <a:p>
-            <a:pPr marL="342900" indent="-342900" fontAlgn="base">
-              <a:spcAft>
-                <a:spcPts val="600"/>
-              </a:spcAft>
-              <a:buFont typeface="Arial" panose="020B0604020202020204" pitchFamily="34" charset="0"/>
-              <a:buChar char="•"/>
-            </a:pPr>
-            <a:r>
-              <a:rPr lang="en-US" sz="2000"/>
-              <a:t>Priority areas for us to deliver training per our 2024-29 training plan: Datasets in the RDCs and working with data; using the Research Data </a:t>
-            </a:r>
-            <a:r>
-              <a:rPr lang="en-US" sz="2000" err="1"/>
-              <a:t>Centres</a:t>
-            </a:r>
-            <a:r>
-              <a:rPr lang="en-US" sz="2000"/>
-              <a:t>; working with </a:t>
-            </a:r>
-            <a:r>
-              <a:rPr lang="en-US" sz="2000" b="0" i="0">
-                <a:effectLst/>
-              </a:rPr>
-              <a:t>First Nations, Inuit and Métis data; </a:t>
-            </a:r>
-            <a:r>
-              <a:rPr lang="en-US" sz="2000"/>
-              <a:t>knowledge mobilization/policy communication; and professional development in the research data ecosystem. </a:t>
-            </a:r>
-          </a:p>
-          <a:p>
-            <a:pPr marL="342900" indent="-342900" fontAlgn="base">
-              <a:spcAft>
-                <a:spcPts val="600"/>
-              </a:spcAft>
-              <a:buFont typeface="Arial" panose="020B0604020202020204" pitchFamily="34" charset="0"/>
-              <a:buChar char="•"/>
-            </a:pPr>
-            <a:r>
-              <a:rPr lang="en-US" sz="2000" i="1"/>
-              <a:t>New initiative</a:t>
-            </a:r>
-            <a:r>
-              <a:rPr lang="en-US" sz="2000"/>
-              <a:t>: Partnering with government and research-focused organizations to match funds for CRDCN’s Emerging Scholars Program for PhD student-led work using RDC data. </a:t>
-            </a:r>
-          </a:p>
-          <a:p>
-            <a:pPr fontAlgn="base">
-              <a:spcBef>
-                <a:spcPts val="1200"/>
-              </a:spcBef>
-              <a:spcAft>
-                <a:spcPts val="600"/>
-              </a:spcAft>
-            </a:pPr>
-            <a:r>
-              <a:rPr lang="en-US" sz="2000" b="1"/>
-              <a:t>Knowledge mobilization</a:t>
-            </a:r>
-          </a:p>
-          <a:p>
-            <a:pPr marL="342900" indent="-342900" fontAlgn="base">
-              <a:spcAft>
-                <a:spcPts val="600"/>
-              </a:spcAft>
-              <a:buFont typeface="Arial" panose="020B0604020202020204" pitchFamily="34" charset="0"/>
-              <a:buChar char="•"/>
-            </a:pPr>
-            <a:r>
-              <a:rPr lang="en-US" sz="2000"/>
-              <a:t>CRDCN partners with two journals – </a:t>
-            </a:r>
-            <a:r>
-              <a:rPr lang="en-US" sz="2000" i="1"/>
-              <a:t>Canadian Public Policy </a:t>
-            </a:r>
-            <a:r>
-              <a:rPr lang="en-US" sz="2000"/>
-              <a:t>and </a:t>
-            </a:r>
-            <a:r>
-              <a:rPr lang="en-US" sz="2000" i="1"/>
-              <a:t>Canadian Journal of Economics </a:t>
-            </a:r>
-            <a:r>
-              <a:rPr lang="en-US" sz="2000"/>
-              <a:t>– to host webinars sharing forthcoming or recently published work by CRDCN researchers.</a:t>
-            </a:r>
-          </a:p>
-          <a:p>
-            <a:pPr marL="342900" indent="-342900" fontAlgn="base">
-              <a:buFont typeface="Arial" panose="020B0604020202020204" pitchFamily="34" charset="0"/>
-              <a:buChar char="•"/>
-            </a:pPr>
-            <a:r>
-              <a:rPr lang="en-US" sz="2000"/>
-              <a:t>CRDCN publishes research-policy snapshots that summarize findings of CRDCN </a:t>
-            </a:r>
-          </a:p>
-          <a:p>
-            <a:pPr fontAlgn="base"/>
-            <a:r>
-              <a:rPr lang="en-US" sz="2000"/>
-              <a:t>     researchers’ published work or policy reports.  </a:t>
-            </a:r>
-          </a:p>
-        </p:txBody>
-      </p:sp>
-    </p:spTree>
-    <p:extLst>
-      <p:ext uri="{BB962C8B-B14F-4D97-AF65-F5344CB8AC3E}">
-        <p14:creationId xmlns:p14="http://schemas.microsoft.com/office/powerpoint/2010/main" val="1375125008"/>
-      </p:ext>
-    </p:extLst>
-  </p:cSld>
-  <p:clrMapOvr>
-    <a:masterClrMapping/>
-  </p:clrMapOvr>
-</p:sld>
-</file>
-
-<file path=ppt/slides/slide16.xml><?xml version="1.0" encoding="utf-8"?>
+<file path=ppt/slides/slide14.xml><?xml version="1.0" encoding="utf-8"?>
 <p:sld xmlns:a="http://schemas.openxmlformats.org/drawingml/2006/main" xmlns:r="http://schemas.openxmlformats.org/officeDocument/2006/relationships" xmlns:p="http://schemas.openxmlformats.org/presentationml/2006/main">
   <p:cSld>
     <p:spTree>
@@ -9597,16 +11358,16 @@
               </a:spcAft>
             </a:pPr>
             <a:r>
-              <a:rPr lang="en-US" sz="3200" b="1">
+              <a:rPr lang="en-US" sz="3200" b="1" dirty="0">
                 <a:solidFill>
                   <a:schemeClr val="accent1"/>
                 </a:solidFill>
                 <a:latin typeface="Arial"/>
                 <a:cs typeface="Arial"/>
               </a:rPr>
-              <a:t>Open mic: hearing from you </a:t>
-            </a:r>
-            <a:endParaRPr lang="en-US">
+              <a:t>Hearing from you </a:t>
+            </a:r>
+            <a:endParaRPr lang="en-US" dirty="0">
               <a:solidFill>
                 <a:schemeClr val="accent1"/>
               </a:solidFill>
@@ -9621,7 +11382,7 @@
               </a:spcAft>
             </a:pPr>
             <a:r>
-              <a:rPr lang="en-US" sz="2400">
+              <a:rPr lang="en-US" sz="2400" dirty="0">
                 <a:solidFill>
                   <a:schemeClr val="accent1"/>
                 </a:solidFill>
@@ -9638,7 +11399,7 @@
               </a:spcAft>
             </a:pPr>
             <a:r>
-              <a:rPr lang="en-US" sz="2400" i="1">
+              <a:rPr lang="en-US" sz="2400" i="1" dirty="0">
                 <a:latin typeface="Arial"/>
                 <a:cs typeface="Arial"/>
               </a:rPr>
@@ -9652,7 +11413,7 @@
               </a:spcAft>
             </a:pPr>
             <a:r>
-              <a:rPr lang="en-US" sz="2400">
+              <a:rPr lang="en-US" sz="2400" dirty="0">
                 <a:solidFill>
                   <a:schemeClr val="accent1"/>
                 </a:solidFill>
@@ -9669,7 +11430,7 @@
               </a:spcAft>
             </a:pPr>
             <a:r>
-              <a:rPr lang="en-US" sz="2400" i="1">
+              <a:rPr lang="en-US" sz="2400" i="1" dirty="0">
                 <a:latin typeface="Arial"/>
                 <a:cs typeface="Arial"/>
               </a:rPr>
@@ -9683,7 +11444,7 @@
               </a:spcAft>
             </a:pPr>
             <a:r>
-              <a:rPr lang="en-US" sz="2400">
+              <a:rPr lang="en-US" sz="2400" dirty="0">
                 <a:solidFill>
                   <a:schemeClr val="accent1"/>
                 </a:solidFill>
@@ -9700,7 +11461,7 @@
               </a:spcAft>
             </a:pPr>
             <a:r>
-              <a:rPr lang="en-US" sz="2400" i="1">
+              <a:rPr lang="en-US" sz="2400" i="1" dirty="0">
                 <a:latin typeface="Arial"/>
                 <a:cs typeface="Arial"/>
               </a:rPr>
@@ -9714,13 +11475,13 @@
               </a:spcAft>
             </a:pPr>
             <a:r>
-              <a:rPr lang="en-US" sz="2400" i="1">
+              <a:rPr lang="en-US" sz="2400" i="1" dirty="0">
                 <a:latin typeface="Arial"/>
                 <a:cs typeface="Arial"/>
               </a:rPr>
               <a:t>What CRDCN-facilitated connections would be valuable to you?   </a:t>
             </a:r>
-            <a:endParaRPr lang="en-US" sz="3200" i="1">
+            <a:endParaRPr lang="en-US" sz="3200" i="1" dirty="0">
               <a:latin typeface="Arial"/>
               <a:cs typeface="Arial"/>
             </a:endParaRPr>
@@ -9751,7 +11512,7 @@
 </p:sld>
 </file>
 
-<file path=ppt/slides/slide17.xml><?xml version="1.0" encoding="utf-8"?>
+<file path=ppt/slides/slide15.xml><?xml version="1.0" encoding="utf-8"?>
 <p:sld xmlns:a="http://schemas.openxmlformats.org/drawingml/2006/main" xmlns:r="http://schemas.openxmlformats.org/officeDocument/2006/relationships" xmlns:p="http://schemas.openxmlformats.org/presentationml/2006/main">
   <p:cSld>
     <p:spTree>
@@ -10227,7 +11988,7 @@
 </p:sld>
 </file>
 
-<file path=ppt/slides/slide18.xml><?xml version="1.0" encoding="utf-8"?>
+<file path=ppt/slides/slide16.xml><?xml version="1.0" encoding="utf-8"?>
 <p:sld xmlns:a="http://schemas.openxmlformats.org/drawingml/2006/main" xmlns:r="http://schemas.openxmlformats.org/officeDocument/2006/relationships" xmlns:p="http://schemas.openxmlformats.org/presentationml/2006/main">
   <p:cSld>
     <p:spTree>
@@ -10577,7 +12338,7 @@
               </a:spcAft>
             </a:pPr>
             <a:r>
-              <a:rPr lang="en-US" sz="3200" b="1">
+              <a:rPr lang="en-US" sz="3200" b="1" dirty="0">
                 <a:solidFill>
                   <a:schemeClr val="accent1"/>
                 </a:solidFill>
@@ -10586,7 +12347,7 @@
               </a:rPr>
               <a:t>Our session today</a:t>
             </a:r>
-            <a:endParaRPr lang="en-US" sz="3200" b="1">
+            <a:endParaRPr lang="en-US" sz="3200" b="1" dirty="0">
               <a:solidFill>
                 <a:schemeClr val="accent1"/>
               </a:solidFill>
@@ -10602,8 +12363,8 @@
               <a:buAutoNum type="arabicPeriod"/>
             </a:pPr>
             <a:r>
-              <a:rPr lang="en-US" sz="2400"/>
-              <a:t>A few words about my role at CRDCN</a:t>
+              <a:rPr lang="en-US" sz="2400" dirty="0"/>
+              <a:t>Who we have in the room today</a:t>
             </a:r>
           </a:p>
           <a:p>
@@ -10614,8 +12375,8 @@
               <a:buAutoNum type="arabicPeriod"/>
             </a:pPr>
             <a:r>
-              <a:rPr lang="en-US" sz="2400"/>
-              <a:t>CRDCN – who we are and what we do</a:t>
+              <a:rPr lang="en-US" sz="2400" dirty="0"/>
+              <a:t>CRDCN – who we are as a Network and what we do</a:t>
             </a:r>
           </a:p>
           <a:p>
@@ -10626,7 +12387,7 @@
               <a:buAutoNum type="arabicPeriod"/>
             </a:pPr>
             <a:r>
-              <a:rPr lang="en-US" sz="2400"/>
+              <a:rPr lang="en-US" sz="2400" dirty="0"/>
               <a:t>CRDCN research informing policy – examples</a:t>
             </a:r>
           </a:p>
@@ -10638,7 +12399,7 @@
               <a:buAutoNum type="arabicPeriod"/>
             </a:pPr>
             <a:r>
-              <a:rPr lang="en-US" sz="2400"/>
+              <a:rPr lang="en-US" sz="2400" dirty="0"/>
               <a:t>CRDCN – mechanisms to connect research and policy</a:t>
             </a:r>
           </a:p>
@@ -10650,8 +12411,8 @@
               <a:buAutoNum type="arabicPeriod"/>
             </a:pPr>
             <a:r>
-              <a:rPr lang="en-US" sz="2400"/>
-              <a:t>Open mic – hearing from you </a:t>
+              <a:rPr lang="en-US" sz="2400" dirty="0"/>
+              <a:t>Hearing from you </a:t>
             </a:r>
           </a:p>
           <a:p>
@@ -10725,7 +12486,7 @@
         <p:spPr>
           <a:xfrm>
             <a:off x="525780" y="1361662"/>
-            <a:ext cx="11531098" cy="3739485"/>
+            <a:ext cx="11531098" cy="4585871"/>
           </a:xfrm>
           <a:prstGeom prst="rect">
             <a:avLst/>
@@ -10738,20 +12499,20 @@
           </a:bodyPr>
           <a:lstStyle/>
           <a:p>
-            <a:pPr algn="l" rtl="0" fontAlgn="base">
+            <a:pPr fontAlgn="base">
               <a:spcAft>
                 <a:spcPts val="1800"/>
               </a:spcAft>
             </a:pPr>
             <a:r>
-              <a:rPr lang="en-US" sz="3200" b="1">
+              <a:rPr lang="en-US" sz="3200" b="1" dirty="0">
                 <a:solidFill>
                   <a:schemeClr val="accent1"/>
                 </a:solidFill>
                 <a:latin typeface="Arial"/>
                 <a:cs typeface="Arial"/>
               </a:rPr>
-              <a:t>A few words about my role at CRDCN</a:t>
+              <a:t>Who we have in the room today</a:t>
             </a:r>
           </a:p>
           <a:p>
@@ -10761,16 +12522,28 @@
               </a:spcAft>
             </a:pPr>
             <a:r>
-              <a:rPr lang="en-US" sz="2000" b="1">
+              <a:rPr lang="en-US" sz="2000" b="1" dirty="0">
                 <a:solidFill>
                   <a:schemeClr val="accent1"/>
                 </a:solidFill>
               </a:rPr>
-              <a:t>My role</a:t>
-            </a:r>
-            <a:r>
-              <a:rPr lang="en-US" sz="2000"/>
-              <a:t>: I am here in my capacity as the Director of Research, Training and Knowledge Mobilization for the Canadian Research Data Centre Network (CRDCN). </a:t>
+              <a:t>A bit about me</a:t>
+            </a:r>
+            <a:r>
+              <a:rPr lang="en-US" sz="2000" dirty="0"/>
+              <a:t>: I am here in my capacity as the Director of Research, Training and Knowledge Mobilization for the Canadian Research Data Centre Network (CRDCN).</a:t>
+            </a:r>
+            <a:r>
+              <a:rPr lang="en-US" sz="2000" dirty="0">
+                <a:solidFill>
+                  <a:srgbClr val="63656A"/>
+                </a:solidFill>
+              </a:rPr>
+              <a:t> I completed my PhD</a:t>
+            </a:r>
+            <a:r>
+              <a:rPr lang="en-US" sz="2000" dirty="0"/>
+              <a:t> in 2010 (Education), my previous academic work was on the evolving roles of universities in society, knowledge mobilization in research funding policy, and research as a public good.  </a:t>
             </a:r>
           </a:p>
           <a:p>
@@ -10780,16 +12553,60 @@
               </a:spcAft>
             </a:pPr>
             <a:r>
-              <a:rPr lang="en-US" sz="2000" b="1">
+              <a:rPr lang="en-US" sz="2000" b="1" dirty="0">
                 <a:solidFill>
                   <a:schemeClr val="accent1"/>
                 </a:solidFill>
               </a:rPr>
-              <a:t>My academic background: </a:t>
-            </a:r>
-            <a:r>
-              <a:rPr lang="en-US" sz="2000"/>
-              <a:t>PhD (Education), previous academic work on the evolving roles of university research in society, knowledge mobilization in research funding policy, and research as a public good.  </a:t>
+              <a:t>Note: </a:t>
+            </a:r>
+            <a:r>
+              <a:rPr lang="en-US" sz="2000" dirty="0"/>
+              <a:t>CRDCN works very closely with</a:t>
+            </a:r>
+            <a:r>
+              <a:rPr lang="en-US" sz="2000" dirty="0">
+                <a:effectLst/>
+              </a:rPr>
+              <a:t> Statistics Canada as the provider of data available in </a:t>
+            </a:r>
+            <a:r>
+              <a:rPr lang="en-US" sz="2000" dirty="0"/>
+              <a:t>the</a:t>
+            </a:r>
+            <a:r>
+              <a:rPr lang="en-US" sz="2000" dirty="0">
+                <a:effectLst/>
+              </a:rPr>
+              <a:t> Research Data </a:t>
+            </a:r>
+            <a:r>
+              <a:rPr lang="en-US" sz="2000" dirty="0" err="1">
+                <a:effectLst/>
+              </a:rPr>
+              <a:t>Centres</a:t>
+            </a:r>
+            <a:r>
+              <a:rPr lang="en-US" sz="2000" dirty="0">
+                <a:effectLst/>
+              </a:rPr>
+              <a:t> (RDCs). </a:t>
+            </a:r>
+            <a:r>
+              <a:rPr lang="en-US" sz="2000" dirty="0"/>
+              <a:t>McMaster University is host to our head office, however, CRDCN has 45 universities as collaborating and affiliate institutions across Canada.</a:t>
+            </a:r>
+            <a:r>
+              <a:rPr lang="en-US" sz="2000" b="1" dirty="0">
+                <a:solidFill>
+                  <a:schemeClr val="accent1"/>
+                </a:solidFill>
+              </a:rPr>
+              <a:t> </a:t>
+            </a:r>
+            <a:r>
+              <a:rPr lang="en-US" sz="2000" dirty="0"/>
+              <a:t>In my presentation today and in the discussion that I will facilitate afterward, I am here in my capacity as a representative of CRDCN. </a:t>
             </a:r>
           </a:p>
           <a:p>
@@ -10799,61 +12616,26 @@
               </a:spcAft>
             </a:pPr>
             <a:r>
-              <a:rPr lang="en-US" sz="2000" b="1">
+              <a:rPr lang="en-US" sz="2000" b="1" dirty="0">
                 <a:solidFill>
                   <a:schemeClr val="accent1"/>
                 </a:solidFill>
               </a:rPr>
-              <a:t>Note: </a:t>
-            </a:r>
-            <a:r>
-              <a:rPr lang="en-US" sz="2000"/>
-              <a:t>CRDCN works very closely with</a:t>
-            </a:r>
-            <a:r>
-              <a:rPr lang="en-US" sz="2000">
-                <a:effectLst/>
-              </a:rPr>
-              <a:t> Statistics Canada as the provider of data available in </a:t>
-            </a:r>
-            <a:r>
-              <a:rPr lang="en-US" sz="2000"/>
-              <a:t>the</a:t>
-            </a:r>
-            <a:r>
-              <a:rPr lang="en-US" sz="2000">
-                <a:effectLst/>
-              </a:rPr>
-              <a:t> Research Data </a:t>
-            </a:r>
-            <a:r>
-              <a:rPr lang="en-US" sz="2000" err="1">
-                <a:effectLst/>
-              </a:rPr>
-              <a:t>Centres</a:t>
-            </a:r>
-            <a:r>
-              <a:rPr lang="en-US" sz="2000">
-                <a:effectLst/>
-              </a:rPr>
-              <a:t> (RDCs). </a:t>
-            </a:r>
-            <a:r>
-              <a:rPr lang="en-US" sz="2000"/>
-              <a:t>McMaster University is host to our head office, however, CRDCN has 45 universities as collaborating and affiliate institutions across Canada.</a:t>
-            </a:r>
-            <a:r>
-              <a:rPr lang="en-US" sz="2000" b="1">
-                <a:solidFill>
-                  <a:schemeClr val="accent1"/>
-                </a:solidFill>
-              </a:rPr>
-              <a:t> </a:t>
-            </a:r>
-            <a:r>
-              <a:rPr lang="en-US" sz="2000"/>
-              <a:t>In my presentation today and in the discussion that I will facilitate afterward, I am here in my capacity as a representative of CRDCN. </a:t>
-            </a:r>
+              <a:t>A bit about you</a:t>
+            </a:r>
+            <a:r>
+              <a:rPr lang="en-US" sz="2000" dirty="0"/>
+              <a:t>: Please briefly introduce yourself.</a:t>
+            </a:r>
+            <a:endParaRPr lang="en-US" dirty="0"/>
+          </a:p>
+          <a:p>
+            <a:pPr>
+              <a:spcAft>
+                <a:spcPts val="1800"/>
+              </a:spcAft>
+            </a:pPr>
+            <a:endParaRPr lang="en-US" sz="2000" dirty="0"/>
           </a:p>
         </p:txBody>
       </p:sp>
@@ -12578,8 +14360,8 @@
         </p:nvSpPr>
         <p:spPr>
           <a:xfrm>
-            <a:off x="247135" y="1167352"/>
-            <a:ext cx="11034275" cy="4816703"/>
+            <a:off x="247135" y="1070590"/>
+            <a:ext cx="11034275" cy="5663089"/>
           </a:xfrm>
           <a:prstGeom prst="rect">
             <a:avLst/>
@@ -12598,22 +14380,22 @@
               </a:spcAft>
             </a:pPr>
             <a:r>
-              <a:rPr lang="en-US" sz="3200" b="1">
+              <a:rPr lang="en-US" sz="3200" b="1" dirty="0">
                 <a:solidFill>
                   <a:schemeClr val="accent1"/>
                 </a:solidFill>
-                <a:latin typeface="Arial" panose="020B0604020202020204" pitchFamily="34" charset="0"/>
-                <a:cs typeface="Arial" panose="020B0604020202020204" pitchFamily="34" charset="0"/>
+                <a:latin typeface="Arial"/>
+                <a:cs typeface="Arial"/>
               </a:rPr>
               <a:t>Things to know about CRDCN </a:t>
             </a:r>
             <a:r>
-              <a:rPr lang="en-US" sz="3200" b="1" i="1">
+              <a:rPr lang="en-US" sz="3200" b="1" i="1" dirty="0">
                 <a:solidFill>
                   <a:schemeClr val="accent1"/>
                 </a:solidFill>
-                <a:latin typeface="Arial" panose="020B0604020202020204" pitchFamily="34" charset="0"/>
-                <a:cs typeface="Arial" panose="020B0604020202020204" pitchFamily="34" charset="0"/>
+                <a:latin typeface="Arial"/>
+                <a:cs typeface="Arial"/>
               </a:rPr>
               <a:t>as a Network</a:t>
             </a:r>
@@ -12627,7 +14409,7 @@
               <a:buChar char="§"/>
             </a:pPr>
             <a:r>
-              <a:rPr lang="en-US" sz="2000" b="1">
+              <a:rPr lang="en-US" sz="2000" b="1" dirty="0">
                 <a:solidFill>
                   <a:schemeClr val="accent1"/>
                 </a:solidFill>
@@ -12635,11 +14417,11 @@
               <a:t>We work with academic institutions across Canada</a:t>
             </a:r>
             <a:r>
-              <a:rPr lang="en-US" sz="2000" b="1"/>
+              <a:rPr lang="en-US" sz="2000" b="1" dirty="0"/>
               <a:t>: </a:t>
             </a:r>
             <a:r>
-              <a:rPr lang="en-US" sz="2000"/>
+              <a:rPr lang="en-US" sz="2000" dirty="0"/>
               <a:t>We work with Statistics Canada to enable researchers at 45 universities to access highly valuable microdata about Canadian individuals, households and businesses.</a:t>
             </a:r>
           </a:p>
@@ -12652,7 +14434,7 @@
               <a:buChar char="§"/>
             </a:pPr>
             <a:r>
-              <a:rPr lang="en-US" sz="2000" b="1">
+              <a:rPr lang="en-US" sz="2000" b="1" dirty="0">
                 <a:solidFill>
                   <a:schemeClr val="accent1"/>
                 </a:solidFill>
@@ -12660,12 +14442,12 @@
               <a:t>More than 2500 CRDCN researchers: </a:t>
             </a:r>
             <a:r>
-              <a:rPr lang="en-US" sz="2000"/>
+              <a:rPr lang="en-US" sz="2000" dirty="0"/>
               <a:t>We leverage the knowledge and expertise of researchers across Canada to advance research and contribute to evidence-based decision-making. </a:t>
             </a:r>
           </a:p>
           <a:p>
-            <a:pPr marL="342900" indent="-342900" algn="l" rtl="0" fontAlgn="base">
+            <a:pPr marL="342900" indent="-342900" fontAlgn="base">
               <a:spcAft>
                 <a:spcPts val="1800"/>
               </a:spcAft>
@@ -12673,24 +14455,29 @@
               <a:buChar char="§"/>
             </a:pPr>
             <a:r>
-              <a:rPr lang="en-US" sz="2000" b="1">
+              <a:rPr lang="en-US" sz="2000" b="1" dirty="0">
                 <a:solidFill>
                   <a:schemeClr val="accent1"/>
                 </a:solidFill>
               </a:rPr>
-              <a:t>Training</a:t>
-            </a:r>
-            <a:r>
-              <a:rPr lang="en-US" sz="2000" b="1"/>
-              <a:t>: </a:t>
-            </a:r>
-            <a:r>
-              <a:rPr lang="en-US" sz="2000"/>
-              <a:t>We deliver training online (free of charge). This includes training on datasets, research data management, and how to become a Research Data Centre user.</a:t>
-            </a:r>
-          </a:p>
-          <a:p>
-            <a:pPr marL="342900" indent="-342900" algn="l" rtl="0" fontAlgn="base">
+              <a:t>Research data ecosystem</a:t>
+            </a:r>
+            <a:r>
+              <a:rPr lang="en-US" sz="2000" dirty="0">
+                <a:solidFill>
+                  <a:srgbClr val="63656A"/>
+                </a:solidFill>
+              </a:rPr>
+              <a:t>: We collaborate nationally and internationally to adopt and develop capacity and best practice.</a:t>
+            </a:r>
+            <a:endParaRPr lang="en-US" sz="2000" b="1" dirty="0">
+              <a:solidFill>
+                <a:schemeClr val="accent1"/>
+              </a:solidFill>
+            </a:endParaRPr>
+          </a:p>
+          <a:p>
+            <a:pPr marL="342900" indent="-342900" algn="l">
               <a:spcAft>
                 <a:spcPts val="1800"/>
               </a:spcAft>
@@ -12698,7 +14485,33 @@
               <a:buChar char="§"/>
             </a:pPr>
             <a:r>
-              <a:rPr lang="en-US" sz="2000" b="1">
+              <a:rPr lang="en-US" sz="2000" b="1" dirty="0">
+                <a:solidFill>
+                  <a:schemeClr val="accent1"/>
+                </a:solidFill>
+              </a:rPr>
+              <a:t>Training</a:t>
+            </a:r>
+            <a:r>
+              <a:rPr lang="en-US" sz="2000" b="1" dirty="0"/>
+              <a:t>: </a:t>
+            </a:r>
+            <a:r>
+              <a:rPr lang="en-US" sz="2000" dirty="0"/>
+              <a:t>We deliver training online (free of charge). This includes training on datasets, research data management, and how to become a Research Data Centre user.</a:t>
+            </a:r>
+            <a:endParaRPr lang="en-US" dirty="0"/>
+          </a:p>
+          <a:p>
+            <a:pPr marL="342900" indent="-342900" fontAlgn="base">
+              <a:spcAft>
+                <a:spcPts val="1800"/>
+              </a:spcAft>
+              <a:buFont typeface="Wingdings" panose="05000000000000000000" pitchFamily="2" charset="2"/>
+              <a:buChar char="§"/>
+            </a:pPr>
+            <a:r>
+              <a:rPr lang="en-US" sz="2000" b="1" dirty="0">
                 <a:solidFill>
                   <a:schemeClr val="accent1"/>
                 </a:solidFill>
@@ -12706,13 +14519,14 @@
               <a:t>Knowledge mobilization</a:t>
             </a:r>
             <a:r>
-              <a:rPr lang="en-US" sz="2000" b="1"/>
+              <a:rPr lang="en-US" sz="2000" b="1" dirty="0"/>
               <a:t>: </a:t>
             </a:r>
             <a:r>
-              <a:rPr lang="en-US" sz="2000"/>
-              <a:t>We deliver free webinars and produce research-policy snapshots. </a:t>
-            </a:r>
+              <a:rPr lang="en-US" sz="2000" dirty="0"/>
+              <a:t>We deliver free webinars and produce research-policy             snapshots. </a:t>
+            </a:r>
+            <a:endParaRPr lang="en-US" dirty="0"/>
           </a:p>
           <a:p>
             <a:pPr marL="342900" indent="-342900" algn="l" rtl="0" fontAlgn="base">
@@ -12722,18 +14536,7 @@
               <a:buFont typeface="Wingdings" panose="05000000000000000000" pitchFamily="2" charset="2"/>
               <a:buChar char="§"/>
             </a:pPr>
-            <a:r>
-              <a:rPr lang="en-US" sz="2000" b="1">
-                <a:solidFill>
-                  <a:schemeClr val="accent1"/>
-                </a:solidFill>
-              </a:rPr>
-              <a:t>Research data ecosystem</a:t>
-            </a:r>
-            <a:r>
-              <a:rPr lang="en-US" sz="2000"/>
-              <a:t>: We collaborate nationally and internationally to adopt and develop capacity and best practice.</a:t>
-            </a:r>
+            <a:endParaRPr lang="en-US" sz="2000" dirty="0"/>
           </a:p>
         </p:txBody>
       </p:sp>
@@ -12758,7 +14561,7 @@
         <p:cNvPr id="1" name="">
           <a:extLst>
             <a:ext uri="{FF2B5EF4-FFF2-40B4-BE49-F238E27FC236}">
-              <a16:creationId xmlns:a16="http://schemas.microsoft.com/office/drawing/2014/main" id="{075652B4-E637-FCF4-60AB-1AFBE573E486}"/>
+              <a16:creationId xmlns:a16="http://schemas.microsoft.com/office/drawing/2014/main" id="{6A42E733-9B9F-32E0-25EE-E9C6128DAC09}"/>
             </a:ext>
           </a:extLst>
         </p:cNvPr>
@@ -12778,7 +14581,7 @@
           <p:cNvPr id="19" name="TextBox 18">
             <a:extLst>
               <a:ext uri="{FF2B5EF4-FFF2-40B4-BE49-F238E27FC236}">
-                <a16:creationId xmlns:a16="http://schemas.microsoft.com/office/drawing/2014/main" id="{CB026A76-014A-9926-431A-782FCD6DA4A0}"/>
+                <a16:creationId xmlns:a16="http://schemas.microsoft.com/office/drawing/2014/main" id="{807A597D-B1D3-E997-FDD3-58896A19DAED}"/>
               </a:ext>
             </a:extLst>
           </p:cNvPr>
@@ -12787,8 +14590,8 @@
         </p:nvSpPr>
         <p:spPr>
           <a:xfrm>
-            <a:off x="247135" y="1167352"/>
-            <a:ext cx="11137145" cy="5047536"/>
+            <a:off x="247135" y="1224502"/>
+            <a:ext cx="11809743" cy="4662815"/>
           </a:xfrm>
           <a:prstGeom prst="rect">
             <a:avLst/>
@@ -12802,8 +14605,11 @@
           <a:lstStyle/>
           <a:p>
             <a:pPr algn="l" rtl="0" fontAlgn="base">
+              <a:spcBef>
+                <a:spcPts val="1200"/>
+              </a:spcBef>
               <a:spcAft>
-                <a:spcPts val="1800"/>
+                <a:spcPts val="1200"/>
               </a:spcAft>
             </a:pPr>
             <a:r>
@@ -12814,208 +14620,135 @@
                 <a:latin typeface="Arial" panose="020B0604020202020204" pitchFamily="34" charset="0"/>
                 <a:cs typeface="Arial" panose="020B0604020202020204" pitchFamily="34" charset="0"/>
               </a:rPr>
-              <a:t>Things to know about the </a:t>
-            </a:r>
-            <a:r>
-              <a:rPr lang="en-US" sz="3200" b="1" i="1" err="1">
-                <a:solidFill>
-                  <a:schemeClr val="accent1"/>
-                </a:solidFill>
-                <a:latin typeface="Arial" panose="020B0604020202020204" pitchFamily="34" charset="0"/>
-                <a:cs typeface="Arial" panose="020B0604020202020204" pitchFamily="34" charset="0"/>
-              </a:rPr>
-              <a:t>vRDC</a:t>
-            </a:r>
-            <a:endParaRPr lang="en-US" sz="3200" b="1" i="1">
-              <a:solidFill>
-                <a:schemeClr val="accent1"/>
-              </a:solidFill>
-              <a:latin typeface="Arial" panose="020B0604020202020204" pitchFamily="34" charset="0"/>
-              <a:cs typeface="Arial" panose="020B0604020202020204" pitchFamily="34" charset="0"/>
-            </a:endParaRPr>
-          </a:p>
-          <a:p>
-            <a:pPr algn="l" rtl="0" fontAlgn="base">
+              <a:t>CRDCN training and knowledge mobilization </a:t>
+            </a:r>
+          </a:p>
+          <a:p>
+            <a:pPr fontAlgn="base">
               <a:spcAft>
-                <a:spcPts val="300"/>
+                <a:spcPts val="600"/>
               </a:spcAft>
             </a:pPr>
             <a:r>
-              <a:rPr lang="en-US" sz="2000" b="1">
-                <a:solidFill>
-                  <a:schemeClr val="accent1"/>
-                </a:solidFill>
+              <a:rPr lang="en-US" sz="2000" b="1"/>
+              <a:t>Training</a:t>
+            </a:r>
+            <a:endParaRPr lang="en-US" sz="2000"/>
+          </a:p>
+          <a:p>
+            <a:pPr marL="342900" indent="-342900" fontAlgn="base">
+              <a:spcAft>
+                <a:spcPts val="600"/>
+              </a:spcAft>
+              <a:buFont typeface="Arial" panose="020B0604020202020204" pitchFamily="34" charset="0"/>
+              <a:buChar char="•"/>
+            </a:pPr>
+            <a:r>
+              <a:rPr lang="en-US" sz="2000"/>
+              <a:t>Priority areas for us to deliver training per our 2024-29 training plan: Datasets in the RDCs and working with data; using the Research Data </a:t>
+            </a:r>
+            <a:r>
+              <a:rPr lang="en-US" sz="2000" err="1"/>
+              <a:t>Centres</a:t>
+            </a:r>
+            <a:r>
+              <a:rPr lang="en-US" sz="2000"/>
+              <a:t>; working with </a:t>
+            </a:r>
+            <a:r>
+              <a:rPr lang="en-US" sz="2000" b="0" i="0">
+                <a:effectLst/>
               </a:rPr>
-              <a:t>What is the virtual Research Data Centre (</a:t>
-            </a:r>
-            <a:r>
-              <a:rPr lang="en-US" sz="2000" b="1" err="1">
-                <a:solidFill>
-                  <a:schemeClr val="accent1"/>
-                </a:solidFill>
-              </a:rPr>
-              <a:t>vRDC</a:t>
-            </a:r>
-            <a:r>
-              <a:rPr lang="en-US" sz="2000" b="1">
-                <a:solidFill>
-                  <a:schemeClr val="accent1"/>
-                </a:solidFill>
-              </a:rPr>
-              <a:t>)?</a:t>
+              <a:t>First Nations, Inuit and Métis data; </a:t>
+            </a:r>
+            <a:r>
+              <a:rPr lang="en-US" sz="2000"/>
+              <a:t>knowledge mobilization/policy communication; and professional development in the research data ecosystem. </a:t>
+            </a:r>
+          </a:p>
+          <a:p>
+            <a:pPr marL="342900" indent="-342900" fontAlgn="base">
+              <a:spcAft>
+                <a:spcPts val="600"/>
+              </a:spcAft>
+              <a:buFont typeface="Arial" panose="020B0604020202020204" pitchFamily="34" charset="0"/>
+              <a:buChar char="•"/>
+            </a:pPr>
+            <a:r>
+              <a:rPr lang="en-US" sz="2000" i="1"/>
+              <a:t>New initiative</a:t>
+            </a:r>
+            <a:r>
+              <a:rPr lang="en-US" sz="2000"/>
+              <a:t>: Partnering with government and research-focused organizations to match funds for CRDCN’s Emerging Scholars Program for PhD student-led work using RDC data. </a:t>
             </a:r>
           </a:p>
           <a:p>
             <a:pPr fontAlgn="base">
+              <a:spcBef>
+                <a:spcPts val="1200"/>
+              </a:spcBef>
               <a:spcAft>
-                <a:spcPts val="1200"/>
+                <a:spcPts val="600"/>
               </a:spcAft>
             </a:pPr>
             <a:r>
+              <a:rPr lang="en-US" sz="2000" b="1"/>
+              <a:t>Knowledge mobilization</a:t>
+            </a:r>
+          </a:p>
+          <a:p>
+            <a:pPr marL="342900" indent="-342900" fontAlgn="base">
+              <a:spcAft>
+                <a:spcPts val="600"/>
+              </a:spcAft>
+              <a:buFont typeface="Arial" panose="020B0604020202020204" pitchFamily="34" charset="0"/>
+              <a:buChar char="•"/>
+            </a:pPr>
+            <a:r>
               <a:rPr lang="en-US" sz="2000"/>
-              <a:t>A networked platform that modernizes the IT infrastructure, optimizes technical efficiencies and allows virtual data access from workspaces (</a:t>
-            </a:r>
-            <a:r>
-              <a:rPr lang="en-GB" sz="2000"/>
-              <a:t>authorised</a:t>
+              <a:t>CRDCN partners with two journals – </a:t>
+            </a:r>
+            <a:r>
+              <a:rPr lang="en-US" sz="2000" i="1"/>
+              <a:t>Canadian Public Policy </a:t>
             </a:r>
             <a:r>
               <a:rPr lang="en-US" sz="2000"/>
-              <a:t> by Statistics Canada) to approved researchers with eligible projects. </a:t>
-            </a:r>
-          </a:p>
-          <a:p>
-            <a:pPr fontAlgn="base">
-              <a:spcAft>
-                <a:spcPts val="300"/>
-              </a:spcAft>
+              <a:t>and </a:t>
+            </a:r>
+            <a:r>
+              <a:rPr lang="en-US" sz="2000" i="1"/>
+              <a:t>Canadian Journal of Economics </a:t>
+            </a:r>
+            <a:r>
+              <a:rPr lang="en-US" sz="2000"/>
+              <a:t>– to host webinars sharing forthcoming or recently published work by CRDCN researchers.</a:t>
+            </a:r>
+          </a:p>
+          <a:p>
+            <a:pPr marL="342900" indent="-342900" fontAlgn="base">
+              <a:buFont typeface="Arial" panose="020B0604020202020204" pitchFamily="34" charset="0"/>
+              <a:buChar char="•"/>
             </a:pPr>
             <a:r>
-              <a:rPr lang="en-US" sz="2000" b="1">
-                <a:solidFill>
-                  <a:schemeClr val="accent1"/>
-                </a:solidFill>
-              </a:rPr>
-              <a:t>When will virtual access be available?</a:t>
-            </a:r>
-            <a:endParaRPr lang="en-US" sz="2000"/>
-          </a:p>
-          <a:p>
-            <a:pPr fontAlgn="base">
-              <a:spcAft>
-                <a:spcPts val="1200"/>
-              </a:spcAft>
-            </a:pPr>
-            <a:r>
               <a:rPr lang="en-US" sz="2000"/>
-              <a:t>The </a:t>
-            </a:r>
-            <a:r>
-              <a:rPr lang="en-US" sz="2000" err="1"/>
-              <a:t>vRDC</a:t>
-            </a:r>
+              <a:t>CRDCN publishes research-policy snapshots that summarize findings of CRDCN </a:t>
+            </a:r>
+          </a:p>
+          <a:p>
+            <a:pPr fontAlgn="base"/>
             <a:r>
               <a:rPr lang="en-US" sz="2000"/>
-              <a:t> pilot launched with McMaster University in February 2025. The 33 physical Research Data </a:t>
-            </a:r>
-            <a:r>
-              <a:rPr lang="en-US" sz="2000" err="1"/>
-              <a:t>Centres</a:t>
-            </a:r>
-            <a:r>
-              <a:rPr lang="en-US" sz="2000"/>
-              <a:t> at university campuses across Canada will continue to migrate through early 2026.</a:t>
-            </a:r>
-          </a:p>
-          <a:p>
-            <a:pPr fontAlgn="base">
-              <a:spcAft>
-                <a:spcPts val="1200"/>
-              </a:spcAft>
-            </a:pPr>
-            <a:r>
-              <a:rPr lang="en-US" sz="2000" b="1">
-                <a:solidFill>
-                  <a:schemeClr val="accent1"/>
-                </a:solidFill>
-              </a:rPr>
-              <a:t>For more information: </a:t>
-            </a:r>
-          </a:p>
-          <a:p>
-            <a:pPr fontAlgn="base">
-              <a:spcAft>
-                <a:spcPts val="1200"/>
-              </a:spcAft>
-            </a:pPr>
-            <a:endParaRPr lang="en-US" sz="2000" b="1">
-              <a:solidFill>
-                <a:schemeClr val="accent1"/>
-              </a:solidFill>
-            </a:endParaRPr>
-          </a:p>
-          <a:p>
-            <a:pPr fontAlgn="base">
-              <a:spcAft>
-                <a:spcPts val="1200"/>
-              </a:spcAft>
-            </a:pPr>
-            <a:endParaRPr lang="en-US" sz="2000" b="1">
-              <a:solidFill>
-                <a:schemeClr val="accent1"/>
-              </a:solidFill>
-            </a:endParaRPr>
-          </a:p>
-          <a:p>
-            <a:pPr algn="l" rtl="0" fontAlgn="base">
-              <a:spcAft>
-                <a:spcPts val="1200"/>
-              </a:spcAft>
-            </a:pPr>
-            <a:endParaRPr lang="en-US" sz="2000"/>
+              <a:t>     researchers’ published work or policy reports.  </a:t>
+            </a:r>
           </a:p>
         </p:txBody>
       </p:sp>
-      <p:pic>
-        <p:nvPicPr>
-          <p:cNvPr id="8" name="Picture 7" descr="A qr code with a few squares&#10;&#10;AI-generated content may be incorrect.">
-            <a:extLst>
-              <a:ext uri="{FF2B5EF4-FFF2-40B4-BE49-F238E27FC236}">
-                <a16:creationId xmlns:a16="http://schemas.microsoft.com/office/drawing/2014/main" id="{CAB25ED1-5C30-39B4-204C-9F091F89902F}"/>
-              </a:ext>
-            </a:extLst>
-          </p:cNvPr>
-          <p:cNvPicPr>
-            <a:picLocks noChangeAspect="1"/>
-          </p:cNvPicPr>
-          <p:nvPr/>
-        </p:nvPicPr>
-        <p:blipFill>
-          <a:blip r:embed="rId2">
-            <a:extLst>
-              <a:ext uri="{28A0092B-C50C-407E-A947-70E740481C1C}">
-                <a14:useLocalDpi xmlns:a14="http://schemas.microsoft.com/office/drawing/2010/main" val="0"/>
-              </a:ext>
-            </a:extLst>
-          </a:blip>
-          <a:stretch>
-            <a:fillRect/>
-          </a:stretch>
-        </p:blipFill>
-        <p:spPr>
-          <a:xfrm>
-            <a:off x="3044822" y="4469228"/>
-            <a:ext cx="1430487" cy="1430487"/>
-          </a:xfrm>
-          <a:prstGeom prst="rect">
-            <a:avLst/>
-          </a:prstGeom>
-        </p:spPr>
-      </p:pic>
     </p:spTree>
     <p:extLst>
       <p:ext uri="{BB962C8B-B14F-4D97-AF65-F5344CB8AC3E}">
-        <p14:creationId xmlns:p14="http://schemas.microsoft.com/office/powerpoint/2010/main" val="1867261588"/>
+        <p14:creationId xmlns:p14="http://schemas.microsoft.com/office/powerpoint/2010/main" val="1375125008"/>
       </p:ext>
     </p:extLst>
   </p:cSld>
@@ -15808,6 +17541,57 @@
           </a:graphicData>
         </a:graphic>
       </p:graphicFrame>
+      <p:sp>
+        <p:nvSpPr>
+          <p:cNvPr id="2" name="TextBox 1">
+            <a:extLst>
+              <a:ext uri="{FF2B5EF4-FFF2-40B4-BE49-F238E27FC236}">
+                <a16:creationId xmlns:a16="http://schemas.microsoft.com/office/drawing/2014/main" id="{66697EBB-4F7E-EB21-C5C6-096E6BA9C6B4}"/>
+              </a:ext>
+            </a:extLst>
+          </p:cNvPr>
+          <p:cNvSpPr txBox="1"/>
+          <p:nvPr/>
+        </p:nvSpPr>
+        <p:spPr>
+          <a:xfrm>
+            <a:off x="382210" y="5208210"/>
+            <a:ext cx="7980437" cy="400110"/>
+          </a:xfrm>
+          <a:prstGeom prst="rect">
+            <a:avLst/>
+          </a:prstGeom>
+          <a:noFill/>
+        </p:spPr>
+        <p:txBody>
+          <a:bodyPr rot="0" spcFirstLastPara="0" vertOverflow="overflow" horzOverflow="overflow" vert="horz" wrap="square" lIns="91440" tIns="45720" rIns="91440" bIns="45720" numCol="1" spcCol="0" rtlCol="0" fromWordArt="0" anchor="t" anchorCtr="0" forceAA="0" compatLnSpc="1">
+            <a:prstTxWarp prst="textNoShape">
+              <a:avLst/>
+            </a:prstTxWarp>
+            <a:spAutoFit/>
+          </a:bodyPr>
+          <a:lstStyle/>
+          <a:p>
+            <a:r>
+              <a:rPr lang="en-US" sz="2000" b="1" dirty="0">
+                <a:solidFill>
+                  <a:srgbClr val="527CA6"/>
+                </a:solidFill>
+              </a:rPr>
+              <a:t>Question to the group: </a:t>
+            </a:r>
+            <a:r>
+              <a:rPr lang="en-US" sz="2000" dirty="0">
+                <a:solidFill>
+                  <a:srgbClr val="63656A"/>
+                </a:solidFill>
+              </a:rPr>
+              <a:t>Where do you see yourself here? Elsewhere? </a:t>
+            </a:r>
+            <a:endParaRPr lang="en-US" sz="2000" dirty="0"/>
+          </a:p>
+        </p:txBody>
+      </p:sp>
     </p:spTree>
     <p:extLst>
       <p:ext uri="{BB962C8B-B14F-4D97-AF65-F5344CB8AC3E}">
@@ -16601,23 +18385,12 @@
 </file>
 
 <file path=customXml/item1.xml><?xml version="1.0" encoding="utf-8"?>
-<p:properties xmlns:p="http://schemas.microsoft.com/office/2006/metadata/properties" xmlns:xsi="http://www.w3.org/2001/XMLSchema-instance" xmlns:pc="http://schemas.microsoft.com/office/infopath/2007/PartnerControls">
-  <documentManagement>
-    <SharedWithUsers xmlns="e471432c-39b5-4e37-b6a1-0303f55f1001">
-      <UserInfo>
-        <DisplayName/>
-        <AccountId xsi:nil="true"/>
-        <AccountType/>
-      </UserInfo>
-    </SharedWithUsers>
-    <lcf76f155ced4ddcb4097134ff3c332f xmlns="fe770d8f-5db2-42ab-9109-2ccfbb694cc3">
-      <Terms xmlns="http://schemas.microsoft.com/office/infopath/2007/PartnerControls"/>
-    </lcf76f155ced4ddcb4097134ff3c332f>
-    <TaxCatchAll xmlns="e471432c-39b5-4e37-b6a1-0303f55f1001" xsi:nil="true"/>
-    <_Flow_SignoffStatus xmlns="fe770d8f-5db2-42ab-9109-2ccfbb694cc3" xsi:nil="true"/>
-    <MediaLengthInSeconds xmlns="fe770d8f-5db2-42ab-9109-2ccfbb694cc3" xsi:nil="true"/>
-  </documentManagement>
-</p:properties>
+<?mso-contentType ?>
+<FormTemplates xmlns="http://schemas.microsoft.com/sharepoint/v3/contenttype/forms">
+  <Display>DocumentLibraryForm</Display>
+  <Edit>DocumentLibraryForm</Edit>
+  <New>DocumentLibraryForm</New>
+</FormTemplates>
 </file>
 
 <file path=customXml/item2.xml><?xml version="1.0" encoding="utf-8"?>
@@ -16882,27 +18655,29 @@
 </file>
 
 <file path=customXml/item3.xml><?xml version="1.0" encoding="utf-8"?>
-<?mso-contentType ?>
-<FormTemplates xmlns="http://schemas.microsoft.com/sharepoint/v3/contenttype/forms">
-  <Display>DocumentLibraryForm</Display>
-  <Edit>DocumentLibraryForm</Edit>
-  <New>DocumentLibraryForm</New>
-</FormTemplates>
+<p:properties xmlns:p="http://schemas.microsoft.com/office/2006/metadata/properties" xmlns:xsi="http://www.w3.org/2001/XMLSchema-instance" xmlns:pc="http://schemas.microsoft.com/office/infopath/2007/PartnerControls">
+  <documentManagement>
+    <SharedWithUsers xmlns="e471432c-39b5-4e37-b6a1-0303f55f1001">
+      <UserInfo>
+        <DisplayName/>
+        <AccountId xsi:nil="true"/>
+        <AccountType/>
+      </UserInfo>
+    </SharedWithUsers>
+    <lcf76f155ced4ddcb4097134ff3c332f xmlns="fe770d8f-5db2-42ab-9109-2ccfbb694cc3">
+      <Terms xmlns="http://schemas.microsoft.com/office/infopath/2007/PartnerControls"/>
+    </lcf76f155ced4ddcb4097134ff3c332f>
+    <TaxCatchAll xmlns="e471432c-39b5-4e37-b6a1-0303f55f1001" xsi:nil="true"/>
+    <_Flow_SignoffStatus xmlns="fe770d8f-5db2-42ab-9109-2ccfbb694cc3" xsi:nil="true"/>
+    <MediaLengthInSeconds xmlns="fe770d8f-5db2-42ab-9109-2ccfbb694cc3" xsi:nil="true"/>
+  </documentManagement>
+</p:properties>
 </file>
 
 <file path=customXml/itemProps1.xml><?xml version="1.0" encoding="utf-8"?>
-<ds:datastoreItem xmlns:ds="http://schemas.openxmlformats.org/officeDocument/2006/customXml" ds:itemID="{555E7EBE-8F52-41E7-AED3-CEA8B1FA5B00}">
+<ds:datastoreItem xmlns:ds="http://schemas.openxmlformats.org/officeDocument/2006/customXml" ds:itemID="{6BA29483-5E78-4541-AD2D-42735FF9999B}">
   <ds:schemaRefs>
-    <ds:schemaRef ds:uri="http://schemas.microsoft.com/office/2006/documentManagement/types"/>
-    <ds:schemaRef ds:uri="fe770d8f-5db2-42ab-9109-2ccfbb694cc3"/>
-    <ds:schemaRef ds:uri="http://www.w3.org/XML/1998/namespace"/>
-    <ds:schemaRef ds:uri="e471432c-39b5-4e37-b6a1-0303f55f1001"/>
-    <ds:schemaRef ds:uri="http://purl.org/dc/dcmitype/"/>
-    <ds:schemaRef ds:uri="http://schemas.microsoft.com/office/infopath/2007/PartnerControls"/>
-    <ds:schemaRef ds:uri="http://schemas.openxmlformats.org/package/2006/metadata/core-properties"/>
-    <ds:schemaRef ds:uri="http://purl.org/dc/elements/1.1/"/>
-    <ds:schemaRef ds:uri="http://schemas.microsoft.com/office/2006/metadata/properties"/>
-    <ds:schemaRef ds:uri="http://purl.org/dc/terms/"/>
+    <ds:schemaRef ds:uri="http://schemas.microsoft.com/sharepoint/v3/contenttype/forms"/>
   </ds:schemaRefs>
 </ds:datastoreItem>
 </file>
@@ -16927,9 +18702,18 @@
 </file>
 
 <file path=customXml/itemProps3.xml><?xml version="1.0" encoding="utf-8"?>
-<ds:datastoreItem xmlns:ds="http://schemas.openxmlformats.org/officeDocument/2006/customXml" ds:itemID="{6BA29483-5E78-4541-AD2D-42735FF9999B}">
+<ds:datastoreItem xmlns:ds="http://schemas.openxmlformats.org/officeDocument/2006/customXml" ds:itemID="{555E7EBE-8F52-41E7-AED3-CEA8B1FA5B00}">
   <ds:schemaRefs>
-    <ds:schemaRef ds:uri="http://schemas.microsoft.com/sharepoint/v3/contenttype/forms"/>
+    <ds:schemaRef ds:uri="e471432c-39b5-4e37-b6a1-0303f55f1001"/>
+    <ds:schemaRef ds:uri="fe770d8f-5db2-42ab-9109-2ccfbb694cc3"/>
+    <ds:schemaRef ds:uri="http://purl.org/dc/dcmitype/"/>
+    <ds:schemaRef ds:uri="http://purl.org/dc/elements/1.1/"/>
+    <ds:schemaRef ds:uri="http://purl.org/dc/terms/"/>
+    <ds:schemaRef ds:uri="http://schemas.microsoft.com/office/2006/documentManagement/types"/>
+    <ds:schemaRef ds:uri="http://schemas.microsoft.com/office/2006/metadata/properties"/>
+    <ds:schemaRef ds:uri="http://schemas.microsoft.com/office/infopath/2007/PartnerControls"/>
+    <ds:schemaRef ds:uri="http://schemas.openxmlformats.org/package/2006/metadata/core-properties"/>
+    <ds:schemaRef ds:uri="http://www.w3.org/XML/1998/namespace"/>
   </ds:schemaRefs>
 </ds:datastoreItem>
 </file>
</xml_diff>